<commit_message>
CISC 848 - Slideshow work
</commit_message>
<xml_diff>
--- a/CISC848/BackgroundPentation/ChurchCISC848Background.pptx
+++ b/CISC848/BackgroundPentation/ChurchCISC848Background.pptx
@@ -128,6 +128,11 @@
       </a:defRPr>
     </a:lvl9pPr>
   </p:defaultTextStyle>
+  <p:extLst>
+    <p:ext uri="{EFAFB233-063F-42B5-8137-9DF3F51BA10A}">
+      <p15:sldGuideLst xmlns:p15="http://schemas.microsoft.com/office/powerpoint/2012/main"/>
+    </p:ext>
+  </p:extLst>
 </p:presentation>
 </file>
 
@@ -6088,7 +6093,7 @@
           <a:bodyPr/>
           <a:lstStyle/>
           <a:p>
-            <a:endParaRPr lang="en-CA"/>
+            <a:endParaRPr lang="en-CA" dirty="0"/>
           </a:p>
         </p:txBody>
       </p:sp>
@@ -9815,7 +9820,6 @@
               <a:rPr lang="en-CA" sz="1300" dirty="0"/>
               <a:t>                        not defined:      1.0</a:t>
             </a:r>
-            <a:endParaRPr lang="en-CA" sz="1300" dirty="0"/>
           </a:p>
         </p:txBody>
       </p:sp>
@@ -12694,8 +12698,8 @@
           </a:p>
         </p:txBody>
       </p:sp>
-      <mc:AlternateContent xmlns:mc="http://schemas.openxmlformats.org/markup-compatibility/2006">
-        <mc:Choice xmlns:a14="http://schemas.microsoft.com/office/drawing/2010/main" Requires="a14">
+      <mc:AlternateContent xmlns:mc="http://schemas.openxmlformats.org/markup-compatibility/2006" xmlns:a14="http://schemas.microsoft.com/office/drawing/2010/main">
+        <mc:Choice Requires="a14">
           <p:sp>
             <p:nvSpPr>
               <p:cNvPr id="3" name="Content Placeholder 2"/>
@@ -12773,7 +12777,7 @@
             </p:txBody>
           </p:sp>
         </mc:Choice>
-        <mc:Fallback>
+        <mc:Fallback xmlns="">
           <p:sp>
             <p:nvSpPr>
               <p:cNvPr id="3" name="Content Placeholder 2"/>

</xml_diff>

<commit_message>
CISC 848 - Background presentation, filled Younis slides
</commit_message>
<xml_diff>
--- a/CISC848/BackgroundPentation/ChurchCISC848Background.pptx
+++ b/CISC848/BackgroundPentation/ChurchCISC848Background.pptx
@@ -16,20 +16,26 @@
     <p:sldId id="273" r:id="rId10"/>
     <p:sldId id="275" r:id="rId11"/>
     <p:sldId id="276" r:id="rId12"/>
-    <p:sldId id="277" r:id="rId13"/>
-    <p:sldId id="278" r:id="rId14"/>
-    <p:sldId id="279" r:id="rId15"/>
-    <p:sldId id="274" r:id="rId16"/>
-    <p:sldId id="280" r:id="rId17"/>
-    <p:sldId id="281" r:id="rId18"/>
-    <p:sldId id="282" r:id="rId19"/>
-    <p:sldId id="283" r:id="rId20"/>
-    <p:sldId id="284" r:id="rId21"/>
-    <p:sldId id="262" r:id="rId22"/>
-    <p:sldId id="267" r:id="rId23"/>
-    <p:sldId id="268" r:id="rId24"/>
-    <p:sldId id="270" r:id="rId25"/>
-    <p:sldId id="271" r:id="rId26"/>
+    <p:sldId id="290" r:id="rId13"/>
+    <p:sldId id="277" r:id="rId14"/>
+    <p:sldId id="285" r:id="rId15"/>
+    <p:sldId id="286" r:id="rId16"/>
+    <p:sldId id="287" r:id="rId17"/>
+    <p:sldId id="278" r:id="rId18"/>
+    <p:sldId id="279" r:id="rId19"/>
+    <p:sldId id="288" r:id="rId20"/>
+    <p:sldId id="274" r:id="rId21"/>
+    <p:sldId id="280" r:id="rId22"/>
+    <p:sldId id="281" r:id="rId23"/>
+    <p:sldId id="282" r:id="rId24"/>
+    <p:sldId id="283" r:id="rId25"/>
+    <p:sldId id="284" r:id="rId26"/>
+    <p:sldId id="289" r:id="rId27"/>
+    <p:sldId id="262" r:id="rId28"/>
+    <p:sldId id="267" r:id="rId29"/>
+    <p:sldId id="268" r:id="rId30"/>
+    <p:sldId id="270" r:id="rId31"/>
+    <p:sldId id="271" r:id="rId32"/>
   </p:sldIdLst>
   <p:sldSz cx="12192000" cy="6858000"/>
   <p:notesSz cx="6858000" cy="9144000"/>
@@ -327,7 +333,7 @@
           <a:p>
             <a:fld id="{E4250886-215E-474B-A4B7-516F0D324D19}" type="datetimeFigureOut">
               <a:rPr lang="en-CA" smtClean="0"/>
-              <a:t>2017-01-21</a:t>
+              <a:t>2017-01-22</a:t>
             </a:fld>
             <a:endParaRPr lang="en-CA"/>
           </a:p>
@@ -763,7 +769,7 @@
           <a:p>
             <a:fld id="{E4250886-215E-474B-A4B7-516F0D324D19}" type="datetimeFigureOut">
               <a:rPr lang="en-CA" smtClean="0"/>
-              <a:t>2017-01-21</a:t>
+              <a:t>2017-01-22</a:t>
             </a:fld>
             <a:endParaRPr lang="en-CA"/>
           </a:p>
@@ -1013,7 +1019,7 @@
           <a:p>
             <a:fld id="{E4250886-215E-474B-A4B7-516F0D324D19}" type="datetimeFigureOut">
               <a:rPr lang="en-CA" smtClean="0"/>
-              <a:t>2017-01-21</a:t>
+              <a:t>2017-01-22</a:t>
             </a:fld>
             <a:endParaRPr lang="en-CA"/>
           </a:p>
@@ -1321,7 +1327,7 @@
           <a:p>
             <a:fld id="{E4250886-215E-474B-A4B7-516F0D324D19}" type="datetimeFigureOut">
               <a:rPr lang="en-CA" smtClean="0"/>
-              <a:t>2017-01-21</a:t>
+              <a:t>2017-01-22</a:t>
             </a:fld>
             <a:endParaRPr lang="en-CA"/>
           </a:p>
@@ -1639,7 +1645,7 @@
           <a:p>
             <a:fld id="{E4250886-215E-474B-A4B7-516F0D324D19}" type="datetimeFigureOut">
               <a:rPr lang="en-CA" smtClean="0"/>
-              <a:t>2017-01-21</a:t>
+              <a:t>2017-01-22</a:t>
             </a:fld>
             <a:endParaRPr lang="en-CA"/>
           </a:p>
@@ -1941,7 +1947,7 @@
           <a:p>
             <a:fld id="{E4250886-215E-474B-A4B7-516F0D324D19}" type="datetimeFigureOut">
               <a:rPr lang="en-CA" smtClean="0"/>
-              <a:t>2017-01-21</a:t>
+              <a:t>2017-01-22</a:t>
             </a:fld>
             <a:endParaRPr lang="en-CA"/>
           </a:p>
@@ -2308,7 +2314,7 @@
           <a:p>
             <a:fld id="{E4250886-215E-474B-A4B7-516F0D324D19}" type="datetimeFigureOut">
               <a:rPr lang="en-CA" smtClean="0"/>
-              <a:t>2017-01-21</a:t>
+              <a:t>2017-01-22</a:t>
             </a:fld>
             <a:endParaRPr lang="en-CA"/>
           </a:p>
@@ -2482,7 +2488,7 @@
           <a:p>
             <a:fld id="{E4250886-215E-474B-A4B7-516F0D324D19}" type="datetimeFigureOut">
               <a:rPr lang="en-CA" smtClean="0"/>
-              <a:t>2017-01-21</a:t>
+              <a:t>2017-01-22</a:t>
             </a:fld>
             <a:endParaRPr lang="en-CA"/>
           </a:p>
@@ -2662,7 +2668,7 @@
           <a:p>
             <a:fld id="{E4250886-215E-474B-A4B7-516F0D324D19}" type="datetimeFigureOut">
               <a:rPr lang="en-CA" smtClean="0"/>
-              <a:t>2017-01-21</a:t>
+              <a:t>2017-01-22</a:t>
             </a:fld>
             <a:endParaRPr lang="en-CA"/>
           </a:p>
@@ -3075,7 +3081,7 @@
           <a:p>
             <a:fld id="{E4250886-215E-474B-A4B7-516F0D324D19}" type="datetimeFigureOut">
               <a:rPr lang="en-CA" smtClean="0"/>
-              <a:t>2017-01-21</a:t>
+              <a:t>2017-01-22</a:t>
             </a:fld>
             <a:endParaRPr lang="en-CA"/>
           </a:p>
@@ -3403,7 +3409,7 @@
           <a:p>
             <a:fld id="{E4250886-215E-474B-A4B7-516F0D324D19}" type="datetimeFigureOut">
               <a:rPr lang="en-CA" smtClean="0"/>
-              <a:t>2017-01-21</a:t>
+              <a:t>2017-01-22</a:t>
             </a:fld>
             <a:endParaRPr lang="en-CA"/>
           </a:p>
@@ -3646,7 +3652,7 @@
           <a:p>
             <a:fld id="{E4250886-215E-474B-A4B7-516F0D324D19}" type="datetimeFigureOut">
               <a:rPr lang="en-CA" smtClean="0"/>
-              <a:t>2017-01-21</a:t>
+              <a:t>2017-01-22</a:t>
             </a:fld>
             <a:endParaRPr lang="en-CA"/>
           </a:p>
@@ -4035,7 +4041,7 @@
           <a:p>
             <a:fld id="{E4250886-215E-474B-A4B7-516F0D324D19}" type="datetimeFigureOut">
               <a:rPr lang="en-CA" smtClean="0"/>
-              <a:t>2017-01-21</a:t>
+              <a:t>2017-01-22</a:t>
             </a:fld>
             <a:endParaRPr lang="en-CA"/>
           </a:p>
@@ -4153,7 +4159,7 @@
           <a:p>
             <a:fld id="{E4250886-215E-474B-A4B7-516F0D324D19}" type="datetimeFigureOut">
               <a:rPr lang="en-CA" smtClean="0"/>
-              <a:t>2017-01-21</a:t>
+              <a:t>2017-01-22</a:t>
             </a:fld>
             <a:endParaRPr lang="en-CA"/>
           </a:p>
@@ -4255,7 +4261,7 @@
           <a:p>
             <a:fld id="{E4250886-215E-474B-A4B7-516F0D324D19}" type="datetimeFigureOut">
               <a:rPr lang="en-CA" smtClean="0"/>
-              <a:t>2017-01-21</a:t>
+              <a:t>2017-01-22</a:t>
             </a:fld>
             <a:endParaRPr lang="en-CA"/>
           </a:p>
@@ -4517,7 +4523,7 @@
           <a:p>
             <a:fld id="{E4250886-215E-474B-A4B7-516F0D324D19}" type="datetimeFigureOut">
               <a:rPr lang="en-CA" smtClean="0"/>
-              <a:t>2017-01-21</a:t>
+              <a:t>2017-01-22</a:t>
             </a:fld>
             <a:endParaRPr lang="en-CA"/>
           </a:p>
@@ -4800,7 +4806,7 @@
           <a:p>
             <a:fld id="{E4250886-215E-474B-A4B7-516F0D324D19}" type="datetimeFigureOut">
               <a:rPr lang="en-CA" smtClean="0"/>
-              <a:t>2017-01-21</a:t>
+              <a:t>2017-01-22</a:t>
             </a:fld>
             <a:endParaRPr lang="en-CA"/>
           </a:p>
@@ -5222,7 +5228,7 @@
           <a:p>
             <a:fld id="{E4250886-215E-474B-A4B7-516F0D324D19}" type="datetimeFigureOut">
               <a:rPr lang="en-CA" smtClean="0"/>
-              <a:t>2017-01-21</a:t>
+              <a:t>2017-01-22</a:t>
             </a:fld>
             <a:endParaRPr lang="en-CA"/>
           </a:p>
@@ -6072,7 +6078,11 @@
             </a:r>
             <a:r>
               <a:rPr lang="en-US" dirty="0" smtClean="0"/>
-              <a:t> et al. - Methods</a:t>
+              <a:t> et al. - </a:t>
+            </a:r>
+            <a:r>
+              <a:rPr lang="en-US" dirty="0" smtClean="0"/>
+              <a:t>Data</a:t>
             </a:r>
             <a:endParaRPr lang="en-CA" dirty="0"/>
           </a:p>
@@ -6088,11 +6098,32 @@
             <p:ph idx="1"/>
           </p:nvPr>
         </p:nvSpPr>
-        <p:spPr/>
+        <p:spPr>
+          <a:xfrm>
+            <a:off x="684212" y="1782617"/>
+            <a:ext cx="9591902" cy="4116341"/>
+          </a:xfrm>
+        </p:spPr>
         <p:txBody>
           <a:bodyPr/>
           <a:lstStyle/>
           <a:p>
+            <a:r>
+              <a:rPr lang="en-US" dirty="0" smtClean="0"/>
+              <a:t>National Vulnerability Database (NVD) entries and scores with corresponding vulnerabilities in Firefox and Chrome databases</a:t>
+            </a:r>
+          </a:p>
+          <a:p>
+            <a:r>
+              <a:rPr lang="en-US" dirty="0" smtClean="0"/>
+              <a:t>Decision to reward (for finding or fixing???)</a:t>
+            </a:r>
+          </a:p>
+          <a:p>
+            <a:r>
+              <a:rPr lang="en-US" dirty="0" smtClean="0"/>
+              <a:t>Chrome reward amounts</a:t>
+            </a:r>
             <a:endParaRPr lang="en-CA" dirty="0"/>
           </a:p>
         </p:txBody>
@@ -6100,7 +6131,7 @@
     </p:spTree>
     <p:extLst>
       <p:ext uri="{BB962C8B-B14F-4D97-AF65-F5344CB8AC3E}">
-        <p14:creationId xmlns:p14="http://schemas.microsoft.com/office/powerpoint/2010/main" val="379196986"/>
+        <p14:creationId xmlns:p14="http://schemas.microsoft.com/office/powerpoint/2010/main" val="883849337"/>
       </p:ext>
     </p:extLst>
   </p:cSld>
@@ -6155,7 +6186,7 @@
             </a:r>
             <a:r>
               <a:rPr lang="en-US" dirty="0" smtClean="0"/>
-              <a:t> et al. – Results</a:t>
+              <a:t> et al. - Methods</a:t>
             </a:r>
             <a:endParaRPr lang="en-CA" dirty="0"/>
           </a:p>
@@ -6171,19 +6202,257 @@
             <p:ph idx="1"/>
           </p:nvPr>
         </p:nvSpPr>
-        <p:spPr/>
+        <p:spPr>
+          <a:xfrm>
+            <a:off x="684211" y="1782617"/>
+            <a:ext cx="9452565" cy="4116341"/>
+          </a:xfrm>
+        </p:spPr>
         <p:txBody>
           <a:bodyPr/>
           <a:lstStyle/>
           <a:p>
-            <a:endParaRPr lang="en-CA"/>
+            <a:r>
+              <a:rPr lang="en-US" dirty="0" smtClean="0"/>
+              <a:t>Compared CVSS score severity to VRP severity for Firefox and Chrome vulnerabilities</a:t>
+            </a:r>
+            <a:endParaRPr lang="en-CA" dirty="0"/>
           </a:p>
         </p:txBody>
       </p:sp>
+      <p:graphicFrame>
+        <p:nvGraphicFramePr>
+          <p:cNvPr id="12" name="Table 11"/>
+          <p:cNvGraphicFramePr>
+            <a:graphicFrameLocks noGrp="1"/>
+          </p:cNvGraphicFramePr>
+          <p:nvPr>
+            <p:extLst>
+              <p:ext uri="{D42A27DB-BD31-4B8C-83A1-F6EECF244321}">
+                <p14:modId xmlns:p14="http://schemas.microsoft.com/office/powerpoint/2010/main" val="1040974197"/>
+              </p:ext>
+            </p:extLst>
+          </p:nvPr>
+        </p:nvGraphicFramePr>
+        <p:xfrm>
+          <a:off x="2687183" y="3759947"/>
+          <a:ext cx="6096000" cy="1483360"/>
+        </p:xfrm>
+        <a:graphic>
+          <a:graphicData uri="http://schemas.openxmlformats.org/drawingml/2006/table">
+            <a:tbl>
+              <a:tblPr firstRow="1" bandRow="1">
+                <a:tableStyleId>{5C22544A-7EE6-4342-B048-85BDC9FD1C3A}</a:tableStyleId>
+              </a:tblPr>
+              <a:tblGrid>
+                <a:gridCol w="2032000"/>
+                <a:gridCol w="2032000"/>
+                <a:gridCol w="2032000"/>
+              </a:tblGrid>
+              <a:tr h="370840">
+                <a:tc>
+                  <a:txBody>
+                    <a:bodyPr/>
+                    <a:lstStyle/>
+                    <a:p>
+                      <a:pPr algn="ctr"/>
+                      <a:r>
+                        <a:rPr lang="en-US" dirty="0" smtClean="0"/>
+                        <a:t>CVSS</a:t>
+                      </a:r>
+                      <a:r>
+                        <a:rPr lang="en-US" baseline="0" dirty="0" smtClean="0"/>
+                        <a:t> Scores</a:t>
+                      </a:r>
+                      <a:endParaRPr lang="en-CA" dirty="0"/>
+                    </a:p>
+                  </a:txBody>
+                  <a:tcPr/>
+                </a:tc>
+                <a:tc>
+                  <a:txBody>
+                    <a:bodyPr/>
+                    <a:lstStyle/>
+                    <a:p>
+                      <a:pPr algn="ctr"/>
+                      <a:r>
+                        <a:rPr lang="en-US" dirty="0" smtClean="0"/>
+                        <a:t>CVSS Severity</a:t>
+                      </a:r>
+                      <a:endParaRPr lang="en-CA" dirty="0"/>
+                    </a:p>
+                  </a:txBody>
+                  <a:tcPr/>
+                </a:tc>
+                <a:tc>
+                  <a:txBody>
+                    <a:bodyPr/>
+                    <a:lstStyle/>
+                    <a:p>
+                      <a:pPr algn="ctr"/>
+                      <a:r>
+                        <a:rPr lang="en-US" dirty="0" smtClean="0"/>
+                        <a:t>VRP Severity</a:t>
+                      </a:r>
+                      <a:endParaRPr lang="en-CA" dirty="0"/>
+                    </a:p>
+                  </a:txBody>
+                  <a:tcPr/>
+                </a:tc>
+              </a:tr>
+              <a:tr h="370840">
+                <a:tc>
+                  <a:txBody>
+                    <a:bodyPr/>
+                    <a:lstStyle/>
+                    <a:p>
+                      <a:pPr algn="ctr"/>
+                      <a:r>
+                        <a:rPr lang="en-US" dirty="0" smtClean="0"/>
+                        <a:t>0 – 3.9</a:t>
+                      </a:r>
+                      <a:endParaRPr lang="en-CA" dirty="0"/>
+                    </a:p>
+                  </a:txBody>
+                  <a:tcPr/>
+                </a:tc>
+                <a:tc>
+                  <a:txBody>
+                    <a:bodyPr/>
+                    <a:lstStyle/>
+                    <a:p>
+                      <a:pPr algn="ctr"/>
+                      <a:r>
+                        <a:rPr lang="en-US" dirty="0" smtClean="0"/>
+                        <a:t>Low</a:t>
+                      </a:r>
+                      <a:endParaRPr lang="en-CA" dirty="0"/>
+                    </a:p>
+                  </a:txBody>
+                  <a:tcPr/>
+                </a:tc>
+                <a:tc>
+                  <a:txBody>
+                    <a:bodyPr/>
+                    <a:lstStyle/>
+                    <a:p>
+                      <a:pPr algn="ctr"/>
+                      <a:r>
+                        <a:rPr lang="en-US" dirty="0" smtClean="0"/>
+                        <a:t>Low</a:t>
+                      </a:r>
+                      <a:endParaRPr lang="en-CA" dirty="0"/>
+                    </a:p>
+                  </a:txBody>
+                  <a:tcPr/>
+                </a:tc>
+              </a:tr>
+              <a:tr h="370840">
+                <a:tc>
+                  <a:txBody>
+                    <a:bodyPr/>
+                    <a:lstStyle/>
+                    <a:p>
+                      <a:pPr algn="ctr"/>
+                      <a:r>
+                        <a:rPr lang="en-US" dirty="0" smtClean="0"/>
+                        <a:t>4.0 – 6.9</a:t>
+                      </a:r>
+                      <a:endParaRPr lang="en-CA" dirty="0"/>
+                    </a:p>
+                  </a:txBody>
+                  <a:tcPr/>
+                </a:tc>
+                <a:tc>
+                  <a:txBody>
+                    <a:bodyPr/>
+                    <a:lstStyle/>
+                    <a:p>
+                      <a:pPr algn="ctr"/>
+                      <a:r>
+                        <a:rPr lang="en-US" dirty="0" smtClean="0"/>
+                        <a:t>Medium</a:t>
+                      </a:r>
+                      <a:endParaRPr lang="en-CA" dirty="0"/>
+                    </a:p>
+                  </a:txBody>
+                  <a:tcPr/>
+                </a:tc>
+                <a:tc>
+                  <a:txBody>
+                    <a:bodyPr/>
+                    <a:lstStyle/>
+                    <a:p>
+                      <a:pPr algn="ctr"/>
+                      <a:r>
+                        <a:rPr lang="en-US" dirty="0" smtClean="0"/>
+                        <a:t>Moderate</a:t>
+                      </a:r>
+                      <a:endParaRPr lang="en-CA" dirty="0"/>
+                    </a:p>
+                  </a:txBody>
+                  <a:tcPr/>
+                </a:tc>
+              </a:tr>
+              <a:tr h="370840">
+                <a:tc>
+                  <a:txBody>
+                    <a:bodyPr/>
+                    <a:lstStyle/>
+                    <a:p>
+                      <a:pPr algn="ctr"/>
+                      <a:r>
+                        <a:rPr lang="en-US" dirty="0" smtClean="0"/>
+                        <a:t>7.0</a:t>
+                      </a:r>
+                      <a:r>
+                        <a:rPr lang="en-US" baseline="0" dirty="0" smtClean="0"/>
+                        <a:t> – 10.0</a:t>
+                      </a:r>
+                      <a:endParaRPr lang="en-CA" dirty="0"/>
+                    </a:p>
+                  </a:txBody>
+                  <a:tcPr/>
+                </a:tc>
+                <a:tc>
+                  <a:txBody>
+                    <a:bodyPr/>
+                    <a:lstStyle/>
+                    <a:p>
+                      <a:pPr algn="ctr"/>
+                      <a:r>
+                        <a:rPr lang="en-US" dirty="0" smtClean="0"/>
+                        <a:t>High</a:t>
+                      </a:r>
+                      <a:endParaRPr lang="en-CA" dirty="0"/>
+                    </a:p>
+                  </a:txBody>
+                  <a:tcPr/>
+                </a:tc>
+                <a:tc>
+                  <a:txBody>
+                    <a:bodyPr/>
+                    <a:lstStyle/>
+                    <a:p>
+                      <a:pPr algn="ctr"/>
+                      <a:r>
+                        <a:rPr lang="en-US" dirty="0" smtClean="0"/>
+                        <a:t>High/Critical</a:t>
+                      </a:r>
+                      <a:endParaRPr lang="en-CA" dirty="0"/>
+                    </a:p>
+                  </a:txBody>
+                  <a:tcPr/>
+                </a:tc>
+              </a:tr>
+            </a:tbl>
+          </a:graphicData>
+        </a:graphic>
+      </p:graphicFrame>
     </p:spTree>
     <p:extLst>
       <p:ext uri="{BB962C8B-B14F-4D97-AF65-F5344CB8AC3E}">
-        <p14:creationId xmlns:p14="http://schemas.microsoft.com/office/powerpoint/2010/main" val="1476580246"/>
+        <p14:creationId xmlns:p14="http://schemas.microsoft.com/office/powerpoint/2010/main" val="379196986"/>
       </p:ext>
     </p:extLst>
   </p:cSld>
@@ -6233,12 +6502,12 @@
           <a:lstStyle/>
           <a:p>
             <a:r>
-              <a:rPr lang="en-US" dirty="0" err="1" smtClean="0"/>
+              <a:rPr lang="en-US" dirty="0" err="1"/>
               <a:t>Younis</a:t>
             </a:r>
             <a:r>
-              <a:rPr lang="en-US" dirty="0" smtClean="0"/>
-              <a:t> et al. - Discussion</a:t>
+              <a:rPr lang="en-US" dirty="0"/>
+              <a:t> et al. - Methods</a:t>
             </a:r>
             <a:endParaRPr lang="en-CA" dirty="0"/>
           </a:p>
@@ -6254,32 +6523,1088 @@
             <p:ph idx="1"/>
           </p:nvPr>
         </p:nvSpPr>
-        <p:spPr/>
+        <p:spPr>
+          <a:xfrm>
+            <a:off x="684212" y="1538778"/>
+            <a:ext cx="8534400" cy="673199"/>
+          </a:xfrm>
+        </p:spPr>
         <p:txBody>
           <a:bodyPr/>
           <a:lstStyle/>
           <a:p>
-            <a:endParaRPr lang="en-CA"/>
+            <a:pPr marL="0" indent="0">
+              <a:buNone/>
+            </a:pPr>
+            <a:r>
+              <a:rPr lang="en-US" dirty="0" smtClean="0"/>
+              <a:t>Examined CVSS confusion as:</a:t>
+            </a:r>
+            <a:endParaRPr lang="en-CA" dirty="0"/>
           </a:p>
         </p:txBody>
       </p:sp>
+      <mc:AlternateContent xmlns:mc="http://schemas.openxmlformats.org/markup-compatibility/2006">
+        <mc:Choice xmlns:a14="http://schemas.microsoft.com/office/drawing/2010/main" Requires="a14">
+          <p:sp>
+            <p:nvSpPr>
+              <p:cNvPr id="4" name="Content Placeholder 2"/>
+              <p:cNvSpPr txBox="1">
+                <a:spLocks/>
+              </p:cNvSpPr>
+              <p:nvPr/>
+            </p:nvSpPr>
+            <p:spPr>
+              <a:xfrm>
+                <a:off x="684212" y="2211977"/>
+                <a:ext cx="8534400" cy="4066903"/>
+              </a:xfrm>
+              <a:prstGeom prst="rect">
+                <a:avLst/>
+              </a:prstGeom>
+            </p:spPr>
+            <p:txBody>
+              <a:bodyPr vert="horz" lIns="91440" tIns="45720" rIns="91440" bIns="45720" rtlCol="0" anchor="t">
+                <a:normAutofit fontScale="92500" lnSpcReduction="20000"/>
+              </a:bodyPr>
+              <a:lstStyle>
+                <a:lvl1pPr marL="285750" indent="-285750" algn="l" defTabSz="457200" rtl="0" eaLnBrk="1" latinLnBrk="0" hangingPunct="1">
+                  <a:spcBef>
+                    <a:spcPct val="20000"/>
+                  </a:spcBef>
+                  <a:spcAft>
+                    <a:spcPts val="600"/>
+                  </a:spcAft>
+                  <a:buClr>
+                    <a:schemeClr val="tx1"/>
+                  </a:buClr>
+                  <a:buSzPct val="80000"/>
+                  <a:buFont typeface="Wingdings 3" panose="05040102010807070707" pitchFamily="18" charset="2"/>
+                  <a:buChar char=""/>
+                  <a:defRPr sz="3200" kern="1200" cap="none">
+                    <a:solidFill>
+                      <a:schemeClr val="tx1"/>
+                    </a:solidFill>
+                    <a:effectLst/>
+                    <a:latin typeface="+mn-lt"/>
+                    <a:ea typeface="+mn-ea"/>
+                    <a:cs typeface="+mn-cs"/>
+                  </a:defRPr>
+                </a:lvl1pPr>
+                <a:lvl2pPr marL="742950" indent="-285750" algn="l" defTabSz="457200" rtl="0" eaLnBrk="1" latinLnBrk="0" hangingPunct="1">
+                  <a:spcBef>
+                    <a:spcPct val="20000"/>
+                  </a:spcBef>
+                  <a:spcAft>
+                    <a:spcPts val="600"/>
+                  </a:spcAft>
+                  <a:buClr>
+                    <a:schemeClr val="tx1"/>
+                  </a:buClr>
+                  <a:buSzPct val="80000"/>
+                  <a:buFont typeface="Wingdings 3" panose="05040102010807070707" pitchFamily="18" charset="2"/>
+                  <a:buChar char=""/>
+                  <a:defRPr sz="1800" kern="1200" cap="none">
+                    <a:solidFill>
+                      <a:schemeClr val="bg2">
+                        <a:lumMod val="75000"/>
+                      </a:schemeClr>
+                    </a:solidFill>
+                    <a:effectLst/>
+                    <a:latin typeface="+mn-lt"/>
+                    <a:ea typeface="+mn-ea"/>
+                    <a:cs typeface="+mn-cs"/>
+                  </a:defRPr>
+                </a:lvl2pPr>
+                <a:lvl3pPr marL="1200150" indent="-285750" algn="l" defTabSz="457200" rtl="0" eaLnBrk="1" latinLnBrk="0" hangingPunct="1">
+                  <a:spcBef>
+                    <a:spcPct val="20000"/>
+                  </a:spcBef>
+                  <a:spcAft>
+                    <a:spcPts val="600"/>
+                  </a:spcAft>
+                  <a:buClr>
+                    <a:schemeClr val="tx1"/>
+                  </a:buClr>
+                  <a:buSzPct val="80000"/>
+                  <a:buFont typeface="Wingdings 3" panose="05040102010807070707" pitchFamily="18" charset="2"/>
+                  <a:buChar char=""/>
+                  <a:defRPr sz="1600" kern="1200" cap="none">
+                    <a:solidFill>
+                      <a:schemeClr val="bg2">
+                        <a:lumMod val="75000"/>
+                      </a:schemeClr>
+                    </a:solidFill>
+                    <a:effectLst/>
+                    <a:latin typeface="+mn-lt"/>
+                    <a:ea typeface="+mn-ea"/>
+                    <a:cs typeface="+mn-cs"/>
+                  </a:defRPr>
+                </a:lvl3pPr>
+                <a:lvl4pPr marL="1543050" indent="-171450" algn="l" defTabSz="457200" rtl="0" eaLnBrk="1" latinLnBrk="0" hangingPunct="1">
+                  <a:spcBef>
+                    <a:spcPct val="20000"/>
+                  </a:spcBef>
+                  <a:spcAft>
+                    <a:spcPts val="600"/>
+                  </a:spcAft>
+                  <a:buClr>
+                    <a:schemeClr val="tx1"/>
+                  </a:buClr>
+                  <a:buSzPct val="80000"/>
+                  <a:buFont typeface="Wingdings 3" panose="05040102010807070707" pitchFamily="18" charset="2"/>
+                  <a:buChar char=""/>
+                  <a:defRPr sz="1400" kern="1200" cap="none">
+                    <a:solidFill>
+                      <a:schemeClr val="bg2">
+                        <a:lumMod val="75000"/>
+                      </a:schemeClr>
+                    </a:solidFill>
+                    <a:effectLst/>
+                    <a:latin typeface="+mn-lt"/>
+                    <a:ea typeface="+mn-ea"/>
+                    <a:cs typeface="+mn-cs"/>
+                  </a:defRPr>
+                </a:lvl4pPr>
+                <a:lvl5pPr marL="2000250" indent="-171450" algn="l" defTabSz="457200" rtl="0" eaLnBrk="1" latinLnBrk="0" hangingPunct="1">
+                  <a:spcBef>
+                    <a:spcPct val="20000"/>
+                  </a:spcBef>
+                  <a:spcAft>
+                    <a:spcPts val="600"/>
+                  </a:spcAft>
+                  <a:buClr>
+                    <a:schemeClr val="tx1"/>
+                  </a:buClr>
+                  <a:buSzPct val="80000"/>
+                  <a:buFont typeface="Wingdings 3" panose="05040102010807070707" pitchFamily="18" charset="2"/>
+                  <a:buChar char=""/>
+                  <a:defRPr sz="1400" kern="1200" cap="none">
+                    <a:solidFill>
+                      <a:schemeClr val="bg2">
+                        <a:lumMod val="75000"/>
+                      </a:schemeClr>
+                    </a:solidFill>
+                    <a:effectLst/>
+                    <a:latin typeface="+mn-lt"/>
+                    <a:ea typeface="+mn-ea"/>
+                    <a:cs typeface="+mn-cs"/>
+                  </a:defRPr>
+                </a:lvl5pPr>
+                <a:lvl6pPr marL="2514600" indent="-228600" algn="l" defTabSz="457200" rtl="0" eaLnBrk="1" latinLnBrk="0" hangingPunct="1">
+                  <a:spcBef>
+                    <a:spcPct val="20000"/>
+                  </a:spcBef>
+                  <a:spcAft>
+                    <a:spcPts val="600"/>
+                  </a:spcAft>
+                  <a:buClr>
+                    <a:schemeClr val="tx1"/>
+                  </a:buClr>
+                  <a:buSzPct val="80000"/>
+                  <a:buFont typeface="Wingdings 3" panose="05040102010807070707" pitchFamily="18" charset="2"/>
+                  <a:buChar char=""/>
+                  <a:defRPr sz="1400" kern="1200" cap="none">
+                    <a:solidFill>
+                      <a:schemeClr val="bg2">
+                        <a:lumMod val="75000"/>
+                      </a:schemeClr>
+                    </a:solidFill>
+                    <a:effectLst/>
+                    <a:latin typeface="+mn-lt"/>
+                    <a:ea typeface="+mn-ea"/>
+                    <a:cs typeface="+mn-cs"/>
+                  </a:defRPr>
+                </a:lvl6pPr>
+                <a:lvl7pPr marL="2971800" indent="-228600" algn="l" defTabSz="457200" rtl="0" eaLnBrk="1" latinLnBrk="0" hangingPunct="1">
+                  <a:spcBef>
+                    <a:spcPct val="20000"/>
+                  </a:spcBef>
+                  <a:spcAft>
+                    <a:spcPts val="600"/>
+                  </a:spcAft>
+                  <a:buClr>
+                    <a:schemeClr val="tx1"/>
+                  </a:buClr>
+                  <a:buSzPct val="80000"/>
+                  <a:buFont typeface="Wingdings 3" panose="05040102010807070707" pitchFamily="18" charset="2"/>
+                  <a:buChar char=""/>
+                  <a:defRPr sz="1400" kern="1200" cap="none">
+                    <a:solidFill>
+                      <a:schemeClr val="bg2">
+                        <a:lumMod val="75000"/>
+                      </a:schemeClr>
+                    </a:solidFill>
+                    <a:effectLst/>
+                    <a:latin typeface="+mn-lt"/>
+                    <a:ea typeface="+mn-ea"/>
+                    <a:cs typeface="+mn-cs"/>
+                  </a:defRPr>
+                </a:lvl7pPr>
+                <a:lvl8pPr marL="3429000" indent="-228600" algn="l" defTabSz="457200" rtl="0" eaLnBrk="1" latinLnBrk="0" hangingPunct="1">
+                  <a:spcBef>
+                    <a:spcPct val="20000"/>
+                  </a:spcBef>
+                  <a:spcAft>
+                    <a:spcPts val="600"/>
+                  </a:spcAft>
+                  <a:buClr>
+                    <a:schemeClr val="tx1"/>
+                  </a:buClr>
+                  <a:buSzPct val="80000"/>
+                  <a:buFont typeface="Wingdings 3" panose="05040102010807070707" pitchFamily="18" charset="2"/>
+                  <a:buChar char=""/>
+                  <a:defRPr sz="1400" kern="1200" cap="none">
+                    <a:solidFill>
+                      <a:schemeClr val="bg2">
+                        <a:lumMod val="75000"/>
+                      </a:schemeClr>
+                    </a:solidFill>
+                    <a:effectLst/>
+                    <a:latin typeface="+mn-lt"/>
+                    <a:ea typeface="+mn-ea"/>
+                    <a:cs typeface="+mn-cs"/>
+                  </a:defRPr>
+                </a:lvl8pPr>
+                <a:lvl9pPr marL="3886200" indent="-228600" algn="l" defTabSz="457200" rtl="0" eaLnBrk="1" latinLnBrk="0" hangingPunct="1">
+                  <a:spcBef>
+                    <a:spcPct val="20000"/>
+                  </a:spcBef>
+                  <a:spcAft>
+                    <a:spcPts val="600"/>
+                  </a:spcAft>
+                  <a:buClr>
+                    <a:schemeClr val="tx1"/>
+                  </a:buClr>
+                  <a:buSzPct val="80000"/>
+                  <a:buFont typeface="Wingdings 3" panose="05040102010807070707" pitchFamily="18" charset="2"/>
+                  <a:buChar char=""/>
+                  <a:defRPr sz="1400" kern="1200" cap="none">
+                    <a:solidFill>
+                      <a:schemeClr val="bg2">
+                        <a:lumMod val="75000"/>
+                      </a:schemeClr>
+                    </a:solidFill>
+                    <a:effectLst/>
+                    <a:latin typeface="+mn-lt"/>
+                    <a:ea typeface="+mn-ea"/>
+                    <a:cs typeface="+mn-cs"/>
+                  </a:defRPr>
+                </a:lvl9pPr>
+              </a:lstStyle>
+              <a:p>
+                <a:pPr>
+                  <a:lnSpc>
+                    <a:spcPct val="110000"/>
+                  </a:lnSpc>
+                  <a:spcBef>
+                    <a:spcPts val="0"/>
+                  </a:spcBef>
+                  <a:spcAft>
+                    <a:spcPts val="0"/>
+                  </a:spcAft>
+                </a:pPr>
+                <a:r>
+                  <a:rPr lang="en-US" dirty="0" smtClean="0"/>
+                  <a:t>True positive</a:t>
+                </a:r>
+              </a:p>
+              <a:p>
+                <a:pPr lvl="1">
+                  <a:lnSpc>
+                    <a:spcPct val="110000"/>
+                  </a:lnSpc>
+                  <a:spcBef>
+                    <a:spcPts val="0"/>
+                  </a:spcBef>
+                  <a:spcAft>
+                    <a:spcPts val="0"/>
+                  </a:spcAft>
+                </a:pPr>
+                <a14:m>
+                  <m:oMath xmlns:m="http://schemas.openxmlformats.org/officeDocument/2006/math">
+                    <m:r>
+                      <a:rPr lang="en-US" sz="2400" b="0" i="1" smtClean="0">
+                        <a:solidFill>
+                          <a:schemeClr val="tx1"/>
+                        </a:solidFill>
+                        <a:latin typeface="Cambria Math" panose="02040503050406030204" pitchFamily="18" charset="0"/>
+                      </a:rPr>
+                      <m:t>𝑉𝑅𝑃</m:t>
+                    </m:r>
+                    <m:r>
+                      <a:rPr lang="en-US" sz="2400" b="0" i="1" smtClean="0">
+                        <a:solidFill>
+                          <a:schemeClr val="tx1"/>
+                        </a:solidFill>
+                        <a:latin typeface="Cambria Math" panose="02040503050406030204" pitchFamily="18" charset="0"/>
+                      </a:rPr>
+                      <m:t>≥</m:t>
+                    </m:r>
+                    <m:r>
+                      <a:rPr lang="en-US" sz="2400" b="0" i="1" smtClean="0">
+                        <a:solidFill>
+                          <a:schemeClr val="tx1"/>
+                        </a:solidFill>
+                        <a:latin typeface="Cambria Math" panose="02040503050406030204" pitchFamily="18" charset="0"/>
+                      </a:rPr>
+                      <m:t>𝑚𝑒𝑑𝑖𝑢𝑚</m:t>
+                    </m:r>
+                    <m:r>
+                      <a:rPr lang="en-US" sz="2400" b="0" i="1" smtClean="0">
+                        <a:solidFill>
+                          <a:schemeClr val="tx1"/>
+                        </a:solidFill>
+                        <a:latin typeface="Cambria Math" panose="02040503050406030204" pitchFamily="18" charset="0"/>
+                      </a:rPr>
+                      <m:t> </m:t>
+                    </m:r>
+                    <m:r>
+                      <a:rPr lang="en-US" sz="2400" b="0" i="1" smtClean="0">
+                        <a:solidFill>
+                          <a:schemeClr val="tx1"/>
+                        </a:solidFill>
+                        <a:latin typeface="Cambria Math" panose="02040503050406030204" pitchFamily="18" charset="0"/>
+                      </a:rPr>
+                      <m:t>𝐴𝑁𝐷</m:t>
+                    </m:r>
+                    <m:r>
+                      <a:rPr lang="en-US" sz="2400" b="0" i="1" smtClean="0">
+                        <a:solidFill>
+                          <a:schemeClr val="tx1"/>
+                        </a:solidFill>
+                        <a:latin typeface="Cambria Math" panose="02040503050406030204" pitchFamily="18" charset="0"/>
+                      </a:rPr>
+                      <m:t> </m:t>
+                    </m:r>
+                    <m:r>
+                      <a:rPr lang="en-US" sz="2400" b="0" i="1" smtClean="0">
+                        <a:solidFill>
+                          <a:schemeClr val="tx1"/>
+                        </a:solidFill>
+                        <a:latin typeface="Cambria Math" panose="02040503050406030204" pitchFamily="18" charset="0"/>
+                      </a:rPr>
+                      <m:t>𝐶𝑉𝑆𝑆</m:t>
+                    </m:r>
+                    <m:r>
+                      <a:rPr lang="en-US" sz="2400" b="0" i="1" smtClean="0">
+                        <a:solidFill>
+                          <a:schemeClr val="tx1"/>
+                        </a:solidFill>
+                        <a:latin typeface="Cambria Math" panose="02040503050406030204" pitchFamily="18" charset="0"/>
+                      </a:rPr>
+                      <m:t>=</m:t>
+                    </m:r>
+                    <m:r>
+                      <a:rPr lang="en-US" sz="2400" b="0" i="1" smtClean="0">
+                        <a:solidFill>
+                          <a:schemeClr val="tx1"/>
+                        </a:solidFill>
+                        <a:latin typeface="Cambria Math" panose="02040503050406030204" pitchFamily="18" charset="0"/>
+                      </a:rPr>
+                      <m:t>𝑉𝑅𝑃</m:t>
+                    </m:r>
+                  </m:oMath>
+                </a14:m>
+                <a:endParaRPr lang="en-US" sz="2400" b="0" dirty="0" smtClean="0">
+                  <a:solidFill>
+                    <a:schemeClr val="tx1"/>
+                  </a:solidFill>
+                </a:endParaRPr>
+              </a:p>
+              <a:p>
+                <a:pPr>
+                  <a:lnSpc>
+                    <a:spcPct val="110000"/>
+                  </a:lnSpc>
+                  <a:spcBef>
+                    <a:spcPts val="0"/>
+                  </a:spcBef>
+                  <a:spcAft>
+                    <a:spcPts val="0"/>
+                  </a:spcAft>
+                </a:pPr>
+                <a:r>
+                  <a:rPr lang="en-US" dirty="0" smtClean="0">
+                    <a:solidFill>
+                      <a:schemeClr val="tx1"/>
+                    </a:solidFill>
+                  </a:rPr>
+                  <a:t>True negative</a:t>
+                </a:r>
+              </a:p>
+              <a:p>
+                <a:pPr lvl="1">
+                  <a:lnSpc>
+                    <a:spcPct val="110000"/>
+                  </a:lnSpc>
+                  <a:spcBef>
+                    <a:spcPts val="0"/>
+                  </a:spcBef>
+                  <a:spcAft>
+                    <a:spcPts val="0"/>
+                  </a:spcAft>
+                </a:pPr>
+                <a14:m>
+                  <m:oMath xmlns:m="http://schemas.openxmlformats.org/officeDocument/2006/math">
+                    <m:r>
+                      <a:rPr lang="en-US" sz="2400" b="0" i="1" smtClean="0">
+                        <a:solidFill>
+                          <a:schemeClr val="tx1"/>
+                        </a:solidFill>
+                        <a:latin typeface="Cambria Math" panose="02040503050406030204" pitchFamily="18" charset="0"/>
+                      </a:rPr>
+                      <m:t>𝑉𝑅𝑃</m:t>
+                    </m:r>
+                    <m:r>
+                      <a:rPr lang="en-US" sz="2400" b="0" i="1" smtClean="0">
+                        <a:solidFill>
+                          <a:schemeClr val="tx1"/>
+                        </a:solidFill>
+                        <a:latin typeface="Cambria Math" panose="02040503050406030204" pitchFamily="18" charset="0"/>
+                      </a:rPr>
+                      <m:t>=</m:t>
+                    </m:r>
+                    <m:r>
+                      <a:rPr lang="en-US" sz="2400" b="0" i="1" smtClean="0">
+                        <a:solidFill>
+                          <a:schemeClr val="tx1"/>
+                        </a:solidFill>
+                        <a:latin typeface="Cambria Math" panose="02040503050406030204" pitchFamily="18" charset="0"/>
+                      </a:rPr>
+                      <m:t>𝐶𝑉𝑆𝑆𝑆</m:t>
+                    </m:r>
+                    <m:r>
+                      <a:rPr lang="en-US" sz="2400" b="0" i="1" smtClean="0">
+                        <a:solidFill>
+                          <a:schemeClr val="tx1"/>
+                        </a:solidFill>
+                        <a:latin typeface="Cambria Math" panose="02040503050406030204" pitchFamily="18" charset="0"/>
+                      </a:rPr>
+                      <m:t>=</m:t>
+                    </m:r>
+                    <m:r>
+                      <a:rPr lang="en-US" sz="2400" b="0" i="1" smtClean="0">
+                        <a:solidFill>
+                          <a:schemeClr val="tx1"/>
+                        </a:solidFill>
+                        <a:latin typeface="Cambria Math" panose="02040503050406030204" pitchFamily="18" charset="0"/>
+                      </a:rPr>
+                      <m:t>𝑙𝑜𝑤</m:t>
+                    </m:r>
+                  </m:oMath>
+                </a14:m>
+                <a:endParaRPr lang="en-CA" sz="2400" dirty="0" smtClean="0">
+                  <a:solidFill>
+                    <a:schemeClr val="tx1"/>
+                  </a:solidFill>
+                </a:endParaRPr>
+              </a:p>
+              <a:p>
+                <a:pPr>
+                  <a:lnSpc>
+                    <a:spcPct val="110000"/>
+                  </a:lnSpc>
+                  <a:spcBef>
+                    <a:spcPts val="0"/>
+                  </a:spcBef>
+                  <a:spcAft>
+                    <a:spcPts val="0"/>
+                  </a:spcAft>
+                </a:pPr>
+                <a:r>
+                  <a:rPr lang="en-US" dirty="0" smtClean="0"/>
+                  <a:t>False negative</a:t>
+                </a:r>
+              </a:p>
+              <a:p>
+                <a:pPr lvl="1">
+                  <a:lnSpc>
+                    <a:spcPct val="110000"/>
+                  </a:lnSpc>
+                  <a:spcBef>
+                    <a:spcPts val="0"/>
+                  </a:spcBef>
+                  <a:spcAft>
+                    <a:spcPts val="0"/>
+                  </a:spcAft>
+                </a:pPr>
+                <a14:m>
+                  <m:oMath xmlns:m="http://schemas.openxmlformats.org/officeDocument/2006/math">
+                    <m:d>
+                      <m:dPr>
+                        <m:ctrlPr>
+                          <a:rPr lang="en-US" sz="2400" b="0" i="1" smtClean="0">
+                            <a:solidFill>
+                              <a:schemeClr val="tx1"/>
+                            </a:solidFill>
+                            <a:latin typeface="Cambria Math" panose="02040503050406030204" pitchFamily="18" charset="0"/>
+                          </a:rPr>
+                        </m:ctrlPr>
+                      </m:dPr>
+                      <m:e>
+                        <m:r>
+                          <a:rPr lang="en-US" sz="2400" b="0" i="1" smtClean="0">
+                            <a:solidFill>
+                              <a:schemeClr val="tx1"/>
+                            </a:solidFill>
+                            <a:latin typeface="Cambria Math" panose="02040503050406030204" pitchFamily="18" charset="0"/>
+                          </a:rPr>
+                          <m:t>𝑉𝑅𝑃</m:t>
+                        </m:r>
+                        <m:r>
+                          <a:rPr lang="en-US" sz="2400" b="0" i="1" smtClean="0">
+                            <a:solidFill>
+                              <a:schemeClr val="tx1"/>
+                            </a:solidFill>
+                            <a:latin typeface="Cambria Math" panose="02040503050406030204" pitchFamily="18" charset="0"/>
+                          </a:rPr>
+                          <m:t>≥</m:t>
+                        </m:r>
+                        <m:r>
+                          <a:rPr lang="en-US" sz="2400" b="0" i="1" smtClean="0">
+                            <a:solidFill>
+                              <a:schemeClr val="tx1"/>
+                            </a:solidFill>
+                            <a:latin typeface="Cambria Math" panose="02040503050406030204" pitchFamily="18" charset="0"/>
+                          </a:rPr>
+                          <m:t>h𝑖𝑔h</m:t>
+                        </m:r>
+                        <m:r>
+                          <a:rPr lang="en-US" sz="2400" b="0" i="1" smtClean="0">
+                            <a:solidFill>
+                              <a:schemeClr val="tx1"/>
+                            </a:solidFill>
+                            <a:latin typeface="Cambria Math" panose="02040503050406030204" pitchFamily="18" charset="0"/>
+                          </a:rPr>
+                          <m:t> </m:t>
+                        </m:r>
+                        <m:r>
+                          <a:rPr lang="en-US" sz="2400" b="0" i="1" smtClean="0">
+                            <a:solidFill>
+                              <a:schemeClr val="tx1"/>
+                            </a:solidFill>
+                            <a:latin typeface="Cambria Math" panose="02040503050406030204" pitchFamily="18" charset="0"/>
+                          </a:rPr>
+                          <m:t>𝐴𝑁𝐷</m:t>
+                        </m:r>
+                        <m:r>
+                          <a:rPr lang="en-US" sz="2400" b="0" i="1" smtClean="0">
+                            <a:solidFill>
+                              <a:schemeClr val="tx1"/>
+                            </a:solidFill>
+                            <a:latin typeface="Cambria Math" panose="02040503050406030204" pitchFamily="18" charset="0"/>
+                          </a:rPr>
+                          <m:t> </m:t>
+                        </m:r>
+                        <m:r>
+                          <a:rPr lang="en-US" sz="2400" b="0" i="1" smtClean="0">
+                            <a:solidFill>
+                              <a:schemeClr val="tx1"/>
+                            </a:solidFill>
+                            <a:latin typeface="Cambria Math" panose="02040503050406030204" pitchFamily="18" charset="0"/>
+                          </a:rPr>
+                          <m:t>𝐶𝑉𝑆𝑆</m:t>
+                        </m:r>
+                        <m:r>
+                          <a:rPr lang="en-US" sz="2400" b="0" i="1" smtClean="0">
+                            <a:solidFill>
+                              <a:schemeClr val="tx1"/>
+                            </a:solidFill>
+                            <a:latin typeface="Cambria Math" panose="02040503050406030204" pitchFamily="18" charset="0"/>
+                          </a:rPr>
+                          <m:t>≤</m:t>
+                        </m:r>
+                        <m:r>
+                          <a:rPr lang="en-US" sz="2400" b="0" i="1" smtClean="0">
+                            <a:solidFill>
+                              <a:schemeClr val="tx1"/>
+                            </a:solidFill>
+                            <a:latin typeface="Cambria Math" panose="02040503050406030204" pitchFamily="18" charset="0"/>
+                          </a:rPr>
+                          <m:t>𝑚𝑒𝑑𝑖𝑢𝑚</m:t>
+                        </m:r>
+                      </m:e>
+                    </m:d>
+                    <m:r>
+                      <a:rPr lang="en-US" sz="2400" b="0" i="1" smtClean="0">
+                        <a:solidFill>
+                          <a:schemeClr val="tx1"/>
+                        </a:solidFill>
+                        <a:latin typeface="Cambria Math" panose="02040503050406030204" pitchFamily="18" charset="0"/>
+                      </a:rPr>
+                      <m:t> </m:t>
+                    </m:r>
+                  </m:oMath>
+                </a14:m>
+                <a:r>
+                  <a:rPr lang="en-US" sz="2400" b="0" i="1" dirty="0" smtClean="0">
+                    <a:solidFill>
+                      <a:schemeClr val="tx1"/>
+                    </a:solidFill>
+                    <a:latin typeface="Cambria Math" panose="02040503050406030204" pitchFamily="18" charset="0"/>
+                  </a:rPr>
+                  <a:t/>
+                </a:r>
+                <a:br>
+                  <a:rPr lang="en-US" sz="2400" b="0" i="1" dirty="0" smtClean="0">
+                    <a:solidFill>
+                      <a:schemeClr val="tx1"/>
+                    </a:solidFill>
+                    <a:latin typeface="Cambria Math" panose="02040503050406030204" pitchFamily="18" charset="0"/>
+                  </a:rPr>
+                </a:br>
+                <a:r>
+                  <a:rPr lang="en-US" sz="2400" b="0" i="1" dirty="0" smtClean="0">
+                    <a:solidFill>
+                      <a:schemeClr val="tx1"/>
+                    </a:solidFill>
+                    <a:latin typeface="Cambria Math" panose="02040503050406030204" pitchFamily="18" charset="0"/>
+                  </a:rPr>
+                  <a:t>	</a:t>
+                </a:r>
+                <a14:m>
+                  <m:oMath xmlns:m="http://schemas.openxmlformats.org/officeDocument/2006/math">
+                    <m:r>
+                      <a:rPr lang="en-US" sz="2400" b="0" i="1" smtClean="0">
+                        <a:solidFill>
+                          <a:schemeClr val="tx1"/>
+                        </a:solidFill>
+                        <a:latin typeface="Cambria Math" panose="02040503050406030204" pitchFamily="18" charset="0"/>
+                      </a:rPr>
+                      <m:t>𝑂𝑅</m:t>
+                    </m:r>
+                    <m:r>
+                      <a:rPr lang="en-US" sz="2400" b="0" i="1" smtClean="0">
+                        <a:solidFill>
+                          <a:schemeClr val="tx1"/>
+                        </a:solidFill>
+                        <a:latin typeface="Cambria Math" panose="02040503050406030204" pitchFamily="18" charset="0"/>
+                      </a:rPr>
+                      <m:t> (</m:t>
+                    </m:r>
+                    <m:r>
+                      <a:rPr lang="en-US" sz="2400" b="0" i="1" smtClean="0">
+                        <a:solidFill>
+                          <a:schemeClr val="tx1"/>
+                        </a:solidFill>
+                        <a:latin typeface="Cambria Math" panose="02040503050406030204" pitchFamily="18" charset="0"/>
+                      </a:rPr>
+                      <m:t>𝑉𝑅𝑃</m:t>
+                    </m:r>
+                    <m:r>
+                      <a:rPr lang="en-US" sz="2400" b="0" i="1" smtClean="0">
+                        <a:solidFill>
+                          <a:schemeClr val="tx1"/>
+                        </a:solidFill>
+                        <a:latin typeface="Cambria Math" panose="02040503050406030204" pitchFamily="18" charset="0"/>
+                      </a:rPr>
+                      <m:t>=</m:t>
+                    </m:r>
+                    <m:r>
+                      <a:rPr lang="en-US" sz="2400" b="0" i="1" smtClean="0">
+                        <a:solidFill>
+                          <a:schemeClr val="tx1"/>
+                        </a:solidFill>
+                        <a:latin typeface="Cambria Math" panose="02040503050406030204" pitchFamily="18" charset="0"/>
+                      </a:rPr>
+                      <m:t>𝑚𝑒𝑑𝑖𝑢𝑚</m:t>
+                    </m:r>
+                    <m:r>
+                      <a:rPr lang="en-US" sz="2400" b="0" i="1" smtClean="0">
+                        <a:solidFill>
+                          <a:schemeClr val="tx1"/>
+                        </a:solidFill>
+                        <a:latin typeface="Cambria Math" panose="02040503050406030204" pitchFamily="18" charset="0"/>
+                      </a:rPr>
+                      <m:t> </m:t>
+                    </m:r>
+                    <m:r>
+                      <a:rPr lang="en-US" sz="2400" b="0" i="1" smtClean="0">
+                        <a:solidFill>
+                          <a:schemeClr val="tx1"/>
+                        </a:solidFill>
+                        <a:latin typeface="Cambria Math" panose="02040503050406030204" pitchFamily="18" charset="0"/>
+                      </a:rPr>
+                      <m:t>𝐴𝑁𝐷</m:t>
+                    </m:r>
+                    <m:r>
+                      <a:rPr lang="en-US" sz="2400" b="0" i="1" smtClean="0">
+                        <a:solidFill>
+                          <a:schemeClr val="tx1"/>
+                        </a:solidFill>
+                        <a:latin typeface="Cambria Math" panose="02040503050406030204" pitchFamily="18" charset="0"/>
+                      </a:rPr>
+                      <m:t> </m:t>
+                    </m:r>
+                    <m:r>
+                      <a:rPr lang="en-US" sz="2400" b="0" i="1" smtClean="0">
+                        <a:solidFill>
+                          <a:schemeClr val="tx1"/>
+                        </a:solidFill>
+                        <a:latin typeface="Cambria Math" panose="02040503050406030204" pitchFamily="18" charset="0"/>
+                      </a:rPr>
+                      <m:t>𝐶𝑉𝑆𝑆</m:t>
+                    </m:r>
+                    <m:r>
+                      <a:rPr lang="en-US" sz="2400" b="0" i="1" smtClean="0">
+                        <a:solidFill>
+                          <a:schemeClr val="tx1"/>
+                        </a:solidFill>
+                        <a:latin typeface="Cambria Math" panose="02040503050406030204" pitchFamily="18" charset="0"/>
+                      </a:rPr>
+                      <m:t>=</m:t>
+                    </m:r>
+                    <m:r>
+                      <a:rPr lang="en-US" sz="2400" b="0" i="1" smtClean="0">
+                        <a:solidFill>
+                          <a:schemeClr val="tx1"/>
+                        </a:solidFill>
+                        <a:latin typeface="Cambria Math" panose="02040503050406030204" pitchFamily="18" charset="0"/>
+                      </a:rPr>
+                      <m:t>𝑙𝑜𝑤</m:t>
+                    </m:r>
+                    <m:r>
+                      <a:rPr lang="en-US" sz="2400" b="0" i="1" smtClean="0">
+                        <a:solidFill>
+                          <a:schemeClr val="tx1"/>
+                        </a:solidFill>
+                        <a:latin typeface="Cambria Math" panose="02040503050406030204" pitchFamily="18" charset="0"/>
+                      </a:rPr>
+                      <m:t>)</m:t>
+                    </m:r>
+                  </m:oMath>
+                </a14:m>
+                <a:endParaRPr lang="en-CA" sz="2400" dirty="0" smtClean="0">
+                  <a:solidFill>
+                    <a:schemeClr val="tx1"/>
+                  </a:solidFill>
+                </a:endParaRPr>
+              </a:p>
+              <a:p>
+                <a:pPr>
+                  <a:lnSpc>
+                    <a:spcPct val="110000"/>
+                  </a:lnSpc>
+                  <a:spcBef>
+                    <a:spcPts val="0"/>
+                  </a:spcBef>
+                  <a:spcAft>
+                    <a:spcPts val="0"/>
+                  </a:spcAft>
+                </a:pPr>
+                <a:r>
+                  <a:rPr lang="en-US" dirty="0" smtClean="0"/>
+                  <a:t>False positive</a:t>
+                </a:r>
+              </a:p>
+              <a:p>
+                <a:pPr lvl="1">
+                  <a:lnSpc>
+                    <a:spcPct val="110000"/>
+                  </a:lnSpc>
+                  <a:spcBef>
+                    <a:spcPts val="0"/>
+                  </a:spcBef>
+                  <a:spcAft>
+                    <a:spcPts val="0"/>
+                  </a:spcAft>
+                </a:pPr>
+                <a14:m>
+                  <m:oMath xmlns:m="http://schemas.openxmlformats.org/officeDocument/2006/math">
+                    <m:d>
+                      <m:dPr>
+                        <m:ctrlPr>
+                          <a:rPr lang="en-US" sz="2400" b="0" i="1" smtClean="0">
+                            <a:solidFill>
+                              <a:schemeClr val="tx1"/>
+                            </a:solidFill>
+                            <a:latin typeface="Cambria Math" panose="02040503050406030204" pitchFamily="18" charset="0"/>
+                          </a:rPr>
+                        </m:ctrlPr>
+                      </m:dPr>
+                      <m:e>
+                        <m:r>
+                          <a:rPr lang="en-US" sz="2400" b="0" i="1" smtClean="0">
+                            <a:solidFill>
+                              <a:schemeClr val="tx1"/>
+                            </a:solidFill>
+                            <a:latin typeface="Cambria Math" panose="02040503050406030204" pitchFamily="18" charset="0"/>
+                          </a:rPr>
+                          <m:t>𝑉𝑅𝑃</m:t>
+                        </m:r>
+                        <m:r>
+                          <a:rPr lang="en-US" sz="2400" b="0" i="1" smtClean="0">
+                            <a:solidFill>
+                              <a:schemeClr val="tx1"/>
+                            </a:solidFill>
+                            <a:latin typeface="Cambria Math" panose="02040503050406030204" pitchFamily="18" charset="0"/>
+                          </a:rPr>
+                          <m:t>≤</m:t>
+                        </m:r>
+                        <m:r>
+                          <a:rPr lang="en-US" sz="2400" b="0" i="1" smtClean="0">
+                            <a:solidFill>
+                              <a:schemeClr val="tx1"/>
+                            </a:solidFill>
+                            <a:latin typeface="Cambria Math" panose="02040503050406030204" pitchFamily="18" charset="0"/>
+                          </a:rPr>
+                          <m:t>𝑚𝑒𝑑𝑖𝑢𝑚</m:t>
+                        </m:r>
+                        <m:r>
+                          <a:rPr lang="en-US" sz="2400" b="0" i="1" smtClean="0">
+                            <a:solidFill>
+                              <a:schemeClr val="tx1"/>
+                            </a:solidFill>
+                            <a:latin typeface="Cambria Math" panose="02040503050406030204" pitchFamily="18" charset="0"/>
+                          </a:rPr>
+                          <m:t> </m:t>
+                        </m:r>
+                        <m:r>
+                          <a:rPr lang="en-US" sz="2400" b="0" i="1" smtClean="0">
+                            <a:solidFill>
+                              <a:schemeClr val="tx1"/>
+                            </a:solidFill>
+                            <a:latin typeface="Cambria Math" panose="02040503050406030204" pitchFamily="18" charset="0"/>
+                          </a:rPr>
+                          <m:t>𝐴𝑁𝐷</m:t>
+                        </m:r>
+                        <m:r>
+                          <a:rPr lang="en-US" sz="2400" b="0" i="1" smtClean="0">
+                            <a:solidFill>
+                              <a:schemeClr val="tx1"/>
+                            </a:solidFill>
+                            <a:latin typeface="Cambria Math" panose="02040503050406030204" pitchFamily="18" charset="0"/>
+                          </a:rPr>
+                          <m:t> </m:t>
+                        </m:r>
+                        <m:r>
+                          <a:rPr lang="en-US" sz="2400" b="0" i="1" smtClean="0">
+                            <a:solidFill>
+                              <a:schemeClr val="tx1"/>
+                            </a:solidFill>
+                            <a:latin typeface="Cambria Math" panose="02040503050406030204" pitchFamily="18" charset="0"/>
+                          </a:rPr>
+                          <m:t>𝐶𝑉𝑆𝑆</m:t>
+                        </m:r>
+                        <m:r>
+                          <a:rPr lang="en-US" sz="2400" b="0" i="1" smtClean="0">
+                            <a:solidFill>
+                              <a:schemeClr val="tx1"/>
+                            </a:solidFill>
+                            <a:latin typeface="Cambria Math" panose="02040503050406030204" pitchFamily="18" charset="0"/>
+                          </a:rPr>
+                          <m:t>=</m:t>
+                        </m:r>
+                        <m:r>
+                          <a:rPr lang="en-US" sz="2400" b="0" i="1" smtClean="0">
+                            <a:solidFill>
+                              <a:schemeClr val="tx1"/>
+                            </a:solidFill>
+                            <a:latin typeface="Cambria Math" panose="02040503050406030204" pitchFamily="18" charset="0"/>
+                          </a:rPr>
+                          <m:t>h𝑖𝑔h</m:t>
+                        </m:r>
+                      </m:e>
+                    </m:d>
+                  </m:oMath>
+                </a14:m>
+                <a:r>
+                  <a:rPr lang="en-US" sz="2400" b="0" i="1" dirty="0" smtClean="0">
+                    <a:solidFill>
+                      <a:schemeClr val="tx1"/>
+                    </a:solidFill>
+                    <a:latin typeface="Cambria Math" panose="02040503050406030204" pitchFamily="18" charset="0"/>
+                  </a:rPr>
+                  <a:t/>
+                </a:r>
+                <a:br>
+                  <a:rPr lang="en-US" sz="2400" b="0" i="1" dirty="0" smtClean="0">
+                    <a:solidFill>
+                      <a:schemeClr val="tx1"/>
+                    </a:solidFill>
+                    <a:latin typeface="Cambria Math" panose="02040503050406030204" pitchFamily="18" charset="0"/>
+                  </a:rPr>
+                </a:br>
+                <a:r>
+                  <a:rPr lang="en-US" sz="2400" b="0" i="1" dirty="0" smtClean="0">
+                    <a:solidFill>
+                      <a:schemeClr val="tx1"/>
+                    </a:solidFill>
+                    <a:latin typeface="Cambria Math" panose="02040503050406030204" pitchFamily="18" charset="0"/>
+                  </a:rPr>
+                  <a:t>	</a:t>
+                </a:r>
+                <a14:m>
+                  <m:oMath xmlns:m="http://schemas.openxmlformats.org/officeDocument/2006/math">
+                    <m:r>
+                      <a:rPr lang="en-US" sz="2400" b="0" i="1" smtClean="0">
+                        <a:solidFill>
+                          <a:schemeClr val="tx1"/>
+                        </a:solidFill>
+                        <a:latin typeface="Cambria Math" panose="02040503050406030204" pitchFamily="18" charset="0"/>
+                      </a:rPr>
+                      <m:t>𝑂𝑅</m:t>
+                    </m:r>
+                    <m:r>
+                      <a:rPr lang="en-US" sz="2400" b="0" i="1" smtClean="0">
+                        <a:solidFill>
+                          <a:schemeClr val="tx1"/>
+                        </a:solidFill>
+                        <a:latin typeface="Cambria Math" panose="02040503050406030204" pitchFamily="18" charset="0"/>
+                      </a:rPr>
+                      <m:t> (</m:t>
+                    </m:r>
+                    <m:r>
+                      <a:rPr lang="en-US" sz="2400" b="0" i="1" smtClean="0">
+                        <a:solidFill>
+                          <a:schemeClr val="tx1"/>
+                        </a:solidFill>
+                        <a:latin typeface="Cambria Math" panose="02040503050406030204" pitchFamily="18" charset="0"/>
+                      </a:rPr>
+                      <m:t>𝑉𝑅𝑃</m:t>
+                    </m:r>
+                    <m:r>
+                      <a:rPr lang="en-US" sz="2400" b="0" i="1" smtClean="0">
+                        <a:solidFill>
+                          <a:schemeClr val="tx1"/>
+                        </a:solidFill>
+                        <a:latin typeface="Cambria Math" panose="02040503050406030204" pitchFamily="18" charset="0"/>
+                      </a:rPr>
+                      <m:t>=</m:t>
+                    </m:r>
+                    <m:r>
+                      <a:rPr lang="en-US" sz="2400" b="0" i="1" smtClean="0">
+                        <a:solidFill>
+                          <a:schemeClr val="tx1"/>
+                        </a:solidFill>
+                        <a:latin typeface="Cambria Math" panose="02040503050406030204" pitchFamily="18" charset="0"/>
+                      </a:rPr>
+                      <m:t>𝑙𝑜𝑤</m:t>
+                    </m:r>
+                    <m:r>
+                      <a:rPr lang="en-US" sz="2400" b="0" i="1" smtClean="0">
+                        <a:solidFill>
+                          <a:schemeClr val="tx1"/>
+                        </a:solidFill>
+                        <a:latin typeface="Cambria Math" panose="02040503050406030204" pitchFamily="18" charset="0"/>
+                      </a:rPr>
+                      <m:t> </m:t>
+                    </m:r>
+                    <m:r>
+                      <a:rPr lang="en-US" sz="2400" b="0" i="1" smtClean="0">
+                        <a:solidFill>
+                          <a:schemeClr val="tx1"/>
+                        </a:solidFill>
+                        <a:latin typeface="Cambria Math" panose="02040503050406030204" pitchFamily="18" charset="0"/>
+                      </a:rPr>
+                      <m:t>𝐴𝑁𝐷</m:t>
+                    </m:r>
+                    <m:r>
+                      <a:rPr lang="en-US" sz="2400" b="0" i="1" smtClean="0">
+                        <a:solidFill>
+                          <a:schemeClr val="tx1"/>
+                        </a:solidFill>
+                        <a:latin typeface="Cambria Math" panose="02040503050406030204" pitchFamily="18" charset="0"/>
+                      </a:rPr>
+                      <m:t> </m:t>
+                    </m:r>
+                    <m:r>
+                      <a:rPr lang="en-US" sz="2400" b="0" i="1" smtClean="0">
+                        <a:solidFill>
+                          <a:schemeClr val="tx1"/>
+                        </a:solidFill>
+                        <a:latin typeface="Cambria Math" panose="02040503050406030204" pitchFamily="18" charset="0"/>
+                      </a:rPr>
+                      <m:t>𝐶𝑉𝑆𝑆</m:t>
+                    </m:r>
+                    <m:r>
+                      <a:rPr lang="en-US" sz="2400" b="0" i="1" smtClean="0">
+                        <a:solidFill>
+                          <a:schemeClr val="tx1"/>
+                        </a:solidFill>
+                        <a:latin typeface="Cambria Math" panose="02040503050406030204" pitchFamily="18" charset="0"/>
+                      </a:rPr>
+                      <m:t>≥</m:t>
+                    </m:r>
+                    <m:r>
+                      <a:rPr lang="en-US" sz="2400" b="0" i="1" smtClean="0">
+                        <a:solidFill>
+                          <a:schemeClr val="tx1"/>
+                        </a:solidFill>
+                        <a:latin typeface="Cambria Math" panose="02040503050406030204" pitchFamily="18" charset="0"/>
+                      </a:rPr>
+                      <m:t>𝑚𝑒𝑑𝑖𝑢𝑚</m:t>
+                    </m:r>
+                    <m:r>
+                      <a:rPr lang="en-US" sz="2400" b="0" i="1" smtClean="0">
+                        <a:solidFill>
+                          <a:schemeClr val="tx1"/>
+                        </a:solidFill>
+                        <a:latin typeface="Cambria Math" panose="02040503050406030204" pitchFamily="18" charset="0"/>
+                      </a:rPr>
+                      <m:t>)</m:t>
+                    </m:r>
+                  </m:oMath>
+                </a14:m>
+                <a:endParaRPr lang="en-CA" sz="2400" dirty="0">
+                  <a:solidFill>
+                    <a:schemeClr val="tx1"/>
+                  </a:solidFill>
+                </a:endParaRPr>
+              </a:p>
+            </p:txBody>
+          </p:sp>
+        </mc:Choice>
+        <mc:Fallback>
+          <p:sp>
+            <p:nvSpPr>
+              <p:cNvPr id="4" name="Content Placeholder 2"/>
+              <p:cNvSpPr txBox="1">
+                <a:spLocks noRot="1" noChangeAspect="1" noMove="1" noResize="1" noEditPoints="1" noAdjustHandles="1" noChangeArrowheads="1" noChangeShapeType="1" noTextEdit="1"/>
+              </p:cNvSpPr>
+              <p:nvPr/>
+            </p:nvSpPr>
+            <p:spPr>
+              <a:xfrm>
+                <a:off x="684212" y="2211977"/>
+                <a:ext cx="8534400" cy="4066903"/>
+              </a:xfrm>
+              <a:prstGeom prst="rect">
+                <a:avLst/>
+              </a:prstGeom>
+              <a:blipFill rotWithShape="0">
+                <a:blip r:embed="rId2"/>
+                <a:stretch>
+                  <a:fillRect l="-1000" t="-2999"/>
+                </a:stretch>
+              </a:blipFill>
+            </p:spPr>
+            <p:txBody>
+              <a:bodyPr/>
+              <a:lstStyle/>
+              <a:p>
+                <a:r>
+                  <a:rPr lang="en-CA">
+                    <a:noFill/>
+                  </a:rPr>
+                  <a:t> </a:t>
+                </a:r>
+              </a:p>
+            </p:txBody>
+          </p:sp>
+        </mc:Fallback>
+      </mc:AlternateContent>
     </p:spTree>
     <p:extLst>
       <p:ext uri="{BB962C8B-B14F-4D97-AF65-F5344CB8AC3E}">
-        <p14:creationId xmlns:p14="http://schemas.microsoft.com/office/powerpoint/2010/main" val="3291142563"/>
+        <p14:creationId xmlns:p14="http://schemas.microsoft.com/office/powerpoint/2010/main" val="818225868"/>
       </p:ext>
     </p:extLst>
   </p:cSld>
   <p:clrMapOvr>
     <a:masterClrMapping/>
   </p:clrMapOvr>
-  <p:timing>
-    <p:tnLst>
-      <p:par>
-        <p:cTn id="1" dur="indefinite" restart="never" nodeType="tmRoot"/>
-      </p:par>
-    </p:tnLst>
-  </p:timing>
 </p:sld>
 </file>
 
@@ -6310,65 +7635,420 @@
             <p:ph type="title"/>
           </p:nvPr>
         </p:nvSpPr>
-        <p:spPr>
-          <a:xfrm>
-            <a:off x="1492313" y="1394234"/>
-            <a:ext cx="9207375" cy="4037845"/>
-          </a:xfrm>
-        </p:spPr>
+        <p:spPr/>
         <p:txBody>
-          <a:bodyPr>
-            <a:normAutofit/>
-          </a:bodyPr>
+          <a:bodyPr/>
           <a:lstStyle/>
           <a:p>
             <a:r>
+              <a:rPr lang="en-US" dirty="0" err="1"/>
+              <a:t>Younis</a:t>
+            </a:r>
+            <a:r>
               <a:rPr lang="en-US" dirty="0"/>
-              <a:t>An automatic method for CVSS score prediction using vulnerabilities description</a:t>
-            </a:r>
-            <a:r>
-              <a:rPr lang="en-CA" dirty="0"/>
-              <a:t/>
-            </a:r>
-            <a:br>
-              <a:rPr lang="en-CA" dirty="0"/>
-            </a:br>
-            <a:r>
-              <a:rPr lang="en-US" dirty="0" smtClean="0"/>
-              <a:t>[</a:t>
-            </a:r>
-            <a:r>
-              <a:rPr lang="en-CA" dirty="0" smtClean="0"/>
-              <a:t>Khazaei2015</a:t>
-            </a:r>
-            <a:r>
-              <a:rPr lang="en-US" dirty="0" smtClean="0"/>
-              <a:t>]</a:t>
-            </a:r>
-            <a:br>
-              <a:rPr lang="en-US" dirty="0" smtClean="0"/>
-            </a:br>
+              <a:t> et al. - Methods</a:t>
+            </a:r>
             <a:endParaRPr lang="en-CA" dirty="0"/>
           </a:p>
         </p:txBody>
       </p:sp>
+      <mc:AlternateContent xmlns:mc="http://schemas.openxmlformats.org/markup-compatibility/2006">
+        <mc:Choice xmlns:a14="http://schemas.microsoft.com/office/drawing/2010/main" Requires="a14">
+          <p:sp>
+            <p:nvSpPr>
+              <p:cNvPr id="3" name="Content Placeholder 2"/>
+              <p:cNvSpPr>
+                <a:spLocks noGrp="1"/>
+              </p:cNvSpPr>
+              <p:nvPr>
+                <p:ph idx="1"/>
+              </p:nvPr>
+            </p:nvSpPr>
+            <p:spPr>
+              <a:xfrm>
+                <a:off x="684211" y="1782617"/>
+                <a:ext cx="9478691" cy="4116341"/>
+              </a:xfrm>
+            </p:spPr>
+            <p:txBody>
+              <a:bodyPr>
+                <a:normAutofit/>
+              </a:bodyPr>
+              <a:lstStyle/>
+              <a:p>
+                <a:pPr marL="0" indent="0">
+                  <a:buNone/>
+                </a:pPr>
+                <a:r>
+                  <a:rPr lang="en-US" dirty="0" smtClean="0"/>
+                  <a:t>Performed k-means clustering on CVSS scores</a:t>
+                </a:r>
+              </a:p>
+              <a:p>
+                <a:pPr marL="0" indent="0">
+                  <a:buNone/>
+                </a:pPr>
+                <a:r>
+                  <a:rPr lang="en-US" dirty="0" smtClean="0"/>
+                  <a:t>Sensitivity </a:t>
+                </a:r>
+                <a14:m>
+                  <m:oMath xmlns:m="http://schemas.openxmlformats.org/officeDocument/2006/math">
+                    <m:r>
+                      <a:rPr lang="en-US" b="0" i="1" smtClean="0">
+                        <a:latin typeface="Cambria Math" panose="02040503050406030204" pitchFamily="18" charset="0"/>
+                      </a:rPr>
+                      <m:t>=</m:t>
+                    </m:r>
+                    <m:f>
+                      <m:fPr>
+                        <m:ctrlPr>
+                          <a:rPr lang="en-US" b="0" i="1" smtClean="0">
+                            <a:latin typeface="Cambria Math" panose="02040503050406030204" pitchFamily="18" charset="0"/>
+                          </a:rPr>
+                        </m:ctrlPr>
+                      </m:fPr>
+                      <m:num>
+                        <m:r>
+                          <a:rPr lang="en-US" b="0" i="1" smtClean="0">
+                            <a:latin typeface="Cambria Math" panose="02040503050406030204" pitchFamily="18" charset="0"/>
+                          </a:rPr>
+                          <m:t>𝑇𝑃</m:t>
+                        </m:r>
+                      </m:num>
+                      <m:den>
+                        <m:r>
+                          <a:rPr lang="en-US" b="0" i="1" smtClean="0">
+                            <a:latin typeface="Cambria Math" panose="02040503050406030204" pitchFamily="18" charset="0"/>
+                          </a:rPr>
+                          <m:t>𝑇𝑃</m:t>
+                        </m:r>
+                        <m:r>
+                          <a:rPr lang="en-US" b="0" i="1" smtClean="0">
+                            <a:latin typeface="Cambria Math" panose="02040503050406030204" pitchFamily="18" charset="0"/>
+                          </a:rPr>
+                          <m:t>+</m:t>
+                        </m:r>
+                        <m:r>
+                          <a:rPr lang="en-US" b="0" i="1" smtClean="0">
+                            <a:latin typeface="Cambria Math" panose="02040503050406030204" pitchFamily="18" charset="0"/>
+                          </a:rPr>
+                          <m:t>𝐹𝑁</m:t>
+                        </m:r>
+                      </m:den>
+                    </m:f>
+                  </m:oMath>
+                </a14:m>
+                <a:endParaRPr lang="en-CA" dirty="0" smtClean="0"/>
+              </a:p>
+              <a:p>
+                <a:pPr marL="0" indent="0">
+                  <a:buNone/>
+                </a:pPr>
+                <a:r>
+                  <a:rPr lang="en-US" dirty="0" smtClean="0"/>
+                  <a:t>Precision </a:t>
+                </a:r>
+                <a14:m>
+                  <m:oMath xmlns:m="http://schemas.openxmlformats.org/officeDocument/2006/math">
+                    <m:r>
+                      <a:rPr lang="en-US" b="0" i="1" smtClean="0">
+                        <a:latin typeface="Cambria Math" panose="02040503050406030204" pitchFamily="18" charset="0"/>
+                      </a:rPr>
+                      <m:t>=</m:t>
+                    </m:r>
+                    <m:f>
+                      <m:fPr>
+                        <m:ctrlPr>
+                          <a:rPr lang="en-US" b="0" i="1" smtClean="0">
+                            <a:latin typeface="Cambria Math" panose="02040503050406030204" pitchFamily="18" charset="0"/>
+                          </a:rPr>
+                        </m:ctrlPr>
+                      </m:fPr>
+                      <m:num>
+                        <m:r>
+                          <a:rPr lang="en-US" b="0" i="1" smtClean="0">
+                            <a:latin typeface="Cambria Math" panose="02040503050406030204" pitchFamily="18" charset="0"/>
+                          </a:rPr>
+                          <m:t>𝑇𝑃</m:t>
+                        </m:r>
+                      </m:num>
+                      <m:den>
+                        <m:r>
+                          <a:rPr lang="en-US" b="0" i="1" smtClean="0">
+                            <a:latin typeface="Cambria Math" panose="02040503050406030204" pitchFamily="18" charset="0"/>
+                          </a:rPr>
+                          <m:t>𝑇𝑃</m:t>
+                        </m:r>
+                        <m:r>
+                          <a:rPr lang="en-US" b="0" i="1" smtClean="0">
+                            <a:latin typeface="Cambria Math" panose="02040503050406030204" pitchFamily="18" charset="0"/>
+                          </a:rPr>
+                          <m:t>+</m:t>
+                        </m:r>
+                        <m:r>
+                          <a:rPr lang="en-US" b="0" i="1" smtClean="0">
+                            <a:latin typeface="Cambria Math" panose="02040503050406030204" pitchFamily="18" charset="0"/>
+                          </a:rPr>
+                          <m:t>𝐹𝑃</m:t>
+                        </m:r>
+                      </m:den>
+                    </m:f>
+                  </m:oMath>
+                </a14:m>
+                <a:endParaRPr lang="en-US" b="0" dirty="0" smtClean="0"/>
+              </a:p>
+              <a:p>
+                <a:pPr marL="0" indent="0">
+                  <a:buNone/>
+                </a:pPr>
+                <a14:m>
+                  <m:oMath xmlns:m="http://schemas.openxmlformats.org/officeDocument/2006/math">
+                    <m:sSub>
+                      <m:sSubPr>
+                        <m:ctrlPr>
+                          <a:rPr lang="en-US" b="0" i="1" smtClean="0">
+                            <a:latin typeface="Cambria Math" panose="02040503050406030204" pitchFamily="18" charset="0"/>
+                          </a:rPr>
+                        </m:ctrlPr>
+                      </m:sSubPr>
+                      <m:e>
+                        <m:r>
+                          <a:rPr lang="en-US" b="0" i="1" smtClean="0">
+                            <a:latin typeface="Cambria Math" panose="02040503050406030204" pitchFamily="18" charset="0"/>
+                          </a:rPr>
+                          <m:t>𝐹</m:t>
+                        </m:r>
+                      </m:e>
+                      <m:sub>
+                        <m:r>
+                          <a:rPr lang="en-US" b="0" i="1" smtClean="0">
+                            <a:latin typeface="Cambria Math" panose="02040503050406030204" pitchFamily="18" charset="0"/>
+                          </a:rPr>
+                          <m:t>𝛽</m:t>
+                        </m:r>
+                      </m:sub>
+                    </m:sSub>
+                    <m:r>
+                      <a:rPr lang="en-US" b="0" i="1" smtClean="0">
+                        <a:latin typeface="Cambria Math" panose="02040503050406030204" pitchFamily="18" charset="0"/>
+                      </a:rPr>
+                      <m:t>=</m:t>
+                    </m:r>
+                    <m:f>
+                      <m:fPr>
+                        <m:ctrlPr>
+                          <a:rPr lang="en-US" b="0" i="1" smtClean="0">
+                            <a:latin typeface="Cambria Math" panose="02040503050406030204" pitchFamily="18" charset="0"/>
+                          </a:rPr>
+                        </m:ctrlPr>
+                      </m:fPr>
+                      <m:num>
+                        <m:d>
+                          <m:dPr>
+                            <m:ctrlPr>
+                              <a:rPr lang="en-US" b="0" i="1" smtClean="0">
+                                <a:latin typeface="Cambria Math" panose="02040503050406030204" pitchFamily="18" charset="0"/>
+                              </a:rPr>
+                            </m:ctrlPr>
+                          </m:dPr>
+                          <m:e>
+                            <m:r>
+                              <a:rPr lang="en-US" b="0" i="1" smtClean="0">
+                                <a:latin typeface="Cambria Math" panose="02040503050406030204" pitchFamily="18" charset="0"/>
+                              </a:rPr>
+                              <m:t>1+</m:t>
+                            </m:r>
+                            <m:sSup>
+                              <m:sSupPr>
+                                <m:ctrlPr>
+                                  <a:rPr lang="en-US" b="0" i="1" smtClean="0">
+                                    <a:latin typeface="Cambria Math" panose="02040503050406030204" pitchFamily="18" charset="0"/>
+                                  </a:rPr>
+                                </m:ctrlPr>
+                              </m:sSupPr>
+                              <m:e>
+                                <m:r>
+                                  <a:rPr lang="en-US" b="0" i="1" smtClean="0">
+                                    <a:latin typeface="Cambria Math" panose="02040503050406030204" pitchFamily="18" charset="0"/>
+                                  </a:rPr>
+                                  <m:t>𝛽</m:t>
+                                </m:r>
+                              </m:e>
+                              <m:sup>
+                                <m:r>
+                                  <a:rPr lang="en-US" b="0" i="1" smtClean="0">
+                                    <a:latin typeface="Cambria Math" panose="02040503050406030204" pitchFamily="18" charset="0"/>
+                                  </a:rPr>
+                                  <m:t>2</m:t>
+                                </m:r>
+                              </m:sup>
+                            </m:sSup>
+                          </m:e>
+                        </m:d>
+                        <m:r>
+                          <a:rPr lang="en-US" b="0" i="1" smtClean="0">
+                            <a:latin typeface="Cambria Math" panose="02040503050406030204" pitchFamily="18" charset="0"/>
+                          </a:rPr>
+                          <m:t>×</m:t>
+                        </m:r>
+                        <m:r>
+                          <a:rPr lang="en-US" b="0" i="1" smtClean="0">
+                            <a:latin typeface="Cambria Math" panose="02040503050406030204" pitchFamily="18" charset="0"/>
+                          </a:rPr>
+                          <m:t>𝑃𝑟𝑒𝑐𝑖𝑠𝑖𝑜𝑛</m:t>
+                        </m:r>
+                        <m:r>
+                          <a:rPr lang="en-US" b="0" i="1" smtClean="0">
+                            <a:latin typeface="Cambria Math" panose="02040503050406030204" pitchFamily="18" charset="0"/>
+                          </a:rPr>
+                          <m:t>×</m:t>
+                        </m:r>
+                        <m:r>
+                          <a:rPr lang="en-US" b="0" i="1" smtClean="0">
+                            <a:latin typeface="Cambria Math" panose="02040503050406030204" pitchFamily="18" charset="0"/>
+                          </a:rPr>
+                          <m:t>𝑆𝑒𝑛𝑠𝑖𝑡𝑖𝑣𝑖𝑡𝑦</m:t>
+                        </m:r>
+                      </m:num>
+                      <m:den>
+                        <m:d>
+                          <m:dPr>
+                            <m:ctrlPr>
+                              <a:rPr lang="en-US" b="0" i="1" smtClean="0">
+                                <a:latin typeface="Cambria Math" panose="02040503050406030204" pitchFamily="18" charset="0"/>
+                              </a:rPr>
+                            </m:ctrlPr>
+                          </m:dPr>
+                          <m:e>
+                            <m:sSup>
+                              <m:sSupPr>
+                                <m:ctrlPr>
+                                  <a:rPr lang="en-US" b="0" i="1" smtClean="0">
+                                    <a:latin typeface="Cambria Math" panose="02040503050406030204" pitchFamily="18" charset="0"/>
+                                  </a:rPr>
+                                </m:ctrlPr>
+                              </m:sSupPr>
+                              <m:e>
+                                <m:r>
+                                  <a:rPr lang="en-US" b="0" i="1" smtClean="0">
+                                    <a:latin typeface="Cambria Math" panose="02040503050406030204" pitchFamily="18" charset="0"/>
+                                  </a:rPr>
+                                  <m:t>𝛽</m:t>
+                                </m:r>
+                              </m:e>
+                              <m:sup>
+                                <m:r>
+                                  <a:rPr lang="en-US" b="0" i="1" smtClean="0">
+                                    <a:latin typeface="Cambria Math" panose="02040503050406030204" pitchFamily="18" charset="0"/>
+                                  </a:rPr>
+                                  <m:t>2</m:t>
+                                </m:r>
+                              </m:sup>
+                            </m:sSup>
+                            <m:r>
+                              <a:rPr lang="en-US" b="0" i="1" smtClean="0">
+                                <a:latin typeface="Cambria Math" panose="02040503050406030204" pitchFamily="18" charset="0"/>
+                              </a:rPr>
+                              <m:t>×</m:t>
+                            </m:r>
+                            <m:r>
+                              <a:rPr lang="en-US" b="0" i="1" smtClean="0">
+                                <a:latin typeface="Cambria Math" panose="02040503050406030204" pitchFamily="18" charset="0"/>
+                              </a:rPr>
+                              <m:t>𝑃𝑟𝑒𝑐𝑖𝑠𝑖𝑜𝑛</m:t>
+                            </m:r>
+                          </m:e>
+                        </m:d>
+                        <m:r>
+                          <a:rPr lang="en-US" b="0" i="1" smtClean="0">
+                            <a:latin typeface="Cambria Math" panose="02040503050406030204" pitchFamily="18" charset="0"/>
+                          </a:rPr>
+                          <m:t>+</m:t>
+                        </m:r>
+                        <m:r>
+                          <a:rPr lang="en-US" b="0" i="1" smtClean="0">
+                            <a:latin typeface="Cambria Math" panose="02040503050406030204" pitchFamily="18" charset="0"/>
+                          </a:rPr>
+                          <m:t>𝑆𝑒𝑛𝑠𝑖𝑡𝑖𝑣𝑖𝑡𝑦</m:t>
+                        </m:r>
+                      </m:den>
+                    </m:f>
+                  </m:oMath>
+                </a14:m>
+                <a:r>
+                  <a:rPr lang="en-CA" dirty="0" smtClean="0"/>
+                  <a:t> where </a:t>
+                </a:r>
+                <a14:m>
+                  <m:oMath xmlns:m="http://schemas.openxmlformats.org/officeDocument/2006/math">
+                    <m:r>
+                      <a:rPr lang="en-US" b="0" i="1" smtClean="0">
+                        <a:latin typeface="Cambria Math" panose="02040503050406030204" pitchFamily="18" charset="0"/>
+                      </a:rPr>
+                      <m:t>𝛽</m:t>
+                    </m:r>
+                    <m:r>
+                      <a:rPr lang="en-US" b="0" i="1" smtClean="0">
+                        <a:latin typeface="Cambria Math" panose="02040503050406030204" pitchFamily="18" charset="0"/>
+                      </a:rPr>
+                      <m:t>=2</m:t>
+                    </m:r>
+                  </m:oMath>
+                </a14:m>
+                <a:endParaRPr lang="en-CA" dirty="0"/>
+              </a:p>
+            </p:txBody>
+          </p:sp>
+        </mc:Choice>
+        <mc:Fallback>
+          <p:sp>
+            <p:nvSpPr>
+              <p:cNvPr id="3" name="Content Placeholder 2"/>
+              <p:cNvSpPr>
+                <a:spLocks noGrp="1" noRot="1" noChangeAspect="1" noMove="1" noResize="1" noEditPoints="1" noAdjustHandles="1" noChangeArrowheads="1" noChangeShapeType="1" noTextEdit="1"/>
+              </p:cNvSpPr>
+              <p:nvPr>
+                <p:ph idx="1"/>
+              </p:nvPr>
+            </p:nvSpPr>
+            <p:spPr>
+              <a:xfrm>
+                <a:off x="684211" y="1782617"/>
+                <a:ext cx="9478691" cy="4116341"/>
+              </a:xfrm>
+              <a:blipFill rotWithShape="0">
+                <a:blip r:embed="rId2"/>
+                <a:stretch>
+                  <a:fillRect l="-1608" t="-1923"/>
+                </a:stretch>
+              </a:blipFill>
+            </p:spPr>
+            <p:txBody>
+              <a:bodyPr/>
+              <a:lstStyle/>
+              <a:p>
+                <a:r>
+                  <a:rPr lang="en-CA">
+                    <a:noFill/>
+                  </a:rPr>
+                  <a:t> </a:t>
+                </a:r>
+              </a:p>
+            </p:txBody>
+          </p:sp>
+        </mc:Fallback>
+      </mc:AlternateContent>
     </p:spTree>
     <p:extLst>
       <p:ext uri="{BB962C8B-B14F-4D97-AF65-F5344CB8AC3E}">
-        <p14:creationId xmlns:p14="http://schemas.microsoft.com/office/powerpoint/2010/main" val="3150123797"/>
+        <p14:creationId xmlns:p14="http://schemas.microsoft.com/office/powerpoint/2010/main" val="2176169170"/>
       </p:ext>
     </p:extLst>
   </p:cSld>
   <p:clrMapOvr>
     <a:masterClrMapping/>
   </p:clrMapOvr>
-  <p:timing>
-    <p:tnLst>
-      <p:par>
-        <p:cTn id="1" dur="indefinite" restart="never" nodeType="tmRoot"/>
-      </p:par>
-    </p:tnLst>
-  </p:timing>
 </p:sld>
 </file>
 
@@ -6405,57 +8085,334 @@
           <a:lstStyle/>
           <a:p>
             <a:r>
-              <a:rPr lang="en-CA" dirty="0" err="1" smtClean="0"/>
-              <a:t>Khazaei</a:t>
-            </a:r>
-            <a:r>
-              <a:rPr lang="en-CA" dirty="0" smtClean="0"/>
-              <a:t> </a:t>
-            </a:r>
-            <a:r>
-              <a:rPr lang="en-US" dirty="0" smtClean="0"/>
-              <a:t>et al. - Motivation</a:t>
+              <a:rPr lang="en-US" dirty="0" err="1"/>
+              <a:t>Younis</a:t>
+            </a:r>
+            <a:r>
+              <a:rPr lang="en-US" dirty="0"/>
+              <a:t> et al. - Methods</a:t>
             </a:r>
             <a:endParaRPr lang="en-CA" dirty="0"/>
           </a:p>
         </p:txBody>
       </p:sp>
-      <p:sp>
-        <p:nvSpPr>
-          <p:cNvPr id="3" name="Content Placeholder 2"/>
-          <p:cNvSpPr>
-            <a:spLocks noGrp="1"/>
-          </p:cNvSpPr>
-          <p:nvPr>
-            <p:ph idx="1"/>
-          </p:nvPr>
-        </p:nvSpPr>
-        <p:spPr/>
-        <p:txBody>
-          <a:bodyPr/>
-          <a:lstStyle/>
-          <a:p>
-            <a:endParaRPr lang="en-CA"/>
-          </a:p>
-        </p:txBody>
-      </p:sp>
+      <mc:AlternateContent xmlns:mc="http://schemas.openxmlformats.org/markup-compatibility/2006">
+        <mc:Choice xmlns:a14="http://schemas.microsoft.com/office/drawing/2010/main" Requires="a14">
+          <p:sp>
+            <p:nvSpPr>
+              <p:cNvPr id="3" name="Content Placeholder 2"/>
+              <p:cNvSpPr>
+                <a:spLocks noGrp="1"/>
+              </p:cNvSpPr>
+              <p:nvPr>
+                <p:ph idx="1"/>
+              </p:nvPr>
+            </p:nvSpPr>
+            <p:spPr/>
+            <p:txBody>
+              <a:bodyPr/>
+              <a:lstStyle/>
+              <a:p>
+                <a:pPr marL="0" indent="0">
+                  <a:buNone/>
+                </a:pPr>
+                <a:r>
+                  <a:rPr lang="en-US" dirty="0" smtClean="0"/>
+                  <a:t>Also examined FP and FN rates:</a:t>
+                </a:r>
+              </a:p>
+              <a:p>
+                <a:pPr marL="457200" lvl="1" indent="0">
+                  <a:buNone/>
+                </a:pPr>
+                <a:r>
+                  <a:rPr lang="en-US" sz="2800" b="0" i="1" dirty="0" smtClean="0">
+                    <a:solidFill>
+                      <a:schemeClr val="tx1"/>
+                    </a:solidFill>
+                    <a:latin typeface="Cambria Math" panose="02040503050406030204" pitchFamily="18" charset="0"/>
+                  </a:rPr>
+                  <a:t/>
+                </a:r>
+                <a:br>
+                  <a:rPr lang="en-US" sz="2800" b="0" i="1" dirty="0" smtClean="0">
+                    <a:solidFill>
+                      <a:schemeClr val="tx1"/>
+                    </a:solidFill>
+                    <a:latin typeface="Cambria Math" panose="02040503050406030204" pitchFamily="18" charset="0"/>
+                  </a:rPr>
+                </a:br>
+                <a14:m>
+                  <m:oMath xmlns:m="http://schemas.openxmlformats.org/officeDocument/2006/math">
+                    <m:r>
+                      <a:rPr lang="en-US" sz="3200" b="0" i="1" smtClean="0">
+                        <a:solidFill>
+                          <a:schemeClr val="tx1"/>
+                        </a:solidFill>
+                        <a:latin typeface="Cambria Math" panose="02040503050406030204" pitchFamily="18" charset="0"/>
+                      </a:rPr>
+                      <m:t>𝐹𝑃</m:t>
+                    </m:r>
+                    <m:r>
+                      <a:rPr lang="en-US" sz="3200" b="0" i="1" smtClean="0">
+                        <a:solidFill>
+                          <a:schemeClr val="tx1"/>
+                        </a:solidFill>
+                        <a:latin typeface="Cambria Math" panose="02040503050406030204" pitchFamily="18" charset="0"/>
+                      </a:rPr>
+                      <m:t> </m:t>
+                    </m:r>
+                    <m:r>
+                      <a:rPr lang="en-US" sz="3200" b="0" i="1" smtClean="0">
+                        <a:solidFill>
+                          <a:schemeClr val="tx1"/>
+                        </a:solidFill>
+                        <a:latin typeface="Cambria Math" panose="02040503050406030204" pitchFamily="18" charset="0"/>
+                      </a:rPr>
+                      <m:t>𝑟𝑎𝑡𝑒</m:t>
+                    </m:r>
+                    <m:r>
+                      <a:rPr lang="en-US" sz="3200" b="0" i="1" smtClean="0">
+                        <a:solidFill>
+                          <a:schemeClr val="tx1"/>
+                        </a:solidFill>
+                        <a:latin typeface="Cambria Math" panose="02040503050406030204" pitchFamily="18" charset="0"/>
+                      </a:rPr>
+                      <m:t>=</m:t>
+                    </m:r>
+                    <m:f>
+                      <m:fPr>
+                        <m:ctrlPr>
+                          <a:rPr lang="en-US" sz="3200" b="0" i="1" smtClean="0">
+                            <a:solidFill>
+                              <a:schemeClr val="tx1"/>
+                            </a:solidFill>
+                            <a:latin typeface="Cambria Math" panose="02040503050406030204" pitchFamily="18" charset="0"/>
+                          </a:rPr>
+                        </m:ctrlPr>
+                      </m:fPr>
+                      <m:num>
+                        <m:r>
+                          <a:rPr lang="en-US" sz="3200" b="0" i="1" smtClean="0">
+                            <a:solidFill>
+                              <a:schemeClr val="tx1"/>
+                            </a:solidFill>
+                            <a:latin typeface="Cambria Math" panose="02040503050406030204" pitchFamily="18" charset="0"/>
+                          </a:rPr>
+                          <m:t>𝐹𝑃</m:t>
+                        </m:r>
+                      </m:num>
+                      <m:den>
+                        <m:r>
+                          <a:rPr lang="en-US" sz="3200" b="0" i="1" smtClean="0">
+                            <a:solidFill>
+                              <a:schemeClr val="tx1"/>
+                            </a:solidFill>
+                            <a:latin typeface="Cambria Math" panose="02040503050406030204" pitchFamily="18" charset="0"/>
+                          </a:rPr>
+                          <m:t>𝐹𝑃</m:t>
+                        </m:r>
+                        <m:r>
+                          <a:rPr lang="en-US" sz="3200" b="0" i="1" smtClean="0">
+                            <a:solidFill>
+                              <a:schemeClr val="tx1"/>
+                            </a:solidFill>
+                            <a:latin typeface="Cambria Math" panose="02040503050406030204" pitchFamily="18" charset="0"/>
+                          </a:rPr>
+                          <m:t>+</m:t>
+                        </m:r>
+                        <m:r>
+                          <a:rPr lang="en-US" sz="3200" b="0" i="1" smtClean="0">
+                            <a:solidFill>
+                              <a:schemeClr val="tx1"/>
+                            </a:solidFill>
+                            <a:latin typeface="Cambria Math" panose="02040503050406030204" pitchFamily="18" charset="0"/>
+                          </a:rPr>
+                          <m:t>𝑇𝑁</m:t>
+                        </m:r>
+                      </m:den>
+                    </m:f>
+                  </m:oMath>
+                </a14:m>
+                <a:r>
+                  <a:rPr lang="en-CA" sz="2000" dirty="0" smtClean="0"/>
+                  <a:t>	</a:t>
+                </a:r>
+              </a:p>
+              <a:p>
+                <a:pPr marL="457200" lvl="1" indent="0">
+                  <a:buNone/>
+                </a:pPr>
+                <a:r>
+                  <a:rPr lang="en-US" sz="3200" b="0" i="1" dirty="0" smtClean="0">
+                    <a:solidFill>
+                      <a:schemeClr val="tx1"/>
+                    </a:solidFill>
+                    <a:latin typeface="Cambria Math" panose="02040503050406030204" pitchFamily="18" charset="0"/>
+                  </a:rPr>
+                  <a:t/>
+                </a:r>
+                <a:br>
+                  <a:rPr lang="en-US" sz="3200" b="0" i="1" dirty="0" smtClean="0">
+                    <a:solidFill>
+                      <a:schemeClr val="tx1"/>
+                    </a:solidFill>
+                    <a:latin typeface="Cambria Math" panose="02040503050406030204" pitchFamily="18" charset="0"/>
+                  </a:rPr>
+                </a:br>
+                <a14:m>
+                  <m:oMath xmlns:m="http://schemas.openxmlformats.org/officeDocument/2006/math">
+                    <m:r>
+                      <a:rPr lang="en-US" sz="3200" b="0" i="1" smtClean="0">
+                        <a:solidFill>
+                          <a:schemeClr val="tx1"/>
+                        </a:solidFill>
+                        <a:latin typeface="Cambria Math" panose="02040503050406030204" pitchFamily="18" charset="0"/>
+                      </a:rPr>
+                      <m:t>𝐹𝑁</m:t>
+                    </m:r>
+                    <m:r>
+                      <a:rPr lang="en-US" sz="3200" b="0" i="1" smtClean="0">
+                        <a:solidFill>
+                          <a:schemeClr val="tx1"/>
+                        </a:solidFill>
+                        <a:latin typeface="Cambria Math" panose="02040503050406030204" pitchFamily="18" charset="0"/>
+                      </a:rPr>
+                      <m:t> </m:t>
+                    </m:r>
+                    <m:r>
+                      <a:rPr lang="en-US" sz="3200" b="0" i="1" smtClean="0">
+                        <a:solidFill>
+                          <a:schemeClr val="tx1"/>
+                        </a:solidFill>
+                        <a:latin typeface="Cambria Math" panose="02040503050406030204" pitchFamily="18" charset="0"/>
+                      </a:rPr>
+                      <m:t>𝑟𝑎𝑡𝑒</m:t>
+                    </m:r>
+                    <m:r>
+                      <a:rPr lang="en-US" sz="3200" b="0" i="1" smtClean="0">
+                        <a:solidFill>
+                          <a:schemeClr val="tx1"/>
+                        </a:solidFill>
+                        <a:latin typeface="Cambria Math" panose="02040503050406030204" pitchFamily="18" charset="0"/>
+                      </a:rPr>
+                      <m:t>=</m:t>
+                    </m:r>
+                    <m:f>
+                      <m:fPr>
+                        <m:ctrlPr>
+                          <a:rPr lang="en-US" sz="3200" b="0" i="1" smtClean="0">
+                            <a:solidFill>
+                              <a:schemeClr val="tx1"/>
+                            </a:solidFill>
+                            <a:latin typeface="Cambria Math" panose="02040503050406030204" pitchFamily="18" charset="0"/>
+                          </a:rPr>
+                        </m:ctrlPr>
+                      </m:fPr>
+                      <m:num>
+                        <m:r>
+                          <a:rPr lang="en-US" sz="3200" b="0" i="1" smtClean="0">
+                            <a:solidFill>
+                              <a:schemeClr val="tx1"/>
+                            </a:solidFill>
+                            <a:latin typeface="Cambria Math" panose="02040503050406030204" pitchFamily="18" charset="0"/>
+                          </a:rPr>
+                          <m:t>𝐹𝑁</m:t>
+                        </m:r>
+                      </m:num>
+                      <m:den>
+                        <m:r>
+                          <a:rPr lang="en-US" sz="3200" b="0" i="1" smtClean="0">
+                            <a:solidFill>
+                              <a:schemeClr val="tx1"/>
+                            </a:solidFill>
+                            <a:latin typeface="Cambria Math" panose="02040503050406030204" pitchFamily="18" charset="0"/>
+                          </a:rPr>
+                          <m:t>𝑇𝑃</m:t>
+                        </m:r>
+                        <m:r>
+                          <a:rPr lang="en-US" sz="3200" b="0" i="1" smtClean="0">
+                            <a:solidFill>
+                              <a:schemeClr val="tx1"/>
+                            </a:solidFill>
+                            <a:latin typeface="Cambria Math" panose="02040503050406030204" pitchFamily="18" charset="0"/>
+                          </a:rPr>
+                          <m:t>+</m:t>
+                        </m:r>
+                        <m:r>
+                          <a:rPr lang="en-US" sz="3200" b="0" i="1" smtClean="0">
+                            <a:solidFill>
+                              <a:schemeClr val="tx1"/>
+                            </a:solidFill>
+                            <a:latin typeface="Cambria Math" panose="02040503050406030204" pitchFamily="18" charset="0"/>
+                          </a:rPr>
+                          <m:t>𝐹𝑁</m:t>
+                        </m:r>
+                      </m:den>
+                    </m:f>
+                  </m:oMath>
+                </a14:m>
+                <a:r>
+                  <a:rPr lang="en-CA" sz="3200" dirty="0" smtClean="0">
+                    <a:solidFill>
+                      <a:schemeClr val="tx1"/>
+                    </a:solidFill>
+                  </a:rPr>
+                  <a:t>	</a:t>
+                </a:r>
+                <a:endParaRPr lang="en-CA" sz="3200" dirty="0">
+                  <a:solidFill>
+                    <a:schemeClr val="tx1"/>
+                  </a:solidFill>
+                </a:endParaRPr>
+              </a:p>
+            </p:txBody>
+          </p:sp>
+        </mc:Choice>
+        <mc:Fallback>
+          <p:sp>
+            <p:nvSpPr>
+              <p:cNvPr id="3" name="Content Placeholder 2"/>
+              <p:cNvSpPr>
+                <a:spLocks noGrp="1" noRot="1" noChangeAspect="1" noMove="1" noResize="1" noEditPoints="1" noAdjustHandles="1" noChangeArrowheads="1" noChangeShapeType="1" noTextEdit="1"/>
+              </p:cNvSpPr>
+              <p:nvPr>
+                <p:ph idx="1"/>
+              </p:nvPr>
+            </p:nvSpPr>
+            <p:spPr>
+              <a:blipFill rotWithShape="0">
+                <a:blip r:embed="rId2"/>
+                <a:stretch>
+                  <a:fillRect l="-1786" t="-1923"/>
+                </a:stretch>
+              </a:blipFill>
+            </p:spPr>
+            <p:txBody>
+              <a:bodyPr/>
+              <a:lstStyle/>
+              <a:p>
+                <a:r>
+                  <a:rPr lang="en-CA">
+                    <a:noFill/>
+                  </a:rPr>
+                  <a:t> </a:t>
+                </a:r>
+              </a:p>
+            </p:txBody>
+          </p:sp>
+        </mc:Fallback>
+      </mc:AlternateContent>
     </p:spTree>
     <p:extLst>
       <p:ext uri="{BB962C8B-B14F-4D97-AF65-F5344CB8AC3E}">
-        <p14:creationId xmlns:p14="http://schemas.microsoft.com/office/powerpoint/2010/main" val="1529008051"/>
+        <p14:creationId xmlns:p14="http://schemas.microsoft.com/office/powerpoint/2010/main" val="3514812235"/>
       </p:ext>
     </p:extLst>
   </p:cSld>
   <p:clrMapOvr>
     <a:masterClrMapping/>
   </p:clrMapOvr>
-  <p:timing>
-    <p:tnLst>
-      <p:par>
-        <p:cTn id="1" dur="indefinite" restart="never" nodeType="tmRoot"/>
-      </p:par>
-    </p:tnLst>
-  </p:timing>
 </p:sld>
 </file>
 
@@ -6492,16 +8449,12 @@
           <a:lstStyle/>
           <a:p>
             <a:r>
-              <a:rPr lang="en-CA" dirty="0" err="1" smtClean="0"/>
-              <a:t>Khazaei</a:t>
-            </a:r>
-            <a:r>
-              <a:rPr lang="en-CA" dirty="0" smtClean="0"/>
-              <a:t> </a:t>
+              <a:rPr lang="en-US" dirty="0" err="1" smtClean="0"/>
+              <a:t>Younis</a:t>
             </a:r>
             <a:r>
               <a:rPr lang="en-US" dirty="0" smtClean="0"/>
-              <a:t>et al. - Contribution</a:t>
+              <a:t> et al. – Results</a:t>
             </a:r>
             <a:endParaRPr lang="en-CA" dirty="0"/>
           </a:p>
@@ -6522,14 +8475,60 @@
           <a:bodyPr/>
           <a:lstStyle/>
           <a:p>
-            <a:endParaRPr lang="en-CA"/>
+            <a:r>
+              <a:rPr lang="en-US" dirty="0"/>
+              <a:t>Only 1 and 2 True Negatives for Firefox and </a:t>
+            </a:r>
+            <a:r>
+              <a:rPr lang="en-US" dirty="0" smtClean="0"/>
+              <a:t>Chrome</a:t>
+            </a:r>
+          </a:p>
+          <a:p>
+            <a:r>
+              <a:rPr lang="en-US" dirty="0" smtClean="0"/>
+              <a:t>High sensitivities and FP rates</a:t>
+            </a:r>
+          </a:p>
+          <a:p>
+            <a:pPr lvl="1"/>
+            <a:r>
+              <a:rPr lang="en-US" dirty="0" smtClean="0">
+                <a:solidFill>
+                  <a:schemeClr val="tx1"/>
+                </a:solidFill>
+              </a:rPr>
+              <a:t>Both decrease after clustering</a:t>
+            </a:r>
+          </a:p>
+          <a:p>
+            <a:r>
+              <a:rPr lang="en-US" dirty="0" smtClean="0"/>
+              <a:t>Modest Spearman correlation</a:t>
+            </a:r>
+          </a:p>
+          <a:p>
+            <a:pPr lvl="1"/>
+            <a:r>
+              <a:rPr lang="en-US" dirty="0" smtClean="0">
+                <a:solidFill>
+                  <a:schemeClr val="tx1"/>
+                </a:solidFill>
+              </a:rPr>
+              <a:t>~ 0.55 (p = 0.0001), Firefox and Chrome, before and after clustering</a:t>
+            </a:r>
+            <a:endParaRPr lang="en-US" dirty="0">
+              <a:solidFill>
+                <a:schemeClr val="tx1"/>
+              </a:solidFill>
+            </a:endParaRPr>
           </a:p>
         </p:txBody>
       </p:sp>
     </p:spTree>
     <p:extLst>
       <p:ext uri="{BB962C8B-B14F-4D97-AF65-F5344CB8AC3E}">
-        <p14:creationId xmlns:p14="http://schemas.microsoft.com/office/powerpoint/2010/main" val="128866448"/>
+        <p14:creationId xmlns:p14="http://schemas.microsoft.com/office/powerpoint/2010/main" val="1476580246"/>
       </p:ext>
     </p:extLst>
   </p:cSld>
@@ -6579,16 +8578,12 @@
           <a:lstStyle/>
           <a:p>
             <a:r>
-              <a:rPr lang="en-CA" dirty="0" err="1" smtClean="0"/>
-              <a:t>Khazaei</a:t>
-            </a:r>
-            <a:r>
-              <a:rPr lang="en-CA" dirty="0" smtClean="0"/>
-              <a:t> </a:t>
+              <a:rPr lang="en-US" dirty="0" err="1" smtClean="0"/>
+              <a:t>Younis</a:t>
             </a:r>
             <a:r>
               <a:rPr lang="en-US" dirty="0" smtClean="0"/>
-              <a:t>et al. - Methods</a:t>
+              <a:t> et al. - Discussion</a:t>
             </a:r>
             <a:endParaRPr lang="en-CA" dirty="0"/>
           </a:p>
@@ -6604,19 +8599,43 @@
             <p:ph idx="1"/>
           </p:nvPr>
         </p:nvSpPr>
-        <p:spPr/>
+        <p:spPr>
+          <a:xfrm>
+            <a:off x="684211" y="1782617"/>
+            <a:ext cx="8755879" cy="4116341"/>
+          </a:xfrm>
+        </p:spPr>
         <p:txBody>
           <a:bodyPr/>
           <a:lstStyle/>
           <a:p>
-            <a:endParaRPr lang="en-CA"/>
+            <a:r>
+              <a:rPr lang="en-US" dirty="0" smtClean="0"/>
+              <a:t>Attribute high FP rate to large number of True Negatives</a:t>
+            </a:r>
+          </a:p>
+          <a:p>
+            <a:r>
+              <a:rPr lang="en-US" dirty="0" smtClean="0"/>
+              <a:t>Reiterate low True Negative amounts</a:t>
+            </a:r>
+          </a:p>
+          <a:p>
+            <a:r>
+              <a:rPr lang="en-US" dirty="0" smtClean="0"/>
+              <a:t>Conclude from Chrome reward amounts, proving exploitability is more valuable than discovering vulnerabilities</a:t>
+            </a:r>
+            <a:endParaRPr lang="en-US" dirty="0" smtClean="0"/>
+          </a:p>
+          <a:p>
+            <a:endParaRPr lang="en-US" dirty="0" smtClean="0"/>
           </a:p>
         </p:txBody>
       </p:sp>
     </p:spTree>
     <p:extLst>
       <p:ext uri="{BB962C8B-B14F-4D97-AF65-F5344CB8AC3E}">
-        <p14:creationId xmlns:p14="http://schemas.microsoft.com/office/powerpoint/2010/main" val="2502465700"/>
+        <p14:creationId xmlns:p14="http://schemas.microsoft.com/office/powerpoint/2010/main" val="3291142563"/>
       </p:ext>
     </p:extLst>
   </p:cSld>
@@ -6666,16 +8685,16 @@
           <a:lstStyle/>
           <a:p>
             <a:r>
-              <a:rPr lang="en-CA" dirty="0" err="1" smtClean="0"/>
-              <a:t>Khazaei</a:t>
-            </a:r>
-            <a:r>
-              <a:rPr lang="en-CA" dirty="0" smtClean="0"/>
-              <a:t> </a:t>
+              <a:rPr lang="en-US" dirty="0" err="1" smtClean="0"/>
+              <a:t>Younis</a:t>
             </a:r>
             <a:r>
               <a:rPr lang="en-US" dirty="0" smtClean="0"/>
-              <a:t>et al. – Results</a:t>
+              <a:t> et al. - </a:t>
+            </a:r>
+            <a:r>
+              <a:rPr lang="en-US" dirty="0" smtClean="0"/>
+              <a:t>Commentary</a:t>
             </a:r>
             <a:endParaRPr lang="en-CA" dirty="0"/>
           </a:p>
@@ -6696,14 +8715,35 @@
           <a:bodyPr/>
           <a:lstStyle/>
           <a:p>
-            <a:endParaRPr lang="en-CA"/>
+            <a:r>
+              <a:rPr lang="en-US" dirty="0" smtClean="0"/>
+              <a:t>Results suggest CVSS is conservative in risk assessment</a:t>
+            </a:r>
+          </a:p>
+          <a:p>
+            <a:r>
+              <a:rPr lang="en-US" dirty="0" smtClean="0"/>
+              <a:t>Proving exploitability is more </a:t>
+            </a:r>
+            <a:r>
+              <a:rPr lang="en-US" i="1" dirty="0" smtClean="0"/>
+              <a:t>financially </a:t>
+            </a:r>
+            <a:r>
+              <a:rPr lang="en-US" dirty="0" smtClean="0"/>
+              <a:t>valuable</a:t>
+            </a:r>
+          </a:p>
+          <a:p>
+            <a:pPr lvl="1"/>
+            <a:endParaRPr lang="en-US" dirty="0" smtClean="0"/>
           </a:p>
         </p:txBody>
       </p:sp>
     </p:spTree>
     <p:extLst>
       <p:ext uri="{BB962C8B-B14F-4D97-AF65-F5344CB8AC3E}">
-        <p14:creationId xmlns:p14="http://schemas.microsoft.com/office/powerpoint/2010/main" val="2996095208"/>
+        <p14:creationId xmlns:p14="http://schemas.microsoft.com/office/powerpoint/2010/main" val="1204691525"/>
       </p:ext>
     </p:extLst>
   </p:cSld>
@@ -6886,50 +8926,52 @@
             <p:ph type="title"/>
           </p:nvPr>
         </p:nvSpPr>
-        <p:spPr/>
+        <p:spPr>
+          <a:xfrm>
+            <a:off x="1492313" y="1394234"/>
+            <a:ext cx="9207375" cy="4037845"/>
+          </a:xfrm>
+        </p:spPr>
         <p:txBody>
-          <a:bodyPr/>
+          <a:bodyPr>
+            <a:normAutofit/>
+          </a:bodyPr>
           <a:lstStyle/>
           <a:p>
             <a:r>
-              <a:rPr lang="en-CA" dirty="0" err="1" smtClean="0"/>
-              <a:t>Khazaei</a:t>
+              <a:rPr lang="en-US" dirty="0"/>
+              <a:t>An automatic method for CVSS score prediction using vulnerabilities description</a:t>
+            </a:r>
+            <a:r>
+              <a:rPr lang="en-CA" dirty="0"/>
+              <a:t/>
+            </a:r>
+            <a:br>
+              <a:rPr lang="en-CA" dirty="0"/>
+            </a:br>
+            <a:r>
+              <a:rPr lang="en-US" dirty="0" smtClean="0"/>
+              <a:t>[</a:t>
             </a:r>
             <a:r>
               <a:rPr lang="en-CA" dirty="0" smtClean="0"/>
-              <a:t> </a:t>
+              <a:t>Khazaei2015</a:t>
             </a:r>
             <a:r>
               <a:rPr lang="en-US" dirty="0" smtClean="0"/>
-              <a:t>et al. - Discussion</a:t>
-            </a:r>
+              <a:t>]</a:t>
+            </a:r>
+            <a:br>
+              <a:rPr lang="en-US" dirty="0" smtClean="0"/>
+            </a:br>
             <a:endParaRPr lang="en-CA" dirty="0"/>
-          </a:p>
-        </p:txBody>
-      </p:sp>
-      <p:sp>
-        <p:nvSpPr>
-          <p:cNvPr id="3" name="Content Placeholder 2"/>
-          <p:cNvSpPr>
-            <a:spLocks noGrp="1"/>
-          </p:cNvSpPr>
-          <p:nvPr>
-            <p:ph idx="1"/>
-          </p:nvPr>
-        </p:nvSpPr>
-        <p:spPr/>
-        <p:txBody>
-          <a:bodyPr/>
-          <a:lstStyle/>
-          <a:p>
-            <a:endParaRPr lang="en-CA"/>
           </a:p>
         </p:txBody>
       </p:sp>
     </p:spTree>
     <p:extLst>
       <p:ext uri="{BB962C8B-B14F-4D97-AF65-F5344CB8AC3E}">
-        <p14:creationId xmlns:p14="http://schemas.microsoft.com/office/powerpoint/2010/main" val="2350446598"/>
+        <p14:creationId xmlns:p14="http://schemas.microsoft.com/office/powerpoint/2010/main" val="3150123797"/>
       </p:ext>
     </p:extLst>
   </p:cSld>
@@ -6979,6 +9021,532 @@
           <a:lstStyle/>
           <a:p>
             <a:r>
+              <a:rPr lang="en-CA" dirty="0" err="1" smtClean="0"/>
+              <a:t>Khazaei</a:t>
+            </a:r>
+            <a:r>
+              <a:rPr lang="en-CA" dirty="0" smtClean="0"/>
+              <a:t> </a:t>
+            </a:r>
+            <a:r>
+              <a:rPr lang="en-US" dirty="0" smtClean="0"/>
+              <a:t>et al. - Motivation</a:t>
+            </a:r>
+            <a:endParaRPr lang="en-CA" dirty="0"/>
+          </a:p>
+        </p:txBody>
+      </p:sp>
+      <p:sp>
+        <p:nvSpPr>
+          <p:cNvPr id="3" name="Content Placeholder 2"/>
+          <p:cNvSpPr>
+            <a:spLocks noGrp="1"/>
+          </p:cNvSpPr>
+          <p:nvPr>
+            <p:ph idx="1"/>
+          </p:nvPr>
+        </p:nvSpPr>
+        <p:spPr/>
+        <p:txBody>
+          <a:bodyPr/>
+          <a:lstStyle/>
+          <a:p>
+            <a:endParaRPr lang="en-CA"/>
+          </a:p>
+        </p:txBody>
+      </p:sp>
+    </p:spTree>
+    <p:extLst>
+      <p:ext uri="{BB962C8B-B14F-4D97-AF65-F5344CB8AC3E}">
+        <p14:creationId xmlns:p14="http://schemas.microsoft.com/office/powerpoint/2010/main" val="1529008051"/>
+      </p:ext>
+    </p:extLst>
+  </p:cSld>
+  <p:clrMapOvr>
+    <a:masterClrMapping/>
+  </p:clrMapOvr>
+  <p:timing>
+    <p:tnLst>
+      <p:par>
+        <p:cTn id="1" dur="indefinite" restart="never" nodeType="tmRoot"/>
+      </p:par>
+    </p:tnLst>
+  </p:timing>
+</p:sld>
+</file>
+
+<file path=ppt/slides/slide22.xml><?xml version="1.0" encoding="utf-8"?>
+<p:sld xmlns:a="http://schemas.openxmlformats.org/drawingml/2006/main" xmlns:r="http://schemas.openxmlformats.org/officeDocument/2006/relationships" xmlns:p="http://schemas.openxmlformats.org/presentationml/2006/main">
+  <p:cSld>
+    <p:spTree>
+      <p:nvGrpSpPr>
+        <p:cNvPr id="1" name=""/>
+        <p:cNvGrpSpPr/>
+        <p:nvPr/>
+      </p:nvGrpSpPr>
+      <p:grpSpPr>
+        <a:xfrm>
+          <a:off x="0" y="0"/>
+          <a:ext cx="0" cy="0"/>
+          <a:chOff x="0" y="0"/>
+          <a:chExt cx="0" cy="0"/>
+        </a:xfrm>
+      </p:grpSpPr>
+      <p:sp>
+        <p:nvSpPr>
+          <p:cNvPr id="2" name="Title 1"/>
+          <p:cNvSpPr>
+            <a:spLocks noGrp="1"/>
+          </p:cNvSpPr>
+          <p:nvPr>
+            <p:ph type="title"/>
+          </p:nvPr>
+        </p:nvSpPr>
+        <p:spPr/>
+        <p:txBody>
+          <a:bodyPr/>
+          <a:lstStyle/>
+          <a:p>
+            <a:r>
+              <a:rPr lang="en-CA" dirty="0" err="1" smtClean="0"/>
+              <a:t>Khazaei</a:t>
+            </a:r>
+            <a:r>
+              <a:rPr lang="en-CA" dirty="0" smtClean="0"/>
+              <a:t> </a:t>
+            </a:r>
+            <a:r>
+              <a:rPr lang="en-US" dirty="0" smtClean="0"/>
+              <a:t>et al. - Contribution</a:t>
+            </a:r>
+            <a:endParaRPr lang="en-CA" dirty="0"/>
+          </a:p>
+        </p:txBody>
+      </p:sp>
+      <p:sp>
+        <p:nvSpPr>
+          <p:cNvPr id="3" name="Content Placeholder 2"/>
+          <p:cNvSpPr>
+            <a:spLocks noGrp="1"/>
+          </p:cNvSpPr>
+          <p:nvPr>
+            <p:ph idx="1"/>
+          </p:nvPr>
+        </p:nvSpPr>
+        <p:spPr/>
+        <p:txBody>
+          <a:bodyPr/>
+          <a:lstStyle/>
+          <a:p>
+            <a:endParaRPr lang="en-CA"/>
+          </a:p>
+        </p:txBody>
+      </p:sp>
+    </p:spTree>
+    <p:extLst>
+      <p:ext uri="{BB962C8B-B14F-4D97-AF65-F5344CB8AC3E}">
+        <p14:creationId xmlns:p14="http://schemas.microsoft.com/office/powerpoint/2010/main" val="128866448"/>
+      </p:ext>
+    </p:extLst>
+  </p:cSld>
+  <p:clrMapOvr>
+    <a:masterClrMapping/>
+  </p:clrMapOvr>
+  <p:timing>
+    <p:tnLst>
+      <p:par>
+        <p:cTn id="1" dur="indefinite" restart="never" nodeType="tmRoot"/>
+      </p:par>
+    </p:tnLst>
+  </p:timing>
+</p:sld>
+</file>
+
+<file path=ppt/slides/slide23.xml><?xml version="1.0" encoding="utf-8"?>
+<p:sld xmlns:a="http://schemas.openxmlformats.org/drawingml/2006/main" xmlns:r="http://schemas.openxmlformats.org/officeDocument/2006/relationships" xmlns:p="http://schemas.openxmlformats.org/presentationml/2006/main">
+  <p:cSld>
+    <p:spTree>
+      <p:nvGrpSpPr>
+        <p:cNvPr id="1" name=""/>
+        <p:cNvGrpSpPr/>
+        <p:nvPr/>
+      </p:nvGrpSpPr>
+      <p:grpSpPr>
+        <a:xfrm>
+          <a:off x="0" y="0"/>
+          <a:ext cx="0" cy="0"/>
+          <a:chOff x="0" y="0"/>
+          <a:chExt cx="0" cy="0"/>
+        </a:xfrm>
+      </p:grpSpPr>
+      <p:sp>
+        <p:nvSpPr>
+          <p:cNvPr id="2" name="Title 1"/>
+          <p:cNvSpPr>
+            <a:spLocks noGrp="1"/>
+          </p:cNvSpPr>
+          <p:nvPr>
+            <p:ph type="title"/>
+          </p:nvPr>
+        </p:nvSpPr>
+        <p:spPr/>
+        <p:txBody>
+          <a:bodyPr/>
+          <a:lstStyle/>
+          <a:p>
+            <a:r>
+              <a:rPr lang="en-CA" dirty="0" err="1" smtClean="0"/>
+              <a:t>Khazaei</a:t>
+            </a:r>
+            <a:r>
+              <a:rPr lang="en-CA" dirty="0" smtClean="0"/>
+              <a:t> </a:t>
+            </a:r>
+            <a:r>
+              <a:rPr lang="en-US" dirty="0" smtClean="0"/>
+              <a:t>et al. - Methods</a:t>
+            </a:r>
+            <a:endParaRPr lang="en-CA" dirty="0"/>
+          </a:p>
+        </p:txBody>
+      </p:sp>
+      <p:sp>
+        <p:nvSpPr>
+          <p:cNvPr id="3" name="Content Placeholder 2"/>
+          <p:cNvSpPr>
+            <a:spLocks noGrp="1"/>
+          </p:cNvSpPr>
+          <p:nvPr>
+            <p:ph idx="1"/>
+          </p:nvPr>
+        </p:nvSpPr>
+        <p:spPr/>
+        <p:txBody>
+          <a:bodyPr/>
+          <a:lstStyle/>
+          <a:p>
+            <a:endParaRPr lang="en-CA"/>
+          </a:p>
+        </p:txBody>
+      </p:sp>
+    </p:spTree>
+    <p:extLst>
+      <p:ext uri="{BB962C8B-B14F-4D97-AF65-F5344CB8AC3E}">
+        <p14:creationId xmlns:p14="http://schemas.microsoft.com/office/powerpoint/2010/main" val="2502465700"/>
+      </p:ext>
+    </p:extLst>
+  </p:cSld>
+  <p:clrMapOvr>
+    <a:masterClrMapping/>
+  </p:clrMapOvr>
+  <p:timing>
+    <p:tnLst>
+      <p:par>
+        <p:cTn id="1" dur="indefinite" restart="never" nodeType="tmRoot"/>
+      </p:par>
+    </p:tnLst>
+  </p:timing>
+</p:sld>
+</file>
+
+<file path=ppt/slides/slide24.xml><?xml version="1.0" encoding="utf-8"?>
+<p:sld xmlns:a="http://schemas.openxmlformats.org/drawingml/2006/main" xmlns:r="http://schemas.openxmlformats.org/officeDocument/2006/relationships" xmlns:p="http://schemas.openxmlformats.org/presentationml/2006/main">
+  <p:cSld>
+    <p:spTree>
+      <p:nvGrpSpPr>
+        <p:cNvPr id="1" name=""/>
+        <p:cNvGrpSpPr/>
+        <p:nvPr/>
+      </p:nvGrpSpPr>
+      <p:grpSpPr>
+        <a:xfrm>
+          <a:off x="0" y="0"/>
+          <a:ext cx="0" cy="0"/>
+          <a:chOff x="0" y="0"/>
+          <a:chExt cx="0" cy="0"/>
+        </a:xfrm>
+      </p:grpSpPr>
+      <p:sp>
+        <p:nvSpPr>
+          <p:cNvPr id="2" name="Title 1"/>
+          <p:cNvSpPr>
+            <a:spLocks noGrp="1"/>
+          </p:cNvSpPr>
+          <p:nvPr>
+            <p:ph type="title"/>
+          </p:nvPr>
+        </p:nvSpPr>
+        <p:spPr/>
+        <p:txBody>
+          <a:bodyPr/>
+          <a:lstStyle/>
+          <a:p>
+            <a:r>
+              <a:rPr lang="en-CA" dirty="0" err="1" smtClean="0"/>
+              <a:t>Khazaei</a:t>
+            </a:r>
+            <a:r>
+              <a:rPr lang="en-CA" dirty="0" smtClean="0"/>
+              <a:t> </a:t>
+            </a:r>
+            <a:r>
+              <a:rPr lang="en-US" dirty="0" smtClean="0"/>
+              <a:t>et al. – Results</a:t>
+            </a:r>
+            <a:endParaRPr lang="en-CA" dirty="0"/>
+          </a:p>
+        </p:txBody>
+      </p:sp>
+      <p:sp>
+        <p:nvSpPr>
+          <p:cNvPr id="3" name="Content Placeholder 2"/>
+          <p:cNvSpPr>
+            <a:spLocks noGrp="1"/>
+          </p:cNvSpPr>
+          <p:nvPr>
+            <p:ph idx="1"/>
+          </p:nvPr>
+        </p:nvSpPr>
+        <p:spPr/>
+        <p:txBody>
+          <a:bodyPr/>
+          <a:lstStyle/>
+          <a:p>
+            <a:endParaRPr lang="en-CA"/>
+          </a:p>
+        </p:txBody>
+      </p:sp>
+    </p:spTree>
+    <p:extLst>
+      <p:ext uri="{BB962C8B-B14F-4D97-AF65-F5344CB8AC3E}">
+        <p14:creationId xmlns:p14="http://schemas.microsoft.com/office/powerpoint/2010/main" val="2996095208"/>
+      </p:ext>
+    </p:extLst>
+  </p:cSld>
+  <p:clrMapOvr>
+    <a:masterClrMapping/>
+  </p:clrMapOvr>
+  <p:timing>
+    <p:tnLst>
+      <p:par>
+        <p:cTn id="1" dur="indefinite" restart="never" nodeType="tmRoot"/>
+      </p:par>
+    </p:tnLst>
+  </p:timing>
+</p:sld>
+</file>
+
+<file path=ppt/slides/slide25.xml><?xml version="1.0" encoding="utf-8"?>
+<p:sld xmlns:a="http://schemas.openxmlformats.org/drawingml/2006/main" xmlns:r="http://schemas.openxmlformats.org/officeDocument/2006/relationships" xmlns:p="http://schemas.openxmlformats.org/presentationml/2006/main">
+  <p:cSld>
+    <p:spTree>
+      <p:nvGrpSpPr>
+        <p:cNvPr id="1" name=""/>
+        <p:cNvGrpSpPr/>
+        <p:nvPr/>
+      </p:nvGrpSpPr>
+      <p:grpSpPr>
+        <a:xfrm>
+          <a:off x="0" y="0"/>
+          <a:ext cx="0" cy="0"/>
+          <a:chOff x="0" y="0"/>
+          <a:chExt cx="0" cy="0"/>
+        </a:xfrm>
+      </p:grpSpPr>
+      <p:sp>
+        <p:nvSpPr>
+          <p:cNvPr id="2" name="Title 1"/>
+          <p:cNvSpPr>
+            <a:spLocks noGrp="1"/>
+          </p:cNvSpPr>
+          <p:nvPr>
+            <p:ph type="title"/>
+          </p:nvPr>
+        </p:nvSpPr>
+        <p:spPr/>
+        <p:txBody>
+          <a:bodyPr/>
+          <a:lstStyle/>
+          <a:p>
+            <a:r>
+              <a:rPr lang="en-CA" dirty="0" err="1" smtClean="0"/>
+              <a:t>Khazaei</a:t>
+            </a:r>
+            <a:r>
+              <a:rPr lang="en-CA" dirty="0" smtClean="0"/>
+              <a:t> </a:t>
+            </a:r>
+            <a:r>
+              <a:rPr lang="en-US" dirty="0" smtClean="0"/>
+              <a:t>et al. - Discussion</a:t>
+            </a:r>
+            <a:endParaRPr lang="en-CA" dirty="0"/>
+          </a:p>
+        </p:txBody>
+      </p:sp>
+      <p:sp>
+        <p:nvSpPr>
+          <p:cNvPr id="3" name="Content Placeholder 2"/>
+          <p:cNvSpPr>
+            <a:spLocks noGrp="1"/>
+          </p:cNvSpPr>
+          <p:nvPr>
+            <p:ph idx="1"/>
+          </p:nvPr>
+        </p:nvSpPr>
+        <p:spPr/>
+        <p:txBody>
+          <a:bodyPr/>
+          <a:lstStyle/>
+          <a:p>
+            <a:endParaRPr lang="en-CA"/>
+          </a:p>
+        </p:txBody>
+      </p:sp>
+    </p:spTree>
+    <p:extLst>
+      <p:ext uri="{BB962C8B-B14F-4D97-AF65-F5344CB8AC3E}">
+        <p14:creationId xmlns:p14="http://schemas.microsoft.com/office/powerpoint/2010/main" val="2350446598"/>
+      </p:ext>
+    </p:extLst>
+  </p:cSld>
+  <p:clrMapOvr>
+    <a:masterClrMapping/>
+  </p:clrMapOvr>
+  <p:timing>
+    <p:tnLst>
+      <p:par>
+        <p:cTn id="1" dur="indefinite" restart="never" nodeType="tmRoot"/>
+      </p:par>
+    </p:tnLst>
+  </p:timing>
+</p:sld>
+</file>
+
+<file path=ppt/slides/slide26.xml><?xml version="1.0" encoding="utf-8"?>
+<p:sld xmlns:a="http://schemas.openxmlformats.org/drawingml/2006/main" xmlns:r="http://schemas.openxmlformats.org/officeDocument/2006/relationships" xmlns:p="http://schemas.openxmlformats.org/presentationml/2006/main">
+  <p:cSld>
+    <p:spTree>
+      <p:nvGrpSpPr>
+        <p:cNvPr id="1" name=""/>
+        <p:cNvGrpSpPr/>
+        <p:nvPr/>
+      </p:nvGrpSpPr>
+      <p:grpSpPr>
+        <a:xfrm>
+          <a:off x="0" y="0"/>
+          <a:ext cx="0" cy="0"/>
+          <a:chOff x="0" y="0"/>
+          <a:chExt cx="0" cy="0"/>
+        </a:xfrm>
+      </p:grpSpPr>
+      <p:sp>
+        <p:nvSpPr>
+          <p:cNvPr id="2" name="Title 1"/>
+          <p:cNvSpPr>
+            <a:spLocks noGrp="1"/>
+          </p:cNvSpPr>
+          <p:nvPr>
+            <p:ph type="title"/>
+          </p:nvPr>
+        </p:nvSpPr>
+        <p:spPr/>
+        <p:txBody>
+          <a:bodyPr/>
+          <a:lstStyle/>
+          <a:p>
+            <a:r>
+              <a:rPr lang="en-CA" dirty="0" err="1"/>
+              <a:t>Khazaei</a:t>
+            </a:r>
+            <a:r>
+              <a:rPr lang="en-CA" dirty="0"/>
+              <a:t> </a:t>
+            </a:r>
+            <a:r>
+              <a:rPr lang="en-US" dirty="0" smtClean="0"/>
+              <a:t>et </a:t>
+            </a:r>
+            <a:r>
+              <a:rPr lang="en-US" dirty="0" smtClean="0"/>
+              <a:t>al. - Discussion</a:t>
+            </a:r>
+            <a:endParaRPr lang="en-CA" dirty="0"/>
+          </a:p>
+        </p:txBody>
+      </p:sp>
+      <p:sp>
+        <p:nvSpPr>
+          <p:cNvPr id="3" name="Content Placeholder 2"/>
+          <p:cNvSpPr>
+            <a:spLocks noGrp="1"/>
+          </p:cNvSpPr>
+          <p:nvPr>
+            <p:ph idx="1"/>
+          </p:nvPr>
+        </p:nvSpPr>
+        <p:spPr/>
+        <p:txBody>
+          <a:bodyPr/>
+          <a:lstStyle/>
+          <a:p>
+            <a:endParaRPr lang="en-US" dirty="0" smtClean="0"/>
+          </a:p>
+        </p:txBody>
+      </p:sp>
+    </p:spTree>
+    <p:extLst>
+      <p:ext uri="{BB962C8B-B14F-4D97-AF65-F5344CB8AC3E}">
+        <p14:creationId xmlns:p14="http://schemas.microsoft.com/office/powerpoint/2010/main" val="4164120507"/>
+      </p:ext>
+    </p:extLst>
+  </p:cSld>
+  <p:clrMapOvr>
+    <a:masterClrMapping/>
+  </p:clrMapOvr>
+  <p:timing>
+    <p:tnLst>
+      <p:par>
+        <p:cTn id="1" dur="indefinite" restart="never" nodeType="tmRoot"/>
+      </p:par>
+    </p:tnLst>
+  </p:timing>
+</p:sld>
+</file>
+
+<file path=ppt/slides/slide27.xml><?xml version="1.0" encoding="utf-8"?>
+<p:sld xmlns:a="http://schemas.openxmlformats.org/drawingml/2006/main" xmlns:r="http://schemas.openxmlformats.org/officeDocument/2006/relationships" xmlns:p="http://schemas.openxmlformats.org/presentationml/2006/main">
+  <p:cSld>
+    <p:spTree>
+      <p:nvGrpSpPr>
+        <p:cNvPr id="1" name=""/>
+        <p:cNvGrpSpPr/>
+        <p:nvPr/>
+      </p:nvGrpSpPr>
+      <p:grpSpPr>
+        <a:xfrm>
+          <a:off x="0" y="0"/>
+          <a:ext cx="0" cy="0"/>
+          <a:chOff x="0" y="0"/>
+          <a:chExt cx="0" cy="0"/>
+        </a:xfrm>
+      </p:grpSpPr>
+      <p:sp>
+        <p:nvSpPr>
+          <p:cNvPr id="2" name="Title 1"/>
+          <p:cNvSpPr>
+            <a:spLocks noGrp="1"/>
+          </p:cNvSpPr>
+          <p:nvPr>
+            <p:ph type="title"/>
+          </p:nvPr>
+        </p:nvSpPr>
+        <p:spPr/>
+        <p:txBody>
+          <a:bodyPr/>
+          <a:lstStyle/>
+          <a:p>
+            <a:r>
               <a:rPr lang="en-US" dirty="0" smtClean="0"/>
               <a:t>References</a:t>
             </a:r>
@@ -7025,7 +9593,7 @@
 </p:sld>
 </file>
 
-<file path=ppt/slides/slide22.xml><?xml version="1.0" encoding="utf-8"?>
+<file path=ppt/slides/slide28.xml><?xml version="1.0" encoding="utf-8"?>
 <p:sld xmlns:a="http://schemas.openxmlformats.org/drawingml/2006/main" xmlns:r="http://schemas.openxmlformats.org/officeDocument/2006/relationships" xmlns:p="http://schemas.openxmlformats.org/presentationml/2006/main">
   <p:cSld>
     <p:spTree>
@@ -7167,7 +9735,7 @@
 </p:sld>
 </file>
 
-<file path=ppt/slides/slide23.xml><?xml version="1.0" encoding="utf-8"?>
+<file path=ppt/slides/slide29.xml><?xml version="1.0" encoding="utf-8"?>
 <p:sld xmlns:a="http://schemas.openxmlformats.org/drawingml/2006/main" xmlns:r="http://schemas.openxmlformats.org/officeDocument/2006/relationships" xmlns:p="http://schemas.openxmlformats.org/presentationml/2006/main">
   <p:cSld>
     <p:spTree>
@@ -8219,7 +10787,7 @@
 </p:sld>
 </file>
 
-<file path=ppt/slides/slide24.xml><?xml version="1.0" encoding="utf-8"?>
+<file path=ppt/slides/slide3.xml><?xml version="1.0" encoding="utf-8"?>
 <p:sld xmlns:a="http://schemas.openxmlformats.org/drawingml/2006/main" xmlns:r="http://schemas.openxmlformats.org/officeDocument/2006/relationships" xmlns:p="http://schemas.openxmlformats.org/presentationml/2006/main">
   <p:cSld>
     <p:spTree>
@@ -8253,6 +10821,111 @@
           <a:p>
             <a:r>
               <a:rPr lang="en-US" dirty="0" smtClean="0"/>
+              <a:t>Background - </a:t>
+            </a:r>
+            <a:r>
+              <a:rPr lang="en-US" dirty="0" err="1" smtClean="0"/>
+              <a:t>cvss</a:t>
+            </a:r>
+            <a:endParaRPr lang="en-CA" dirty="0"/>
+          </a:p>
+        </p:txBody>
+      </p:sp>
+      <p:sp>
+        <p:nvSpPr>
+          <p:cNvPr id="3" name="Content Placeholder 2"/>
+          <p:cNvSpPr>
+            <a:spLocks noGrp="1"/>
+          </p:cNvSpPr>
+          <p:nvPr>
+            <p:ph idx="1"/>
+          </p:nvPr>
+        </p:nvSpPr>
+        <p:spPr/>
+        <p:txBody>
+          <a:bodyPr anchor="t"/>
+          <a:lstStyle/>
+          <a:p>
+            <a:r>
+              <a:rPr lang="en-US" dirty="0" smtClean="0"/>
+              <a:t>Common vulnerability scoring system</a:t>
+            </a:r>
+          </a:p>
+          <a:p>
+            <a:r>
+              <a:rPr lang="en-US" dirty="0" smtClean="0"/>
+              <a:t>Quantitative vulnerability risk score</a:t>
+            </a:r>
+          </a:p>
+          <a:p>
+            <a:r>
+              <a:rPr lang="en-US" dirty="0" smtClean="0"/>
+              <a:t>Metrics mostly qualitative</a:t>
+            </a:r>
+          </a:p>
+          <a:p>
+            <a:r>
+              <a:rPr lang="en-US" dirty="0" smtClean="0"/>
+              <a:t>Can help prioritize vulnerability addressment</a:t>
+            </a:r>
+            <a:endParaRPr lang="en-CA" dirty="0"/>
+          </a:p>
+        </p:txBody>
+      </p:sp>
+    </p:spTree>
+    <p:extLst>
+      <p:ext uri="{BB962C8B-B14F-4D97-AF65-F5344CB8AC3E}">
+        <p14:creationId xmlns:p14="http://schemas.microsoft.com/office/powerpoint/2010/main" val="320445518"/>
+      </p:ext>
+    </p:extLst>
+  </p:cSld>
+  <p:clrMapOvr>
+    <a:masterClrMapping/>
+  </p:clrMapOvr>
+  <p:timing>
+    <p:tnLst>
+      <p:par>
+        <p:cTn id="1" dur="indefinite" restart="never" nodeType="tmRoot"/>
+      </p:par>
+    </p:tnLst>
+  </p:timing>
+</p:sld>
+</file>
+
+<file path=ppt/slides/slide30.xml><?xml version="1.0" encoding="utf-8"?>
+<p:sld xmlns:a="http://schemas.openxmlformats.org/drawingml/2006/main" xmlns:r="http://schemas.openxmlformats.org/officeDocument/2006/relationships" xmlns:p="http://schemas.openxmlformats.org/presentationml/2006/main">
+  <p:cSld>
+    <p:spTree>
+      <p:nvGrpSpPr>
+        <p:cNvPr id="1" name=""/>
+        <p:cNvGrpSpPr/>
+        <p:nvPr/>
+      </p:nvGrpSpPr>
+      <p:grpSpPr>
+        <a:xfrm>
+          <a:off x="0" y="0"/>
+          <a:ext cx="0" cy="0"/>
+          <a:chOff x="0" y="0"/>
+          <a:chExt cx="0" cy="0"/>
+        </a:xfrm>
+      </p:grpSpPr>
+      <p:sp>
+        <p:nvSpPr>
+          <p:cNvPr id="2" name="Title 1"/>
+          <p:cNvSpPr>
+            <a:spLocks noGrp="1"/>
+          </p:cNvSpPr>
+          <p:nvPr>
+            <p:ph type="title"/>
+          </p:nvPr>
+        </p:nvSpPr>
+        <p:spPr/>
+        <p:txBody>
+          <a:bodyPr/>
+          <a:lstStyle/>
+          <a:p>
+            <a:r>
+              <a:rPr lang="en-US" dirty="0" smtClean="0"/>
               <a:t>CVSS Temporal score</a:t>
             </a:r>
             <a:endParaRPr lang="en-CA" dirty="0"/>
@@ -8741,7 +11414,7 @@
 </p:sld>
 </file>
 
-<file path=ppt/slides/slide25.xml><?xml version="1.0" encoding="utf-8"?>
+<file path=ppt/slides/slide31.xml><?xml version="1.0" encoding="utf-8"?>
 <p:sld xmlns:a="http://schemas.openxmlformats.org/drawingml/2006/main" xmlns:r="http://schemas.openxmlformats.org/officeDocument/2006/relationships" xmlns:p="http://schemas.openxmlformats.org/presentationml/2006/main">
   <p:cSld>
     <p:spTree>
@@ -9827,111 +12500,6 @@
     <p:extLst>
       <p:ext uri="{BB962C8B-B14F-4D97-AF65-F5344CB8AC3E}">
         <p14:creationId xmlns:p14="http://schemas.microsoft.com/office/powerpoint/2010/main" val="2550503629"/>
-      </p:ext>
-    </p:extLst>
-  </p:cSld>
-  <p:clrMapOvr>
-    <a:masterClrMapping/>
-  </p:clrMapOvr>
-  <p:timing>
-    <p:tnLst>
-      <p:par>
-        <p:cTn id="1" dur="indefinite" restart="never" nodeType="tmRoot"/>
-      </p:par>
-    </p:tnLst>
-  </p:timing>
-</p:sld>
-</file>
-
-<file path=ppt/slides/slide3.xml><?xml version="1.0" encoding="utf-8"?>
-<p:sld xmlns:a="http://schemas.openxmlformats.org/drawingml/2006/main" xmlns:r="http://schemas.openxmlformats.org/officeDocument/2006/relationships" xmlns:p="http://schemas.openxmlformats.org/presentationml/2006/main">
-  <p:cSld>
-    <p:spTree>
-      <p:nvGrpSpPr>
-        <p:cNvPr id="1" name=""/>
-        <p:cNvGrpSpPr/>
-        <p:nvPr/>
-      </p:nvGrpSpPr>
-      <p:grpSpPr>
-        <a:xfrm>
-          <a:off x="0" y="0"/>
-          <a:ext cx="0" cy="0"/>
-          <a:chOff x="0" y="0"/>
-          <a:chExt cx="0" cy="0"/>
-        </a:xfrm>
-      </p:grpSpPr>
-      <p:sp>
-        <p:nvSpPr>
-          <p:cNvPr id="2" name="Title 1"/>
-          <p:cNvSpPr>
-            <a:spLocks noGrp="1"/>
-          </p:cNvSpPr>
-          <p:nvPr>
-            <p:ph type="title"/>
-          </p:nvPr>
-        </p:nvSpPr>
-        <p:spPr/>
-        <p:txBody>
-          <a:bodyPr/>
-          <a:lstStyle/>
-          <a:p>
-            <a:r>
-              <a:rPr lang="en-US" dirty="0" smtClean="0"/>
-              <a:t>Background - </a:t>
-            </a:r>
-            <a:r>
-              <a:rPr lang="en-US" dirty="0" err="1" smtClean="0"/>
-              <a:t>cvss</a:t>
-            </a:r>
-            <a:endParaRPr lang="en-CA" dirty="0"/>
-          </a:p>
-        </p:txBody>
-      </p:sp>
-      <p:sp>
-        <p:nvSpPr>
-          <p:cNvPr id="3" name="Content Placeholder 2"/>
-          <p:cNvSpPr>
-            <a:spLocks noGrp="1"/>
-          </p:cNvSpPr>
-          <p:nvPr>
-            <p:ph idx="1"/>
-          </p:nvPr>
-        </p:nvSpPr>
-        <p:spPr/>
-        <p:txBody>
-          <a:bodyPr anchor="t"/>
-          <a:lstStyle/>
-          <a:p>
-            <a:r>
-              <a:rPr lang="en-US" dirty="0" smtClean="0"/>
-              <a:t>Common vulnerability scoring system</a:t>
-            </a:r>
-          </a:p>
-          <a:p>
-            <a:r>
-              <a:rPr lang="en-US" dirty="0" smtClean="0"/>
-              <a:t>Quantitative vulnerability risk score</a:t>
-            </a:r>
-          </a:p>
-          <a:p>
-            <a:r>
-              <a:rPr lang="en-US" dirty="0" smtClean="0"/>
-              <a:t>Metrics mostly qualitative</a:t>
-            </a:r>
-          </a:p>
-          <a:p>
-            <a:r>
-              <a:rPr lang="en-US" dirty="0" smtClean="0"/>
-              <a:t>Can help prioritize vulnerability addressment</a:t>
-            </a:r>
-            <a:endParaRPr lang="en-CA" dirty="0"/>
-          </a:p>
-        </p:txBody>
-      </p:sp>
-    </p:spTree>
-    <p:extLst>
-      <p:ext uri="{BB962C8B-B14F-4D97-AF65-F5344CB8AC3E}">
-        <p14:creationId xmlns:p14="http://schemas.microsoft.com/office/powerpoint/2010/main" val="320445518"/>
       </p:ext>
     </p:extLst>
   </p:cSld>

</xml_diff>

<commit_message>
CISC 848 - Background presentation slides basically finished, maybe add wrap-up slide
</commit_message>
<xml_diff>
--- a/CISC848/BackgroundPentation/ChurchCISC848Background.pptx
+++ b/CISC848/BackgroundPentation/ChurchCISC848Background.pptx
@@ -7,35 +7,40 @@
   <p:sldIdLst>
     <p:sldId id="256" r:id="rId2"/>
     <p:sldId id="257" r:id="rId3"/>
-    <p:sldId id="259" r:id="rId4"/>
-    <p:sldId id="263" r:id="rId5"/>
-    <p:sldId id="264" r:id="rId6"/>
-    <p:sldId id="265" r:id="rId7"/>
-    <p:sldId id="266" r:id="rId8"/>
-    <p:sldId id="272" r:id="rId9"/>
-    <p:sldId id="273" r:id="rId10"/>
-    <p:sldId id="275" r:id="rId11"/>
-    <p:sldId id="276" r:id="rId12"/>
-    <p:sldId id="290" r:id="rId13"/>
-    <p:sldId id="277" r:id="rId14"/>
-    <p:sldId id="285" r:id="rId15"/>
-    <p:sldId id="286" r:id="rId16"/>
-    <p:sldId id="287" r:id="rId17"/>
-    <p:sldId id="278" r:id="rId18"/>
-    <p:sldId id="279" r:id="rId19"/>
-    <p:sldId id="288" r:id="rId20"/>
-    <p:sldId id="274" r:id="rId21"/>
-    <p:sldId id="280" r:id="rId22"/>
-    <p:sldId id="281" r:id="rId23"/>
-    <p:sldId id="282" r:id="rId24"/>
-    <p:sldId id="283" r:id="rId25"/>
-    <p:sldId id="284" r:id="rId26"/>
-    <p:sldId id="289" r:id="rId27"/>
-    <p:sldId id="262" r:id="rId28"/>
-    <p:sldId id="267" r:id="rId29"/>
-    <p:sldId id="268" r:id="rId30"/>
-    <p:sldId id="270" r:id="rId31"/>
-    <p:sldId id="271" r:id="rId32"/>
+    <p:sldId id="295" r:id="rId4"/>
+    <p:sldId id="259" r:id="rId5"/>
+    <p:sldId id="263" r:id="rId6"/>
+    <p:sldId id="264" r:id="rId7"/>
+    <p:sldId id="265" r:id="rId8"/>
+    <p:sldId id="266" r:id="rId9"/>
+    <p:sldId id="272" r:id="rId10"/>
+    <p:sldId id="273" r:id="rId11"/>
+    <p:sldId id="275" r:id="rId12"/>
+    <p:sldId id="276" r:id="rId13"/>
+    <p:sldId id="290" r:id="rId14"/>
+    <p:sldId id="277" r:id="rId15"/>
+    <p:sldId id="285" r:id="rId16"/>
+    <p:sldId id="286" r:id="rId17"/>
+    <p:sldId id="287" r:id="rId18"/>
+    <p:sldId id="278" r:id="rId19"/>
+    <p:sldId id="279" r:id="rId20"/>
+    <p:sldId id="288" r:id="rId21"/>
+    <p:sldId id="274" r:id="rId22"/>
+    <p:sldId id="280" r:id="rId23"/>
+    <p:sldId id="281" r:id="rId24"/>
+    <p:sldId id="291" r:id="rId25"/>
+    <p:sldId id="282" r:id="rId26"/>
+    <p:sldId id="292" r:id="rId27"/>
+    <p:sldId id="293" r:id="rId28"/>
+    <p:sldId id="294" r:id="rId29"/>
+    <p:sldId id="283" r:id="rId30"/>
+    <p:sldId id="284" r:id="rId31"/>
+    <p:sldId id="289" r:id="rId32"/>
+    <p:sldId id="262" r:id="rId33"/>
+    <p:sldId id="267" r:id="rId34"/>
+    <p:sldId id="268" r:id="rId35"/>
+    <p:sldId id="270" r:id="rId36"/>
+    <p:sldId id="271" r:id="rId37"/>
   </p:sldIdLst>
   <p:sldSz cx="12192000" cy="6858000"/>
   <p:notesSz cx="6858000" cy="9144000"/>
@@ -5876,54 +5881,25 @@
             <p:ph type="title"/>
           </p:nvPr>
         </p:nvSpPr>
-        <p:spPr/>
+        <p:spPr>
+          <a:xfrm>
+            <a:off x="1492313" y="1394234"/>
+            <a:ext cx="9207375" cy="4037845"/>
+          </a:xfrm>
+        </p:spPr>
         <p:txBody>
-          <a:bodyPr/>
+          <a:bodyPr>
+            <a:normAutofit/>
+          </a:bodyPr>
           <a:lstStyle/>
           <a:p>
             <a:r>
-              <a:rPr lang="en-US" dirty="0" err="1" smtClean="0"/>
-              <a:t>Younis</a:t>
-            </a:r>
-            <a:r>
               <a:rPr lang="en-US" dirty="0" smtClean="0"/>
-              <a:t> et al. - Motivation</a:t>
-            </a:r>
-            <a:endParaRPr lang="en-CA" dirty="0"/>
-          </a:p>
-        </p:txBody>
-      </p:sp>
-      <p:sp>
-        <p:nvSpPr>
-          <p:cNvPr id="3" name="Content Placeholder 2"/>
-          <p:cNvSpPr>
-            <a:spLocks noGrp="1"/>
-          </p:cNvSpPr>
-          <p:nvPr>
-            <p:ph idx="1"/>
-          </p:nvPr>
-        </p:nvSpPr>
-        <p:spPr/>
-        <p:txBody>
-          <a:bodyPr/>
-          <a:lstStyle/>
-          <a:p>
-            <a:r>
+              <a:t>Evaluating CVSS Base Score Using Vulnerability Rewards Program [Younis2016]</a:t>
+            </a:r>
+            <a:br>
               <a:rPr lang="en-US" dirty="0" smtClean="0"/>
-              <a:t>Important to prioritize vulnerabilities</a:t>
-            </a:r>
-          </a:p>
-          <a:p>
-            <a:r>
-              <a:rPr lang="en-US" dirty="0" smtClean="0"/>
-              <a:t>CVSS not always correlated with actual exploits and attacks</a:t>
-            </a:r>
-          </a:p>
-          <a:p>
-            <a:r>
-              <a:rPr lang="en-US" dirty="0" smtClean="0"/>
-              <a:t>Alternative CVSS validation methods possible</a:t>
-            </a:r>
+            </a:br>
             <a:endParaRPr lang="en-CA" dirty="0"/>
           </a:p>
         </p:txBody>
@@ -5931,7 +5907,7 @@
     </p:spTree>
     <p:extLst>
       <p:ext uri="{BB962C8B-B14F-4D97-AF65-F5344CB8AC3E}">
-        <p14:creationId xmlns:p14="http://schemas.microsoft.com/office/powerpoint/2010/main" val="3655371612"/>
+        <p14:creationId xmlns:p14="http://schemas.microsoft.com/office/powerpoint/2010/main" val="58341561"/>
       </p:ext>
     </p:extLst>
   </p:cSld>
@@ -5986,7 +5962,7 @@
             </a:r>
             <a:r>
               <a:rPr lang="en-US" dirty="0" smtClean="0"/>
-              <a:t> et al. - Contribution</a:t>
+              <a:t> et al. - Motivation</a:t>
             </a:r>
             <a:endParaRPr lang="en-CA" dirty="0"/>
           </a:p>
@@ -6002,19 +5978,26 @@
             <p:ph idx="1"/>
           </p:nvPr>
         </p:nvSpPr>
-        <p:spPr>
-          <a:xfrm>
-            <a:off x="684212" y="1782617"/>
-            <a:ext cx="8858140" cy="4116341"/>
-          </a:xfrm>
-        </p:spPr>
+        <p:spPr/>
         <p:txBody>
           <a:bodyPr/>
           <a:lstStyle/>
           <a:p>
             <a:r>
               <a:rPr lang="en-US" dirty="0" smtClean="0"/>
-              <a:t>Seek to validate CVSS base scores using Vulnerability Reward Program (VRP) scales</a:t>
+              <a:t>Important to prioritize vulnerabilities</a:t>
+            </a:r>
+          </a:p>
+          <a:p>
+            <a:r>
+              <a:rPr lang="en-US" dirty="0" smtClean="0"/>
+              <a:t>CVSS not always correlated with actual exploits and attacks</a:t>
+            </a:r>
+          </a:p>
+          <a:p>
+            <a:r>
+              <a:rPr lang="en-US" dirty="0" smtClean="0"/>
+              <a:t>Alternative CVSS validation methods possible</a:t>
             </a:r>
             <a:endParaRPr lang="en-CA" dirty="0"/>
           </a:p>
@@ -6023,7 +6006,7 @@
     </p:spTree>
     <p:extLst>
       <p:ext uri="{BB962C8B-B14F-4D97-AF65-F5344CB8AC3E}">
-        <p14:creationId xmlns:p14="http://schemas.microsoft.com/office/powerpoint/2010/main" val="3630578609"/>
+        <p14:creationId xmlns:p14="http://schemas.microsoft.com/office/powerpoint/2010/main" val="3655371612"/>
       </p:ext>
     </p:extLst>
   </p:cSld>
@@ -6078,11 +6061,99 @@
             </a:r>
             <a:r>
               <a:rPr lang="en-US" dirty="0" smtClean="0"/>
-              <a:t> et al. - </a:t>
-            </a:r>
+              <a:t> et al. - Contribution</a:t>
+            </a:r>
+            <a:endParaRPr lang="en-CA" dirty="0"/>
+          </a:p>
+        </p:txBody>
+      </p:sp>
+      <p:sp>
+        <p:nvSpPr>
+          <p:cNvPr id="3" name="Content Placeholder 2"/>
+          <p:cNvSpPr>
+            <a:spLocks noGrp="1"/>
+          </p:cNvSpPr>
+          <p:nvPr>
+            <p:ph idx="1"/>
+          </p:nvPr>
+        </p:nvSpPr>
+        <p:spPr>
+          <a:xfrm>
+            <a:off x="684212" y="1782617"/>
+            <a:ext cx="8858140" cy="4116341"/>
+          </a:xfrm>
+        </p:spPr>
+        <p:txBody>
+          <a:bodyPr/>
+          <a:lstStyle/>
+          <a:p>
             <a:r>
               <a:rPr lang="en-US" dirty="0" smtClean="0"/>
-              <a:t>Data</a:t>
+              <a:t>Seek to validate CVSS base scores using Vulnerability Reward Program (VRP) scales</a:t>
+            </a:r>
+            <a:endParaRPr lang="en-CA" dirty="0"/>
+          </a:p>
+        </p:txBody>
+      </p:sp>
+    </p:spTree>
+    <p:extLst>
+      <p:ext uri="{BB962C8B-B14F-4D97-AF65-F5344CB8AC3E}">
+        <p14:creationId xmlns:p14="http://schemas.microsoft.com/office/powerpoint/2010/main" val="3630578609"/>
+      </p:ext>
+    </p:extLst>
+  </p:cSld>
+  <p:clrMapOvr>
+    <a:masterClrMapping/>
+  </p:clrMapOvr>
+  <p:timing>
+    <p:tnLst>
+      <p:par>
+        <p:cTn id="1" dur="indefinite" restart="never" nodeType="tmRoot"/>
+      </p:par>
+    </p:tnLst>
+  </p:timing>
+</p:sld>
+</file>
+
+<file path=ppt/slides/slide13.xml><?xml version="1.0" encoding="utf-8"?>
+<p:sld xmlns:a="http://schemas.openxmlformats.org/drawingml/2006/main" xmlns:r="http://schemas.openxmlformats.org/officeDocument/2006/relationships" xmlns:p="http://schemas.openxmlformats.org/presentationml/2006/main">
+  <p:cSld>
+    <p:spTree>
+      <p:nvGrpSpPr>
+        <p:cNvPr id="1" name=""/>
+        <p:cNvGrpSpPr/>
+        <p:nvPr/>
+      </p:nvGrpSpPr>
+      <p:grpSpPr>
+        <a:xfrm>
+          <a:off x="0" y="0"/>
+          <a:ext cx="0" cy="0"/>
+          <a:chOff x="0" y="0"/>
+          <a:chExt cx="0" cy="0"/>
+        </a:xfrm>
+      </p:grpSpPr>
+      <p:sp>
+        <p:nvSpPr>
+          <p:cNvPr id="2" name="Title 1"/>
+          <p:cNvSpPr>
+            <a:spLocks noGrp="1"/>
+          </p:cNvSpPr>
+          <p:nvPr>
+            <p:ph type="title"/>
+          </p:nvPr>
+        </p:nvSpPr>
+        <p:spPr/>
+        <p:txBody>
+          <a:bodyPr/>
+          <a:lstStyle/>
+          <a:p>
+            <a:r>
+              <a:rPr lang="en-US" dirty="0" err="1" smtClean="0"/>
+              <a:t>Younis</a:t>
+            </a:r>
+            <a:r>
+              <a:rPr lang="en-US" dirty="0" smtClean="0"/>
+              <a:t> et al. - Data</a:t>
             </a:r>
             <a:endParaRPr lang="en-CA" dirty="0"/>
           </a:p>
@@ -6148,7 +6219,7 @@
 </p:sld>
 </file>
 
-<file path=ppt/slides/slide13.xml><?xml version="1.0" encoding="utf-8"?>
+<file path=ppt/slides/slide14.xml><?xml version="1.0" encoding="utf-8"?>
 <p:sld xmlns:a="http://schemas.openxmlformats.org/drawingml/2006/main" xmlns:r="http://schemas.openxmlformats.org/officeDocument/2006/relationships" xmlns:p="http://schemas.openxmlformats.org/presentationml/2006/main">
   <p:cSld>
     <p:spTree>
@@ -6469,7 +6540,7 @@
 </p:sld>
 </file>
 
-<file path=ppt/slides/slide14.xml><?xml version="1.0" encoding="utf-8"?>
+<file path=ppt/slides/slide15.xml><?xml version="1.0" encoding="utf-8"?>
 <p:sld xmlns:a="http://schemas.openxmlformats.org/drawingml/2006/main" xmlns:r="http://schemas.openxmlformats.org/officeDocument/2006/relationships" xmlns:p="http://schemas.openxmlformats.org/presentationml/2006/main">
   <p:cSld>
     <p:spTree>
@@ -6544,8 +6615,8 @@
           </a:p>
         </p:txBody>
       </p:sp>
-      <mc:AlternateContent xmlns:mc="http://schemas.openxmlformats.org/markup-compatibility/2006">
-        <mc:Choice xmlns:a14="http://schemas.microsoft.com/office/drawing/2010/main" Requires="a14">
+      <mc:AlternateContent xmlns:mc="http://schemas.openxmlformats.org/markup-compatibility/2006" xmlns:a14="http://schemas.microsoft.com/office/drawing/2010/main">
+        <mc:Choice Requires="a14">
           <p:sp>
             <p:nvSpPr>
               <p:cNvPr id="4" name="Content Placeholder 2"/>
@@ -7556,7 +7627,7 @@
             </p:txBody>
           </p:sp>
         </mc:Choice>
-        <mc:Fallback>
+        <mc:Fallback xmlns="">
           <p:sp>
             <p:nvSpPr>
               <p:cNvPr id="4" name="Content Placeholder 2"/>
@@ -7608,7 +7679,7 @@
 </p:sld>
 </file>
 
-<file path=ppt/slides/slide15.xml><?xml version="1.0" encoding="utf-8"?>
+<file path=ppt/slides/slide16.xml><?xml version="1.0" encoding="utf-8"?>
 <p:sld xmlns:a="http://schemas.openxmlformats.org/drawingml/2006/main" xmlns:r="http://schemas.openxmlformats.org/officeDocument/2006/relationships" xmlns:p="http://schemas.openxmlformats.org/presentationml/2006/main">
   <p:cSld>
     <p:spTree>
@@ -7652,8 +7723,8 @@
           </a:p>
         </p:txBody>
       </p:sp>
-      <mc:AlternateContent xmlns:mc="http://schemas.openxmlformats.org/markup-compatibility/2006">
-        <mc:Choice xmlns:a14="http://schemas.microsoft.com/office/drawing/2010/main" Requires="a14">
+      <mc:AlternateContent xmlns:mc="http://schemas.openxmlformats.org/markup-compatibility/2006" xmlns:a14="http://schemas.microsoft.com/office/drawing/2010/main">
+        <mc:Choice Requires="a14">
           <p:sp>
             <p:nvSpPr>
               <p:cNvPr id="3" name="Content Placeholder 2"/>
@@ -8001,7 +8072,7 @@
             </p:txBody>
           </p:sp>
         </mc:Choice>
-        <mc:Fallback>
+        <mc:Fallback xmlns="">
           <p:sp>
             <p:nvSpPr>
               <p:cNvPr id="3" name="Content Placeholder 2"/>
@@ -8052,7 +8123,7 @@
 </p:sld>
 </file>
 
-<file path=ppt/slides/slide16.xml><?xml version="1.0" encoding="utf-8"?>
+<file path=ppt/slides/slide17.xml><?xml version="1.0" encoding="utf-8"?>
 <p:sld xmlns:a="http://schemas.openxmlformats.org/drawingml/2006/main" xmlns:r="http://schemas.openxmlformats.org/officeDocument/2006/relationships" xmlns:p="http://schemas.openxmlformats.org/presentationml/2006/main">
   <p:cSld>
     <p:spTree>
@@ -8096,8 +8167,8 @@
           </a:p>
         </p:txBody>
       </p:sp>
-      <mc:AlternateContent xmlns:mc="http://schemas.openxmlformats.org/markup-compatibility/2006">
-        <mc:Choice xmlns:a14="http://schemas.microsoft.com/office/drawing/2010/main" Requires="a14">
+      <mc:AlternateContent xmlns:mc="http://schemas.openxmlformats.org/markup-compatibility/2006" xmlns:a14="http://schemas.microsoft.com/office/drawing/2010/main">
+        <mc:Choice Requires="a14">
           <p:sp>
             <p:nvSpPr>
               <p:cNvPr id="3" name="Content Placeholder 2"/>
@@ -8369,7 +8440,7 @@
             </p:txBody>
           </p:sp>
         </mc:Choice>
-        <mc:Fallback>
+        <mc:Fallback xmlns="">
           <p:sp>
             <p:nvSpPr>
               <p:cNvPr id="3" name="Content Placeholder 2"/>
@@ -8416,135 +8487,6 @@
 </p:sld>
 </file>
 
-<file path=ppt/slides/slide17.xml><?xml version="1.0" encoding="utf-8"?>
-<p:sld xmlns:a="http://schemas.openxmlformats.org/drawingml/2006/main" xmlns:r="http://schemas.openxmlformats.org/officeDocument/2006/relationships" xmlns:p="http://schemas.openxmlformats.org/presentationml/2006/main">
-  <p:cSld>
-    <p:spTree>
-      <p:nvGrpSpPr>
-        <p:cNvPr id="1" name=""/>
-        <p:cNvGrpSpPr/>
-        <p:nvPr/>
-      </p:nvGrpSpPr>
-      <p:grpSpPr>
-        <a:xfrm>
-          <a:off x="0" y="0"/>
-          <a:ext cx="0" cy="0"/>
-          <a:chOff x="0" y="0"/>
-          <a:chExt cx="0" cy="0"/>
-        </a:xfrm>
-      </p:grpSpPr>
-      <p:sp>
-        <p:nvSpPr>
-          <p:cNvPr id="2" name="Title 1"/>
-          <p:cNvSpPr>
-            <a:spLocks noGrp="1"/>
-          </p:cNvSpPr>
-          <p:nvPr>
-            <p:ph type="title"/>
-          </p:nvPr>
-        </p:nvSpPr>
-        <p:spPr/>
-        <p:txBody>
-          <a:bodyPr/>
-          <a:lstStyle/>
-          <a:p>
-            <a:r>
-              <a:rPr lang="en-US" dirty="0" err="1" smtClean="0"/>
-              <a:t>Younis</a:t>
-            </a:r>
-            <a:r>
-              <a:rPr lang="en-US" dirty="0" smtClean="0"/>
-              <a:t> et al. – Results</a:t>
-            </a:r>
-            <a:endParaRPr lang="en-CA" dirty="0"/>
-          </a:p>
-        </p:txBody>
-      </p:sp>
-      <p:sp>
-        <p:nvSpPr>
-          <p:cNvPr id="3" name="Content Placeholder 2"/>
-          <p:cNvSpPr>
-            <a:spLocks noGrp="1"/>
-          </p:cNvSpPr>
-          <p:nvPr>
-            <p:ph idx="1"/>
-          </p:nvPr>
-        </p:nvSpPr>
-        <p:spPr/>
-        <p:txBody>
-          <a:bodyPr/>
-          <a:lstStyle/>
-          <a:p>
-            <a:r>
-              <a:rPr lang="en-US" dirty="0"/>
-              <a:t>Only 1 and 2 True Negatives for Firefox and </a:t>
-            </a:r>
-            <a:r>
-              <a:rPr lang="en-US" dirty="0" smtClean="0"/>
-              <a:t>Chrome</a:t>
-            </a:r>
-          </a:p>
-          <a:p>
-            <a:r>
-              <a:rPr lang="en-US" dirty="0" smtClean="0"/>
-              <a:t>High sensitivities and FP rates</a:t>
-            </a:r>
-          </a:p>
-          <a:p>
-            <a:pPr lvl="1"/>
-            <a:r>
-              <a:rPr lang="en-US" dirty="0" smtClean="0">
-                <a:solidFill>
-                  <a:schemeClr val="tx1"/>
-                </a:solidFill>
-              </a:rPr>
-              <a:t>Both decrease after clustering</a:t>
-            </a:r>
-          </a:p>
-          <a:p>
-            <a:r>
-              <a:rPr lang="en-US" dirty="0" smtClean="0"/>
-              <a:t>Modest Spearman correlation</a:t>
-            </a:r>
-          </a:p>
-          <a:p>
-            <a:pPr lvl="1"/>
-            <a:r>
-              <a:rPr lang="en-US" dirty="0" smtClean="0">
-                <a:solidFill>
-                  <a:schemeClr val="tx1"/>
-                </a:solidFill>
-              </a:rPr>
-              <a:t>~ 0.55 (p = 0.0001), Firefox and Chrome, before and after clustering</a:t>
-            </a:r>
-            <a:endParaRPr lang="en-US" dirty="0">
-              <a:solidFill>
-                <a:schemeClr val="tx1"/>
-              </a:solidFill>
-            </a:endParaRPr>
-          </a:p>
-        </p:txBody>
-      </p:sp>
-    </p:spTree>
-    <p:extLst>
-      <p:ext uri="{BB962C8B-B14F-4D97-AF65-F5344CB8AC3E}">
-        <p14:creationId xmlns:p14="http://schemas.microsoft.com/office/powerpoint/2010/main" val="1476580246"/>
-      </p:ext>
-    </p:extLst>
-  </p:cSld>
-  <p:clrMapOvr>
-    <a:masterClrMapping/>
-  </p:clrMapOvr>
-  <p:timing>
-    <p:tnLst>
-      <p:par>
-        <p:cTn id="1" dur="indefinite" restart="never" nodeType="tmRoot"/>
-      </p:par>
-    </p:tnLst>
-  </p:timing>
-</p:sld>
-</file>
-
 <file path=ppt/slides/slide18.xml><?xml version="1.0" encoding="utf-8"?>
 <p:sld xmlns:a="http://schemas.openxmlformats.org/drawingml/2006/main" xmlns:r="http://schemas.openxmlformats.org/officeDocument/2006/relationships" xmlns:p="http://schemas.openxmlformats.org/presentationml/2006/main">
   <p:cSld>
@@ -8583,7 +8525,7 @@
             </a:r>
             <a:r>
               <a:rPr lang="en-US" dirty="0" smtClean="0"/>
-              <a:t> et al. - Discussion</a:t>
+              <a:t> et al. – Results</a:t>
             </a:r>
             <a:endParaRPr lang="en-CA" dirty="0"/>
           </a:p>
@@ -8599,43 +8541,65 @@
             <p:ph idx="1"/>
           </p:nvPr>
         </p:nvSpPr>
-        <p:spPr>
-          <a:xfrm>
-            <a:off x="684211" y="1782617"/>
-            <a:ext cx="8755879" cy="4116341"/>
-          </a:xfrm>
-        </p:spPr>
+        <p:spPr/>
         <p:txBody>
           <a:bodyPr/>
           <a:lstStyle/>
           <a:p>
             <a:r>
+              <a:rPr lang="en-US" dirty="0"/>
+              <a:t>Only 1 and 2 True Negatives for Firefox and </a:t>
+            </a:r>
+            <a:r>
               <a:rPr lang="en-US" dirty="0" smtClean="0"/>
-              <a:t>Attribute high FP rate to large number of True Negatives</a:t>
+              <a:t>Chrome</a:t>
             </a:r>
           </a:p>
           <a:p>
             <a:r>
               <a:rPr lang="en-US" dirty="0" smtClean="0"/>
-              <a:t>Reiterate low True Negative amounts</a:t>
+              <a:t>High sensitivities and FP rates</a:t>
+            </a:r>
+          </a:p>
+          <a:p>
+            <a:pPr lvl="1"/>
+            <a:r>
+              <a:rPr lang="en-US" dirty="0" smtClean="0">
+                <a:solidFill>
+                  <a:schemeClr val="tx1"/>
+                </a:solidFill>
+              </a:rPr>
+              <a:t>Both decrease after clustering</a:t>
             </a:r>
           </a:p>
           <a:p>
             <a:r>
               <a:rPr lang="en-US" dirty="0" smtClean="0"/>
-              <a:t>Conclude from Chrome reward amounts, proving exploitability is more valuable than discovering vulnerabilities</a:t>
-            </a:r>
-            <a:endParaRPr lang="en-US" dirty="0" smtClean="0"/>
-          </a:p>
-          <a:p>
-            <a:endParaRPr lang="en-US" dirty="0" smtClean="0"/>
+              <a:t>Modest Spearman correlation</a:t>
+            </a:r>
+          </a:p>
+          <a:p>
+            <a:pPr lvl="1"/>
+            <a:r>
+              <a:rPr lang="en-US" dirty="0" smtClean="0">
+                <a:solidFill>
+                  <a:schemeClr val="tx1"/>
+                </a:solidFill>
+              </a:rPr>
+              <a:t>~ 0.55 (p = 0.0001), Firefox and Chrome, before and after clustering</a:t>
+            </a:r>
+            <a:endParaRPr lang="en-US" dirty="0">
+              <a:solidFill>
+                <a:schemeClr val="tx1"/>
+              </a:solidFill>
+            </a:endParaRPr>
           </a:p>
         </p:txBody>
       </p:sp>
     </p:spTree>
     <p:extLst>
       <p:ext uri="{BB962C8B-B14F-4D97-AF65-F5344CB8AC3E}">
-        <p14:creationId xmlns:p14="http://schemas.microsoft.com/office/powerpoint/2010/main" val="3291142563"/>
+        <p14:creationId xmlns:p14="http://schemas.microsoft.com/office/powerpoint/2010/main" val="1476580246"/>
       </p:ext>
     </p:extLst>
   </p:cSld>
@@ -8690,11 +8654,7 @@
             </a:r>
             <a:r>
               <a:rPr lang="en-US" dirty="0" smtClean="0"/>
-              <a:t> et al. - </a:t>
-            </a:r>
-            <a:r>
-              <a:rPr lang="en-US" dirty="0" smtClean="0"/>
-              <a:t>Commentary</a:t>
+              <a:t> et al. - Discussion</a:t>
             </a:r>
             <a:endParaRPr lang="en-CA" dirty="0"/>
           </a:p>
@@ -8710,32 +8670,34 @@
             <p:ph idx="1"/>
           </p:nvPr>
         </p:nvSpPr>
-        <p:spPr/>
+        <p:spPr>
+          <a:xfrm>
+            <a:off x="684211" y="1782617"/>
+            <a:ext cx="8755879" cy="4116341"/>
+          </a:xfrm>
+        </p:spPr>
         <p:txBody>
           <a:bodyPr/>
           <a:lstStyle/>
           <a:p>
             <a:r>
               <a:rPr lang="en-US" dirty="0" smtClean="0"/>
-              <a:t>Results suggest CVSS is conservative in risk assessment</a:t>
+              <a:t>Attribute high FP rate to large number of True Negatives</a:t>
             </a:r>
           </a:p>
           <a:p>
             <a:r>
               <a:rPr lang="en-US" dirty="0" smtClean="0"/>
-              <a:t>Proving exploitability is more </a:t>
-            </a:r>
-            <a:r>
-              <a:rPr lang="en-US" i="1" dirty="0" smtClean="0"/>
-              <a:t>financially </a:t>
-            </a:r>
+              <a:t>Reiterate low True Negative amounts</a:t>
+            </a:r>
+          </a:p>
+          <a:p>
             <a:r>
               <a:rPr lang="en-US" dirty="0" smtClean="0"/>
-              <a:t>valuable</a:t>
-            </a:r>
-          </a:p>
-          <a:p>
-            <a:pPr lvl="1"/>
+              <a:t>Conclude from Chrome reward amounts, proving exploitability is more valuable than discovering vulnerabilities</a:t>
+            </a:r>
+          </a:p>
+          <a:p>
             <a:endParaRPr lang="en-US" dirty="0" smtClean="0"/>
           </a:p>
         </p:txBody>
@@ -8743,7 +8705,7 @@
     </p:spTree>
     <p:extLst>
       <p:ext uri="{BB962C8B-B14F-4D97-AF65-F5344CB8AC3E}">
-        <p14:creationId xmlns:p14="http://schemas.microsoft.com/office/powerpoint/2010/main" val="1204691525"/>
+        <p14:creationId xmlns:p14="http://schemas.microsoft.com/office/powerpoint/2010/main" val="3291142563"/>
       </p:ext>
     </p:extLst>
   </p:cSld>
@@ -8833,24 +8795,13 @@
                   <a:schemeClr val="tx1"/>
                 </a:solidFill>
               </a:rPr>
-              <a:t>Background</a:t>
-            </a:r>
-            <a:endParaRPr lang="en-US" sz="2800" dirty="0" smtClean="0">
+              <a:t>CVSS Background</a:t>
+            </a:r>
+            <a:endParaRPr lang="en-US" sz="2400" dirty="0" smtClean="0">
               <a:solidFill>
                 <a:schemeClr val="tx1"/>
               </a:solidFill>
             </a:endParaRPr>
-          </a:p>
-          <a:p>
-            <a:pPr lvl="1"/>
-            <a:r>
-              <a:rPr lang="en-US" sz="2400" dirty="0" smtClean="0">
-                <a:solidFill>
-                  <a:schemeClr val="tx1"/>
-                </a:solidFill>
-              </a:rPr>
-              <a:t>CVSS</a:t>
-            </a:r>
           </a:p>
           <a:p>
             <a:r>
@@ -8859,17 +8810,38 @@
                   <a:schemeClr val="tx1"/>
                 </a:solidFill>
               </a:rPr>
-              <a:t>Evaluating CVSS Base Score Using Vulnerability Rewards Program</a:t>
-            </a:r>
-          </a:p>
-          <a:p>
+              <a:t>Evaluating CVSS Base Score Using Vulnerability Rewards </a:t>
+            </a:r>
             <a:r>
               <a:rPr lang="en-US" sz="3200" dirty="0" smtClean="0">
                 <a:solidFill>
                   <a:schemeClr val="tx1"/>
                 </a:solidFill>
               </a:rPr>
-              <a:t>An automatic method for CVSS score prediction using vulnerabilities description</a:t>
+              <a:t>Program [1]</a:t>
+            </a:r>
+            <a:endParaRPr lang="en-US" sz="3200" dirty="0" smtClean="0">
+              <a:solidFill>
+                <a:schemeClr val="tx1"/>
+              </a:solidFill>
+            </a:endParaRPr>
+          </a:p>
+          <a:p>
+            <a:r>
+              <a:rPr lang="en-US" sz="3200" dirty="0" smtClean="0">
+                <a:solidFill>
+                  <a:schemeClr val="tx1"/>
+                </a:solidFill>
+              </a:rPr>
+              <a:t>An automatic method for CVSS score prediction using vulnerabilities </a:t>
+            </a:r>
+            <a:r>
+              <a:rPr lang="en-US" sz="3200" dirty="0" smtClean="0">
+                <a:solidFill>
+                  <a:schemeClr val="tx1"/>
+                </a:solidFill>
+              </a:rPr>
+              <a:t>description [2]</a:t>
             </a:r>
             <a:endParaRPr lang="en-CA" sz="3200" dirty="0">
               <a:solidFill>
@@ -8926,52 +8898,67 @@
             <p:ph type="title"/>
           </p:nvPr>
         </p:nvSpPr>
-        <p:spPr>
-          <a:xfrm>
-            <a:off x="1492313" y="1394234"/>
-            <a:ext cx="9207375" cy="4037845"/>
-          </a:xfrm>
-        </p:spPr>
+        <p:spPr/>
         <p:txBody>
-          <a:bodyPr>
-            <a:normAutofit/>
-          </a:bodyPr>
+          <a:bodyPr/>
           <a:lstStyle/>
           <a:p>
             <a:r>
-              <a:rPr lang="en-US" dirty="0"/>
-              <a:t>An automatic method for CVSS score prediction using vulnerabilities description</a:t>
-            </a:r>
-            <a:r>
-              <a:rPr lang="en-CA" dirty="0"/>
-              <a:t/>
-            </a:r>
-            <a:br>
-              <a:rPr lang="en-CA" dirty="0"/>
-            </a:br>
+              <a:rPr lang="en-US" dirty="0" err="1" smtClean="0"/>
+              <a:t>Younis</a:t>
+            </a:r>
             <a:r>
               <a:rPr lang="en-US" dirty="0" smtClean="0"/>
-              <a:t>[</a:t>
-            </a:r>
-            <a:r>
-              <a:rPr lang="en-CA" dirty="0" smtClean="0"/>
-              <a:t>Khazaei2015</a:t>
-            </a:r>
+              <a:t> et al. - Commentary</a:t>
+            </a:r>
+            <a:endParaRPr lang="en-CA" dirty="0"/>
+          </a:p>
+        </p:txBody>
+      </p:sp>
+      <p:sp>
+        <p:nvSpPr>
+          <p:cNvPr id="3" name="Content Placeholder 2"/>
+          <p:cNvSpPr>
+            <a:spLocks noGrp="1"/>
+          </p:cNvSpPr>
+          <p:nvPr>
+            <p:ph idx="1"/>
+          </p:nvPr>
+        </p:nvSpPr>
+        <p:spPr/>
+        <p:txBody>
+          <a:bodyPr/>
+          <a:lstStyle/>
+          <a:p>
             <a:r>
               <a:rPr lang="en-US" dirty="0" smtClean="0"/>
-              <a:t>]</a:t>
-            </a:r>
-            <a:br>
+              <a:t>Results suggest CVSS is conservative in risk assessment</a:t>
+            </a:r>
+          </a:p>
+          <a:p>
+            <a:r>
               <a:rPr lang="en-US" dirty="0" smtClean="0"/>
-            </a:br>
-            <a:endParaRPr lang="en-CA" dirty="0"/>
+              <a:t>Proving exploitability is more </a:t>
+            </a:r>
+            <a:r>
+              <a:rPr lang="en-US" i="1" dirty="0" smtClean="0"/>
+              <a:t>financially </a:t>
+            </a:r>
+            <a:r>
+              <a:rPr lang="en-US" dirty="0" smtClean="0"/>
+              <a:t>valuable</a:t>
+            </a:r>
+          </a:p>
+          <a:p>
+            <a:pPr lvl="1"/>
+            <a:endParaRPr lang="en-US" dirty="0" smtClean="0"/>
           </a:p>
         </p:txBody>
       </p:sp>
     </p:spTree>
     <p:extLst>
       <p:ext uri="{BB962C8B-B14F-4D97-AF65-F5344CB8AC3E}">
-        <p14:creationId xmlns:p14="http://schemas.microsoft.com/office/powerpoint/2010/main" val="3150123797"/>
+        <p14:creationId xmlns:p14="http://schemas.microsoft.com/office/powerpoint/2010/main" val="1204691525"/>
       </p:ext>
     </p:extLst>
   </p:cSld>
@@ -9015,50 +9002,52 @@
             <p:ph type="title"/>
           </p:nvPr>
         </p:nvSpPr>
-        <p:spPr/>
+        <p:spPr>
+          <a:xfrm>
+            <a:off x="1492313" y="1394234"/>
+            <a:ext cx="9207375" cy="4037845"/>
+          </a:xfrm>
+        </p:spPr>
         <p:txBody>
-          <a:bodyPr/>
+          <a:bodyPr>
+            <a:normAutofit/>
+          </a:bodyPr>
           <a:lstStyle/>
           <a:p>
             <a:r>
-              <a:rPr lang="en-CA" dirty="0" err="1" smtClean="0"/>
-              <a:t>Khazaei</a:t>
+              <a:rPr lang="en-US" dirty="0"/>
+              <a:t>An automatic method for CVSS score prediction using vulnerabilities description</a:t>
+            </a:r>
+            <a:r>
+              <a:rPr lang="en-CA" dirty="0"/>
+              <a:t/>
+            </a:r>
+            <a:br>
+              <a:rPr lang="en-CA" dirty="0"/>
+            </a:br>
+            <a:r>
+              <a:rPr lang="en-US" dirty="0" smtClean="0"/>
+              <a:t>[</a:t>
             </a:r>
             <a:r>
               <a:rPr lang="en-CA" dirty="0" smtClean="0"/>
-              <a:t> </a:t>
+              <a:t>Khazaei2016</a:t>
             </a:r>
             <a:r>
               <a:rPr lang="en-US" dirty="0" smtClean="0"/>
-              <a:t>et al. - Motivation</a:t>
-            </a:r>
+              <a:t>]</a:t>
+            </a:r>
+            <a:br>
+              <a:rPr lang="en-US" dirty="0" smtClean="0"/>
+            </a:br>
             <a:endParaRPr lang="en-CA" dirty="0"/>
-          </a:p>
-        </p:txBody>
-      </p:sp>
-      <p:sp>
-        <p:nvSpPr>
-          <p:cNvPr id="3" name="Content Placeholder 2"/>
-          <p:cNvSpPr>
-            <a:spLocks noGrp="1"/>
-          </p:cNvSpPr>
-          <p:nvPr>
-            <p:ph idx="1"/>
-          </p:nvPr>
-        </p:nvSpPr>
-        <p:spPr/>
-        <p:txBody>
-          <a:bodyPr/>
-          <a:lstStyle/>
-          <a:p>
-            <a:endParaRPr lang="en-CA"/>
           </a:p>
         </p:txBody>
       </p:sp>
     </p:spTree>
     <p:extLst>
       <p:ext uri="{BB962C8B-B14F-4D97-AF65-F5344CB8AC3E}">
-        <p14:creationId xmlns:p14="http://schemas.microsoft.com/office/powerpoint/2010/main" val="1529008051"/>
+        <p14:creationId xmlns:p14="http://schemas.microsoft.com/office/powerpoint/2010/main" val="3150123797"/>
       </p:ext>
     </p:extLst>
   </p:cSld>
@@ -9117,7 +9106,7 @@
             </a:r>
             <a:r>
               <a:rPr lang="en-US" dirty="0" smtClean="0"/>
-              <a:t>et al. - Contribution</a:t>
+              <a:t>et al. - Motivation</a:t>
             </a:r>
             <a:endParaRPr lang="en-CA" dirty="0"/>
           </a:p>
@@ -9138,14 +9127,152 @@
           <a:bodyPr/>
           <a:lstStyle/>
           <a:p>
-            <a:endParaRPr lang="en-CA"/>
+            <a:r>
+              <a:rPr lang="en-CA" dirty="0" smtClean="0"/>
+              <a:t>Vulnerability comparison standardization is important</a:t>
+            </a:r>
+          </a:p>
+          <a:p>
+            <a:r>
+              <a:rPr lang="en-CA" dirty="0" smtClean="0"/>
+              <a:t>CVSS is popular but metric scoring is subjective</a:t>
+            </a:r>
+            <a:endParaRPr lang="en-CA" dirty="0"/>
+          </a:p>
+        </p:txBody>
+      </p:sp>
+      <p:pic>
+        <p:nvPicPr>
+          <p:cNvPr id="26" name="Picture 25"/>
+          <p:cNvPicPr>
+            <a:picLocks noChangeAspect="1"/>
+          </p:cNvPicPr>
+          <p:nvPr/>
+        </p:nvPicPr>
+        <p:blipFill>
+          <a:blip r:embed="rId2">
+            <a:extLst>
+              <a:ext uri="{28A0092B-C50C-407E-A947-70E740481C1C}">
+                <a14:useLocalDpi xmlns:a14="http://schemas.microsoft.com/office/drawing/2010/main" val="0"/>
+              </a:ext>
+            </a:extLst>
+          </a:blip>
+          <a:stretch>
+            <a:fillRect/>
+          </a:stretch>
+        </p:blipFill>
+        <p:spPr>
+          <a:xfrm>
+            <a:off x="3818495" y="3727268"/>
+            <a:ext cx="3944407" cy="2741606"/>
+          </a:xfrm>
+          <a:prstGeom prst="rect">
+            <a:avLst/>
+          </a:prstGeom>
+        </p:spPr>
+      </p:pic>
+      <p:pic>
+        <p:nvPicPr>
+          <p:cNvPr id="28" name="Picture 27"/>
+          <p:cNvPicPr>
+            <a:picLocks noChangeAspect="1"/>
+          </p:cNvPicPr>
+          <p:nvPr/>
+        </p:nvPicPr>
+        <p:blipFill>
+          <a:blip r:embed="rId3">
+            <a:extLst>
+              <a:ext uri="{28A0092B-C50C-407E-A947-70E740481C1C}">
+                <a14:useLocalDpi xmlns:a14="http://schemas.microsoft.com/office/drawing/2010/main" val="0"/>
+              </a:ext>
+            </a:extLst>
+          </a:blip>
+          <a:stretch>
+            <a:fillRect/>
+          </a:stretch>
+        </p:blipFill>
+        <p:spPr>
+          <a:xfrm>
+            <a:off x="3956364" y="4827593"/>
+            <a:ext cx="1756374" cy="655463"/>
+          </a:xfrm>
+          <a:prstGeom prst="rect">
+            <a:avLst/>
+          </a:prstGeom>
+        </p:spPr>
+      </p:pic>
+      <p:sp>
+        <p:nvSpPr>
+          <p:cNvPr id="29" name="TextBox 28"/>
+          <p:cNvSpPr txBox="1"/>
+          <p:nvPr/>
+        </p:nvSpPr>
+        <p:spPr>
+          <a:xfrm>
+            <a:off x="5850607" y="3965818"/>
+            <a:ext cx="5279572" cy="1723549"/>
+          </a:xfrm>
+          <a:prstGeom prst="rect">
+            <a:avLst/>
+          </a:prstGeom>
+          <a:noFill/>
+        </p:spPr>
+        <p:txBody>
+          <a:bodyPr wrap="square" lIns="0" tIns="0" rIns="0" bIns="0" rtlCol="0">
+            <a:spAutoFit/>
+          </a:bodyPr>
+          <a:lstStyle/>
+          <a:p>
+            <a:r>
+              <a:rPr lang="en-CA" sz="2800" dirty="0" smtClean="0"/>
+              <a:t>= case </a:t>
+            </a:r>
+            <a:r>
+              <a:rPr lang="en-CA" sz="2800" dirty="0" err="1" smtClean="0"/>
+              <a:t>AccessComplexity</a:t>
+            </a:r>
+            <a:r>
+              <a:rPr lang="en-CA" sz="2800" dirty="0" smtClean="0"/>
+              <a:t> of</a:t>
+            </a:r>
+          </a:p>
+          <a:p>
+            <a:r>
+              <a:rPr lang="en-CA" sz="2800" dirty="0"/>
+              <a:t>	</a:t>
+            </a:r>
+            <a:r>
+              <a:rPr lang="en-CA" sz="2800" dirty="0" smtClean="0"/>
+              <a:t>high: 0.35</a:t>
+            </a:r>
+          </a:p>
+          <a:p>
+            <a:r>
+              <a:rPr lang="en-CA" sz="2800" dirty="0"/>
+              <a:t>	</a:t>
+            </a:r>
+            <a:r>
+              <a:rPr lang="en-CA" sz="2800" dirty="0" smtClean="0"/>
+              <a:t>medium: 0.61</a:t>
+            </a:r>
+          </a:p>
+          <a:p>
+            <a:r>
+              <a:rPr lang="en-CA" sz="2800" dirty="0"/>
+              <a:t>	</a:t>
+            </a:r>
+            <a:r>
+              <a:rPr lang="en-CA" sz="2800" dirty="0" smtClean="0"/>
+              <a:t>low: 0.71	</a:t>
+            </a:r>
+            <a:endParaRPr lang="en-CA" sz="2800" dirty="0"/>
           </a:p>
         </p:txBody>
       </p:sp>
     </p:spTree>
     <p:extLst>
       <p:ext uri="{BB962C8B-B14F-4D97-AF65-F5344CB8AC3E}">
-        <p14:creationId xmlns:p14="http://schemas.microsoft.com/office/powerpoint/2010/main" val="128866448"/>
+        <p14:creationId xmlns:p14="http://schemas.microsoft.com/office/powerpoint/2010/main" val="1529008051"/>
       </p:ext>
     </p:extLst>
   </p:cSld>
@@ -9155,9 +9282,338 @@
   <p:timing>
     <p:tnLst>
       <p:par>
-        <p:cTn id="1" dur="indefinite" restart="never" nodeType="tmRoot"/>
+        <p:cTn id="1" dur="indefinite" restart="never" nodeType="tmRoot">
+          <p:childTnLst>
+            <p:seq concurrent="1" nextAc="seek">
+              <p:cTn id="2" dur="indefinite" nodeType="mainSeq">
+                <p:childTnLst>
+                  <p:par>
+                    <p:cTn id="3" fill="hold">
+                      <p:stCondLst>
+                        <p:cond delay="indefinite"/>
+                      </p:stCondLst>
+                      <p:childTnLst>
+                        <p:par>
+                          <p:cTn id="4" fill="hold">
+                            <p:stCondLst>
+                              <p:cond delay="0"/>
+                            </p:stCondLst>
+                            <p:childTnLst>
+                              <p:par>
+                                <p:cTn id="5" presetID="10" presetClass="entr" presetSubtype="0" fill="hold" nodeType="clickEffect">
+                                  <p:stCondLst>
+                                    <p:cond delay="0"/>
+                                  </p:stCondLst>
+                                  <p:childTnLst>
+                                    <p:set>
+                                      <p:cBhvr>
+                                        <p:cTn id="6" dur="1" fill="hold">
+                                          <p:stCondLst>
+                                            <p:cond delay="0"/>
+                                          </p:stCondLst>
+                                        </p:cTn>
+                                        <p:tgtEl>
+                                          <p:spTgt spid="3">
+                                            <p:txEl>
+                                              <p:pRg st="0" end="0"/>
+                                            </p:txEl>
+                                          </p:spTgt>
+                                        </p:tgtEl>
+                                        <p:attrNameLst>
+                                          <p:attrName>style.visibility</p:attrName>
+                                        </p:attrNameLst>
+                                      </p:cBhvr>
+                                      <p:to>
+                                        <p:strVal val="visible"/>
+                                      </p:to>
+                                    </p:set>
+                                    <p:animEffect transition="in" filter="fade">
+                                      <p:cBhvr>
+                                        <p:cTn id="7" dur="1000"/>
+                                        <p:tgtEl>
+                                          <p:spTgt spid="3">
+                                            <p:txEl>
+                                              <p:pRg st="0" end="0"/>
+                                            </p:txEl>
+                                          </p:spTgt>
+                                        </p:tgtEl>
+                                      </p:cBhvr>
+                                    </p:animEffect>
+                                  </p:childTnLst>
+                                </p:cTn>
+                              </p:par>
+                            </p:childTnLst>
+                          </p:cTn>
+                        </p:par>
+                      </p:childTnLst>
+                    </p:cTn>
+                  </p:par>
+                  <p:par>
+                    <p:cTn id="8" fill="hold">
+                      <p:stCondLst>
+                        <p:cond delay="indefinite"/>
+                      </p:stCondLst>
+                      <p:childTnLst>
+                        <p:par>
+                          <p:cTn id="9" fill="hold">
+                            <p:stCondLst>
+                              <p:cond delay="0"/>
+                            </p:stCondLst>
+                            <p:childTnLst>
+                              <p:par>
+                                <p:cTn id="10" presetID="10" presetClass="entr" presetSubtype="0" fill="hold" nodeType="clickEffect">
+                                  <p:stCondLst>
+                                    <p:cond delay="0"/>
+                                  </p:stCondLst>
+                                  <p:childTnLst>
+                                    <p:set>
+                                      <p:cBhvr>
+                                        <p:cTn id="11" dur="1" fill="hold">
+                                          <p:stCondLst>
+                                            <p:cond delay="0"/>
+                                          </p:stCondLst>
+                                        </p:cTn>
+                                        <p:tgtEl>
+                                          <p:spTgt spid="3">
+                                            <p:txEl>
+                                              <p:pRg st="1" end="1"/>
+                                            </p:txEl>
+                                          </p:spTgt>
+                                        </p:tgtEl>
+                                        <p:attrNameLst>
+                                          <p:attrName>style.visibility</p:attrName>
+                                        </p:attrNameLst>
+                                      </p:cBhvr>
+                                      <p:to>
+                                        <p:strVal val="visible"/>
+                                      </p:to>
+                                    </p:set>
+                                    <p:animEffect transition="in" filter="fade">
+                                      <p:cBhvr>
+                                        <p:cTn id="12" dur="1000"/>
+                                        <p:tgtEl>
+                                          <p:spTgt spid="3">
+                                            <p:txEl>
+                                              <p:pRg st="1" end="1"/>
+                                            </p:txEl>
+                                          </p:spTgt>
+                                        </p:tgtEl>
+                                      </p:cBhvr>
+                                    </p:animEffect>
+                                  </p:childTnLst>
+                                </p:cTn>
+                              </p:par>
+                              <p:par>
+                                <p:cTn id="13" presetID="10" presetClass="entr" presetSubtype="0" fill="hold" nodeType="withEffect">
+                                  <p:stCondLst>
+                                    <p:cond delay="0"/>
+                                  </p:stCondLst>
+                                  <p:childTnLst>
+                                    <p:set>
+                                      <p:cBhvr>
+                                        <p:cTn id="14" dur="1" fill="hold">
+                                          <p:stCondLst>
+                                            <p:cond delay="0"/>
+                                          </p:stCondLst>
+                                        </p:cTn>
+                                        <p:tgtEl>
+                                          <p:spTgt spid="26"/>
+                                        </p:tgtEl>
+                                        <p:attrNameLst>
+                                          <p:attrName>style.visibility</p:attrName>
+                                        </p:attrNameLst>
+                                      </p:cBhvr>
+                                      <p:to>
+                                        <p:strVal val="visible"/>
+                                      </p:to>
+                                    </p:set>
+                                    <p:animEffect transition="in" filter="fade">
+                                      <p:cBhvr>
+                                        <p:cTn id="15" dur="1000"/>
+                                        <p:tgtEl>
+                                          <p:spTgt spid="26"/>
+                                        </p:tgtEl>
+                                      </p:cBhvr>
+                                    </p:animEffect>
+                                  </p:childTnLst>
+                                </p:cTn>
+                              </p:par>
+                            </p:childTnLst>
+                          </p:cTn>
+                        </p:par>
+                        <p:par>
+                          <p:cTn id="16" fill="hold">
+                            <p:stCondLst>
+                              <p:cond delay="1000"/>
+                            </p:stCondLst>
+                            <p:childTnLst>
+                              <p:par>
+                                <p:cTn id="17" presetID="1" presetClass="entr" presetSubtype="0" fill="hold" nodeType="afterEffect">
+                                  <p:stCondLst>
+                                    <p:cond delay="0"/>
+                                  </p:stCondLst>
+                                  <p:childTnLst>
+                                    <p:set>
+                                      <p:cBhvr>
+                                        <p:cTn id="18" dur="1" fill="hold">
+                                          <p:stCondLst>
+                                            <p:cond delay="0"/>
+                                          </p:stCondLst>
+                                        </p:cTn>
+                                        <p:tgtEl>
+                                          <p:spTgt spid="28"/>
+                                        </p:tgtEl>
+                                        <p:attrNameLst>
+                                          <p:attrName>style.visibility</p:attrName>
+                                        </p:attrNameLst>
+                                      </p:cBhvr>
+                                      <p:to>
+                                        <p:strVal val="visible"/>
+                                      </p:to>
+                                    </p:set>
+                                  </p:childTnLst>
+                                </p:cTn>
+                              </p:par>
+                            </p:childTnLst>
+                          </p:cTn>
+                        </p:par>
+                      </p:childTnLst>
+                    </p:cTn>
+                  </p:par>
+                  <p:par>
+                    <p:cTn id="19" fill="hold">
+                      <p:stCondLst>
+                        <p:cond delay="indefinite"/>
+                      </p:stCondLst>
+                      <p:childTnLst>
+                        <p:par>
+                          <p:cTn id="20" fill="hold">
+                            <p:stCondLst>
+                              <p:cond delay="0"/>
+                            </p:stCondLst>
+                            <p:childTnLst>
+                              <p:par>
+                                <p:cTn id="21" presetID="10" presetClass="exit" presetSubtype="0" fill="hold" nodeType="clickEffect">
+                                  <p:stCondLst>
+                                    <p:cond delay="0"/>
+                                  </p:stCondLst>
+                                  <p:childTnLst>
+                                    <p:animEffect transition="out" filter="fade">
+                                      <p:cBhvr>
+                                        <p:cTn id="22" dur="1000"/>
+                                        <p:tgtEl>
+                                          <p:spTgt spid="26"/>
+                                        </p:tgtEl>
+                                      </p:cBhvr>
+                                    </p:animEffect>
+                                    <p:set>
+                                      <p:cBhvr>
+                                        <p:cTn id="23" dur="1" fill="hold">
+                                          <p:stCondLst>
+                                            <p:cond delay="999"/>
+                                          </p:stCondLst>
+                                        </p:cTn>
+                                        <p:tgtEl>
+                                          <p:spTgt spid="26"/>
+                                        </p:tgtEl>
+                                        <p:attrNameLst>
+                                          <p:attrName>style.visibility</p:attrName>
+                                        </p:attrNameLst>
+                                      </p:cBhvr>
+                                      <p:to>
+                                        <p:strVal val="hidden"/>
+                                      </p:to>
+                                    </p:set>
+                                  </p:childTnLst>
+                                </p:cTn>
+                              </p:par>
+                              <p:par>
+                                <p:cTn id="24" presetID="42" presetClass="path" presetSubtype="0" accel="50000" decel="50000" fill="hold" nodeType="withEffect">
+                                  <p:stCondLst>
+                                    <p:cond delay="0"/>
+                                  </p:stCondLst>
+                                  <p:childTnLst>
+                                    <p:animMotion origin="layout" path="M -4.375E-6 -3.7037E-7 L -0.00091 -0.13079 " pathEditMode="relative" rAng="0" ptsTypes="AA">
+                                      <p:cBhvr>
+                                        <p:cTn id="25" dur="1000" fill="hold"/>
+                                        <p:tgtEl>
+                                          <p:spTgt spid="28"/>
+                                        </p:tgtEl>
+                                        <p:attrNameLst>
+                                          <p:attrName>ppt_x</p:attrName>
+                                          <p:attrName>ppt_y</p:attrName>
+                                        </p:attrNameLst>
+                                      </p:cBhvr>
+                                      <p:rCtr x="-52" y="-6551"/>
+                                    </p:animMotion>
+                                  </p:childTnLst>
+                                </p:cTn>
+                              </p:par>
+                              <p:par>
+                                <p:cTn id="26" presetID="10" presetClass="entr" presetSubtype="0" fill="hold" grpId="0" nodeType="withEffect">
+                                  <p:stCondLst>
+                                    <p:cond delay="0"/>
+                                  </p:stCondLst>
+                                  <p:childTnLst>
+                                    <p:set>
+                                      <p:cBhvr>
+                                        <p:cTn id="27" dur="1" fill="hold">
+                                          <p:stCondLst>
+                                            <p:cond delay="0"/>
+                                          </p:stCondLst>
+                                        </p:cTn>
+                                        <p:tgtEl>
+                                          <p:spTgt spid="29"/>
+                                        </p:tgtEl>
+                                        <p:attrNameLst>
+                                          <p:attrName>style.visibility</p:attrName>
+                                        </p:attrNameLst>
+                                      </p:cBhvr>
+                                      <p:to>
+                                        <p:strVal val="visible"/>
+                                      </p:to>
+                                    </p:set>
+                                    <p:animEffect transition="in" filter="fade">
+                                      <p:cBhvr>
+                                        <p:cTn id="28" dur="1000"/>
+                                        <p:tgtEl>
+                                          <p:spTgt spid="29"/>
+                                        </p:tgtEl>
+                                      </p:cBhvr>
+                                    </p:animEffect>
+                                  </p:childTnLst>
+                                </p:cTn>
+                              </p:par>
+                            </p:childTnLst>
+                          </p:cTn>
+                        </p:par>
+                      </p:childTnLst>
+                    </p:cTn>
+                  </p:par>
+                </p:childTnLst>
+              </p:cTn>
+              <p:prevCondLst>
+                <p:cond evt="onPrev" delay="0">
+                  <p:tgtEl>
+                    <p:sldTgt/>
+                  </p:tgtEl>
+                </p:cond>
+              </p:prevCondLst>
+              <p:nextCondLst>
+                <p:cond evt="onNext" delay="0">
+                  <p:tgtEl>
+                    <p:sldTgt/>
+                  </p:tgtEl>
+                </p:cond>
+              </p:nextCondLst>
+            </p:seq>
+          </p:childTnLst>
+        </p:cTn>
       </p:par>
     </p:tnLst>
+    <p:bldLst>
+      <p:bldP spid="29" grpId="0"/>
+    </p:bldLst>
   </p:timing>
 </p:sld>
 </file>
@@ -9204,7 +9660,7 @@
             </a:r>
             <a:r>
               <a:rPr lang="en-US" dirty="0" smtClean="0"/>
-              <a:t>et al. - Methods</a:t>
+              <a:t>et al. - Contribution</a:t>
             </a:r>
             <a:endParaRPr lang="en-CA" dirty="0"/>
           </a:p>
@@ -9225,14 +9681,18 @@
           <a:bodyPr/>
           <a:lstStyle/>
           <a:p>
-            <a:endParaRPr lang="en-CA"/>
+            <a:r>
+              <a:rPr lang="en-CA" dirty="0" smtClean="0"/>
+              <a:t>A method for predicting CVSS base scores using the natural language in vulnerability descriptions</a:t>
+            </a:r>
+            <a:endParaRPr lang="en-CA" dirty="0"/>
           </a:p>
         </p:txBody>
       </p:sp>
     </p:spTree>
     <p:extLst>
       <p:ext uri="{BB962C8B-B14F-4D97-AF65-F5344CB8AC3E}">
-        <p14:creationId xmlns:p14="http://schemas.microsoft.com/office/powerpoint/2010/main" val="2502465700"/>
+        <p14:creationId xmlns:p14="http://schemas.microsoft.com/office/powerpoint/2010/main" val="128866448"/>
       </p:ext>
     </p:extLst>
   </p:cSld>
@@ -9282,16 +9742,16 @@
           <a:lstStyle/>
           <a:p>
             <a:r>
-              <a:rPr lang="en-CA" dirty="0" err="1" smtClean="0"/>
+              <a:rPr lang="en-CA" dirty="0" err="1"/>
               <a:t>Khazaei</a:t>
             </a:r>
             <a:r>
-              <a:rPr lang="en-CA" dirty="0" smtClean="0"/>
+              <a:rPr lang="en-CA" dirty="0"/>
               <a:t> </a:t>
             </a:r>
             <a:r>
               <a:rPr lang="en-US" dirty="0" smtClean="0"/>
-              <a:t>et al. – Results</a:t>
+              <a:t>et al. - Data</a:t>
             </a:r>
             <a:endParaRPr lang="en-CA" dirty="0"/>
           </a:p>
@@ -9307,19 +9767,34 @@
             <p:ph idx="1"/>
           </p:nvPr>
         </p:nvSpPr>
-        <p:spPr/>
+        <p:spPr>
+          <a:xfrm>
+            <a:off x="684212" y="1782617"/>
+            <a:ext cx="9591902" cy="4116341"/>
+          </a:xfrm>
+        </p:spPr>
         <p:txBody>
           <a:bodyPr/>
           <a:lstStyle/>
           <a:p>
-            <a:endParaRPr lang="en-CA"/>
+            <a:r>
+              <a:rPr lang="en-US" dirty="0" smtClean="0"/>
+              <a:t>19320 vulnerability descriptions from CVE (Common Vulnerabilities and Exposures)</a:t>
+            </a:r>
+          </a:p>
+          <a:p>
+            <a:r>
+              <a:rPr lang="en-US" dirty="0" smtClean="0"/>
+              <a:t>Corresponding CVSS scores from OBVDB (Open Source Vulnerability Database)</a:t>
+            </a:r>
+            <a:endParaRPr lang="en-CA" dirty="0"/>
           </a:p>
         </p:txBody>
       </p:sp>
     </p:spTree>
     <p:extLst>
       <p:ext uri="{BB962C8B-B14F-4D97-AF65-F5344CB8AC3E}">
-        <p14:creationId xmlns:p14="http://schemas.microsoft.com/office/powerpoint/2010/main" val="2996095208"/>
+        <p14:creationId xmlns:p14="http://schemas.microsoft.com/office/powerpoint/2010/main" val="3616251670"/>
       </p:ext>
     </p:extLst>
   </p:cSld>
@@ -9378,35 +9853,496 @@
             </a:r>
             <a:r>
               <a:rPr lang="en-US" dirty="0" smtClean="0"/>
-              <a:t>et al. - Discussion</a:t>
+              <a:t>et al. - Methods</a:t>
             </a:r>
             <a:endParaRPr lang="en-CA" dirty="0"/>
           </a:p>
         </p:txBody>
       </p:sp>
-      <p:sp>
-        <p:nvSpPr>
-          <p:cNvPr id="3" name="Content Placeholder 2"/>
-          <p:cNvSpPr>
-            <a:spLocks noGrp="1"/>
-          </p:cNvSpPr>
-          <p:nvPr>
-            <p:ph idx="1"/>
-          </p:nvPr>
-        </p:nvSpPr>
-        <p:spPr/>
-        <p:txBody>
-          <a:bodyPr/>
-          <a:lstStyle/>
-          <a:p>
-            <a:endParaRPr lang="en-CA"/>
-          </a:p>
-        </p:txBody>
-      </p:sp>
+      <mc:AlternateContent xmlns:mc="http://schemas.openxmlformats.org/markup-compatibility/2006" xmlns:a14="http://schemas.microsoft.com/office/drawing/2010/main">
+        <mc:Choice Requires="a14">
+          <p:sp>
+            <p:nvSpPr>
+              <p:cNvPr id="3" name="Content Placeholder 2"/>
+              <p:cNvSpPr>
+                <a:spLocks noGrp="1"/>
+              </p:cNvSpPr>
+              <p:nvPr>
+                <p:ph idx="1"/>
+              </p:nvPr>
+            </p:nvSpPr>
+            <p:spPr>
+              <a:xfrm>
+                <a:off x="684212" y="1782617"/>
+                <a:ext cx="8534400" cy="4389583"/>
+              </a:xfrm>
+            </p:spPr>
+            <p:txBody>
+              <a:bodyPr>
+                <a:normAutofit lnSpcReduction="10000"/>
+              </a:bodyPr>
+              <a:lstStyle/>
+              <a:p>
+                <a:r>
+                  <a:rPr lang="en-CA" dirty="0" smtClean="0"/>
+                  <a:t>Useful words were extracted from descriptions and stemmed</a:t>
+                </a:r>
+              </a:p>
+              <a:p>
+                <a:r>
+                  <a:rPr lang="en-CA" dirty="0" smtClean="0"/>
+                  <a:t>Computed Term Frequency – Inverse Document Frequency:</a:t>
+                </a:r>
+              </a:p>
+              <a:p>
+                <a:pPr lvl="1"/>
+                <a14:m>
+                  <m:oMath xmlns:m="http://schemas.openxmlformats.org/officeDocument/2006/math">
+                    <m:r>
+                      <a:rPr lang="en-CA" b="0" i="1" smtClean="0">
+                        <a:solidFill>
+                          <a:schemeClr val="tx1"/>
+                        </a:solidFill>
+                        <a:latin typeface="Cambria Math" panose="02040503050406030204" pitchFamily="18" charset="0"/>
+                      </a:rPr>
+                      <m:t>𝑇𝐹</m:t>
+                    </m:r>
+                    <m:r>
+                      <a:rPr lang="en-CA" b="0" i="1" smtClean="0">
+                        <a:solidFill>
+                          <a:schemeClr val="tx1"/>
+                        </a:solidFill>
+                        <a:latin typeface="Cambria Math" panose="02040503050406030204" pitchFamily="18" charset="0"/>
+                      </a:rPr>
+                      <m:t>−</m:t>
+                    </m:r>
+                    <m:r>
+                      <a:rPr lang="en-CA" b="0" i="1" smtClean="0">
+                        <a:solidFill>
+                          <a:schemeClr val="tx1"/>
+                        </a:solidFill>
+                        <a:latin typeface="Cambria Math" panose="02040503050406030204" pitchFamily="18" charset="0"/>
+                      </a:rPr>
+                      <m:t>𝐼𝐷𝐹</m:t>
+                    </m:r>
+                    <m:r>
+                      <a:rPr lang="en-CA" b="0" i="1" smtClean="0">
+                        <a:solidFill>
+                          <a:schemeClr val="tx1"/>
+                        </a:solidFill>
+                        <a:latin typeface="Cambria Math" panose="02040503050406030204" pitchFamily="18" charset="0"/>
+                      </a:rPr>
+                      <m:t>=</m:t>
+                    </m:r>
+                    <m:sSub>
+                      <m:sSubPr>
+                        <m:ctrlPr>
+                          <a:rPr lang="en-CA" b="0" i="1" smtClean="0">
+                            <a:solidFill>
+                              <a:schemeClr val="tx1"/>
+                            </a:solidFill>
+                            <a:latin typeface="Cambria Math" panose="02040503050406030204" pitchFamily="18" charset="0"/>
+                          </a:rPr>
+                        </m:ctrlPr>
+                      </m:sSubPr>
+                      <m:e>
+                        <m:r>
+                          <a:rPr lang="en-CA" b="0" i="1" smtClean="0">
+                            <a:solidFill>
+                              <a:schemeClr val="tx1"/>
+                            </a:solidFill>
+                            <a:latin typeface="Cambria Math" panose="02040503050406030204" pitchFamily="18" charset="0"/>
+                          </a:rPr>
+                          <m:t>𝑓</m:t>
+                        </m:r>
+                      </m:e>
+                      <m:sub>
+                        <m:r>
+                          <a:rPr lang="en-CA" b="0" i="1" smtClean="0">
+                            <a:solidFill>
+                              <a:schemeClr val="tx1"/>
+                            </a:solidFill>
+                            <a:latin typeface="Cambria Math" panose="02040503050406030204" pitchFamily="18" charset="0"/>
+                          </a:rPr>
+                          <m:t>𝑖𝑗</m:t>
+                        </m:r>
+                      </m:sub>
+                    </m:sSub>
+                    <m:r>
+                      <a:rPr lang="en-CA" b="0" i="1" smtClean="0">
+                        <a:solidFill>
+                          <a:schemeClr val="tx1"/>
+                        </a:solidFill>
+                        <a:latin typeface="Cambria Math" panose="02040503050406030204" pitchFamily="18" charset="0"/>
+                      </a:rPr>
+                      <m:t>∙</m:t>
+                    </m:r>
+                    <m:func>
+                      <m:funcPr>
+                        <m:ctrlPr>
+                          <a:rPr lang="en-CA" b="0" i="1" smtClean="0">
+                            <a:solidFill>
+                              <a:schemeClr val="tx1"/>
+                            </a:solidFill>
+                            <a:latin typeface="Cambria Math" panose="02040503050406030204" pitchFamily="18" charset="0"/>
+                          </a:rPr>
+                        </m:ctrlPr>
+                      </m:funcPr>
+                      <m:fName>
+                        <m:r>
+                          <m:rPr>
+                            <m:sty m:val="p"/>
+                          </m:rPr>
+                          <a:rPr lang="en-CA" b="0" i="0" smtClean="0">
+                            <a:solidFill>
+                              <a:schemeClr val="tx1"/>
+                            </a:solidFill>
+                            <a:latin typeface="Cambria Math" panose="02040503050406030204" pitchFamily="18" charset="0"/>
+                          </a:rPr>
+                          <m:t>log</m:t>
+                        </m:r>
+                      </m:fName>
+                      <m:e>
+                        <m:d>
+                          <m:dPr>
+                            <m:ctrlPr>
+                              <a:rPr lang="en-CA" b="0" i="1" smtClean="0">
+                                <a:solidFill>
+                                  <a:schemeClr val="tx1"/>
+                                </a:solidFill>
+                                <a:latin typeface="Cambria Math" panose="02040503050406030204" pitchFamily="18" charset="0"/>
+                              </a:rPr>
+                            </m:ctrlPr>
+                          </m:dPr>
+                          <m:e>
+                            <m:sSubSup>
+                              <m:sSubSupPr>
+                                <m:ctrlPr>
+                                  <a:rPr lang="en-CA" b="0" i="1" smtClean="0">
+                                    <a:solidFill>
+                                      <a:schemeClr val="tx1"/>
+                                    </a:solidFill>
+                                    <a:latin typeface="Cambria Math" panose="02040503050406030204" pitchFamily="18" charset="0"/>
+                                  </a:rPr>
+                                </m:ctrlPr>
+                              </m:sSubSupPr>
+                              <m:e>
+                                <m:r>
+                                  <a:rPr lang="en-CA" b="0" i="1" smtClean="0">
+                                    <a:solidFill>
+                                      <a:schemeClr val="tx1"/>
+                                    </a:solidFill>
+                                    <a:latin typeface="Cambria Math" panose="02040503050406030204" pitchFamily="18" charset="0"/>
+                                  </a:rPr>
+                                  <m:t>𝑃</m:t>
+                                </m:r>
+                              </m:e>
+                              <m:sub>
+                                <m:r>
+                                  <a:rPr lang="en-CA" b="0" i="1" smtClean="0">
+                                    <a:solidFill>
+                                      <a:schemeClr val="tx1"/>
+                                    </a:solidFill>
+                                    <a:latin typeface="Cambria Math" panose="02040503050406030204" pitchFamily="18" charset="0"/>
+                                  </a:rPr>
+                                  <m:t>𝑖</m:t>
+                                </m:r>
+                              </m:sub>
+                              <m:sup>
+                                <m:r>
+                                  <a:rPr lang="en-CA" b="0" i="1" smtClean="0">
+                                    <a:solidFill>
+                                      <a:schemeClr val="tx1"/>
+                                    </a:solidFill>
+                                    <a:latin typeface="Cambria Math" panose="02040503050406030204" pitchFamily="18" charset="0"/>
+                                  </a:rPr>
+                                  <m:t>−1</m:t>
+                                </m:r>
+                              </m:sup>
+                            </m:sSubSup>
+                          </m:e>
+                        </m:d>
+                      </m:e>
+                    </m:func>
+                  </m:oMath>
+                </a14:m>
+                <a:endParaRPr lang="en-CA" dirty="0" smtClean="0">
+                  <a:solidFill>
+                    <a:schemeClr val="tx1"/>
+                  </a:solidFill>
+                </a:endParaRPr>
+              </a:p>
+              <a:p>
+                <a:pPr lvl="1"/>
+                <a14:m>
+                  <m:oMath xmlns:m="http://schemas.openxmlformats.org/officeDocument/2006/math">
+                    <m:sSub>
+                      <m:sSubPr>
+                        <m:ctrlPr>
+                          <a:rPr lang="en-CA" b="0" i="1" smtClean="0">
+                            <a:solidFill>
+                              <a:schemeClr val="tx1"/>
+                            </a:solidFill>
+                            <a:latin typeface="Cambria Math" panose="02040503050406030204" pitchFamily="18" charset="0"/>
+                          </a:rPr>
+                        </m:ctrlPr>
+                      </m:sSubPr>
+                      <m:e>
+                        <m:r>
+                          <a:rPr lang="en-CA" b="0" i="1" smtClean="0">
+                            <a:solidFill>
+                              <a:schemeClr val="tx1"/>
+                            </a:solidFill>
+                            <a:latin typeface="Cambria Math" panose="02040503050406030204" pitchFamily="18" charset="0"/>
+                          </a:rPr>
+                          <m:t>𝑃</m:t>
+                        </m:r>
+                      </m:e>
+                      <m:sub>
+                        <m:r>
+                          <a:rPr lang="en-CA" b="0" i="1" smtClean="0">
+                            <a:solidFill>
+                              <a:schemeClr val="tx1"/>
+                            </a:solidFill>
+                            <a:latin typeface="Cambria Math" panose="02040503050406030204" pitchFamily="18" charset="0"/>
+                          </a:rPr>
+                          <m:t>𝑖</m:t>
+                        </m:r>
+                      </m:sub>
+                    </m:sSub>
+                    <m:r>
+                      <a:rPr lang="en-CA" b="0" i="1" smtClean="0">
+                        <a:solidFill>
+                          <a:schemeClr val="tx1"/>
+                        </a:solidFill>
+                        <a:latin typeface="Cambria Math" panose="02040503050406030204" pitchFamily="18" charset="0"/>
+                      </a:rPr>
+                      <m:t>=</m:t>
+                    </m:r>
+                    <m:f>
+                      <m:fPr>
+                        <m:ctrlPr>
+                          <a:rPr lang="en-CA" b="0" i="1" smtClean="0">
+                            <a:solidFill>
+                              <a:schemeClr val="tx1"/>
+                            </a:solidFill>
+                            <a:latin typeface="Cambria Math" panose="02040503050406030204" pitchFamily="18" charset="0"/>
+                          </a:rPr>
+                        </m:ctrlPr>
+                      </m:fPr>
+                      <m:num>
+                        <m:r>
+                          <a:rPr lang="en-CA" b="0" i="1" smtClean="0">
+                            <a:solidFill>
+                              <a:schemeClr val="tx1"/>
+                            </a:solidFill>
+                            <a:latin typeface="Cambria Math" panose="02040503050406030204" pitchFamily="18" charset="0"/>
+                          </a:rPr>
+                          <m:t>𝑛𝑢𝑚𝑏𝑒𝑟</m:t>
+                        </m:r>
+                        <m:r>
+                          <a:rPr lang="en-CA" b="0" i="1" smtClean="0">
+                            <a:solidFill>
+                              <a:schemeClr val="tx1"/>
+                            </a:solidFill>
+                            <a:latin typeface="Cambria Math" panose="02040503050406030204" pitchFamily="18" charset="0"/>
+                          </a:rPr>
+                          <m:t> </m:t>
+                        </m:r>
+                        <m:r>
+                          <a:rPr lang="en-CA" b="0" i="1" smtClean="0">
+                            <a:solidFill>
+                              <a:schemeClr val="tx1"/>
+                            </a:solidFill>
+                            <a:latin typeface="Cambria Math" panose="02040503050406030204" pitchFamily="18" charset="0"/>
+                          </a:rPr>
+                          <m:t>𝑜𝑓</m:t>
+                        </m:r>
+                        <m:r>
+                          <a:rPr lang="en-CA" b="0" i="1" smtClean="0">
+                            <a:solidFill>
+                              <a:schemeClr val="tx1"/>
+                            </a:solidFill>
+                            <a:latin typeface="Cambria Math" panose="02040503050406030204" pitchFamily="18" charset="0"/>
+                          </a:rPr>
+                          <m:t> </m:t>
+                        </m:r>
+                        <m:r>
+                          <a:rPr lang="en-CA" b="0" i="1" smtClean="0">
+                            <a:solidFill>
+                              <a:schemeClr val="tx1"/>
+                            </a:solidFill>
+                            <a:latin typeface="Cambria Math" panose="02040503050406030204" pitchFamily="18" charset="0"/>
+                          </a:rPr>
+                          <m:t>𝑑𝑜𝑐𝑢𝑚𝑒𝑛𝑡𝑠</m:t>
+                        </m:r>
+                        <m:r>
+                          <a:rPr lang="en-CA" b="0" i="1" smtClean="0">
+                            <a:solidFill>
+                              <a:schemeClr val="tx1"/>
+                            </a:solidFill>
+                            <a:latin typeface="Cambria Math" panose="02040503050406030204" pitchFamily="18" charset="0"/>
+                          </a:rPr>
+                          <m:t> </m:t>
+                        </m:r>
+                        <m:r>
+                          <a:rPr lang="en-CA" b="0" i="1" smtClean="0">
+                            <a:solidFill>
+                              <a:schemeClr val="tx1"/>
+                            </a:solidFill>
+                            <a:latin typeface="Cambria Math" panose="02040503050406030204" pitchFamily="18" charset="0"/>
+                          </a:rPr>
+                          <m:t>𝑐𝑜𝑛𝑡𝑎𝑖𝑛𝑖𝑛𝑔</m:t>
+                        </m:r>
+                        <m:r>
+                          <a:rPr lang="en-CA" b="0" i="1" smtClean="0">
+                            <a:solidFill>
+                              <a:schemeClr val="tx1"/>
+                            </a:solidFill>
+                            <a:latin typeface="Cambria Math" panose="02040503050406030204" pitchFamily="18" charset="0"/>
+                          </a:rPr>
+                          <m:t> </m:t>
+                        </m:r>
+                        <m:r>
+                          <a:rPr lang="en-CA" b="0" i="1" smtClean="0">
+                            <a:solidFill>
+                              <a:schemeClr val="tx1"/>
+                            </a:solidFill>
+                            <a:latin typeface="Cambria Math" panose="02040503050406030204" pitchFamily="18" charset="0"/>
+                          </a:rPr>
+                          <m:t>𝑤𝑜𝑟𝑑</m:t>
+                        </m:r>
+                        <m:r>
+                          <a:rPr lang="en-CA" b="0" i="1" smtClean="0">
+                            <a:solidFill>
+                              <a:schemeClr val="tx1"/>
+                            </a:solidFill>
+                            <a:latin typeface="Cambria Math" panose="02040503050406030204" pitchFamily="18" charset="0"/>
+                          </a:rPr>
+                          <m:t> </m:t>
+                        </m:r>
+                        <m:r>
+                          <a:rPr lang="en-CA" b="0" i="1" smtClean="0">
+                            <a:solidFill>
+                              <a:schemeClr val="tx1"/>
+                            </a:solidFill>
+                            <a:latin typeface="Cambria Math" panose="02040503050406030204" pitchFamily="18" charset="0"/>
+                          </a:rPr>
+                          <m:t>𝑖</m:t>
+                        </m:r>
+                      </m:num>
+                      <m:den>
+                        <m:r>
+                          <a:rPr lang="en-CA" b="0" i="1" smtClean="0">
+                            <a:solidFill>
+                              <a:schemeClr val="tx1"/>
+                            </a:solidFill>
+                            <a:latin typeface="Cambria Math" panose="02040503050406030204" pitchFamily="18" charset="0"/>
+                          </a:rPr>
+                          <m:t>𝑛𝑢𝑚𝑏𝑒𝑟</m:t>
+                        </m:r>
+                        <m:r>
+                          <a:rPr lang="en-CA" b="0" i="1" smtClean="0">
+                            <a:solidFill>
+                              <a:schemeClr val="tx1"/>
+                            </a:solidFill>
+                            <a:latin typeface="Cambria Math" panose="02040503050406030204" pitchFamily="18" charset="0"/>
+                          </a:rPr>
+                          <m:t> </m:t>
+                        </m:r>
+                        <m:r>
+                          <a:rPr lang="en-CA" b="0" i="1" smtClean="0">
+                            <a:solidFill>
+                              <a:schemeClr val="tx1"/>
+                            </a:solidFill>
+                            <a:latin typeface="Cambria Math" panose="02040503050406030204" pitchFamily="18" charset="0"/>
+                          </a:rPr>
+                          <m:t>𝑜𝑓</m:t>
+                        </m:r>
+                        <m:r>
+                          <a:rPr lang="en-CA" b="0" i="1" smtClean="0">
+                            <a:solidFill>
+                              <a:schemeClr val="tx1"/>
+                            </a:solidFill>
+                            <a:latin typeface="Cambria Math" panose="02040503050406030204" pitchFamily="18" charset="0"/>
+                          </a:rPr>
+                          <m:t> </m:t>
+                        </m:r>
+                        <m:r>
+                          <a:rPr lang="en-CA" b="0" i="1" smtClean="0">
+                            <a:solidFill>
+                              <a:schemeClr val="tx1"/>
+                            </a:solidFill>
+                            <a:latin typeface="Cambria Math" panose="02040503050406030204" pitchFamily="18" charset="0"/>
+                          </a:rPr>
+                          <m:t>𝑑𝑜𝑐𝑢𝑚𝑒𝑛𝑡𝑠</m:t>
+                        </m:r>
+                      </m:den>
+                    </m:f>
+                  </m:oMath>
+                </a14:m>
+                <a:endParaRPr lang="en-CA" dirty="0" smtClean="0">
+                  <a:solidFill>
+                    <a:schemeClr val="tx1"/>
+                  </a:solidFill>
+                </a:endParaRPr>
+              </a:p>
+              <a:p>
+                <a:r>
+                  <a:rPr lang="en-CA" dirty="0" smtClean="0"/>
+                  <a:t>Constituted feature vector structure and values, respectively</a:t>
+                </a:r>
+                <a:endParaRPr lang="en-CA" dirty="0" smtClean="0">
+                  <a:solidFill>
+                    <a:schemeClr val="tx1"/>
+                  </a:solidFill>
+                </a:endParaRPr>
+              </a:p>
+            </p:txBody>
+          </p:sp>
+        </mc:Choice>
+        <mc:Fallback xmlns="">
+          <p:sp>
+            <p:nvSpPr>
+              <p:cNvPr id="3" name="Content Placeholder 2"/>
+              <p:cNvSpPr>
+                <a:spLocks noGrp="1" noRot="1" noChangeAspect="1" noMove="1" noResize="1" noEditPoints="1" noAdjustHandles="1" noChangeArrowheads="1" noChangeShapeType="1" noTextEdit="1"/>
+              </p:cNvSpPr>
+              <p:nvPr>
+                <p:ph idx="1"/>
+              </p:nvPr>
+            </p:nvSpPr>
+            <p:spPr>
+              <a:xfrm>
+                <a:off x="684212" y="1782617"/>
+                <a:ext cx="8534400" cy="4389583"/>
+              </a:xfrm>
+              <a:blipFill rotWithShape="0">
+                <a:blip r:embed="rId2"/>
+                <a:stretch>
+                  <a:fillRect l="-1071" t="-2913" r="-2000"/>
+                </a:stretch>
+              </a:blipFill>
+            </p:spPr>
+            <p:txBody>
+              <a:bodyPr/>
+              <a:lstStyle/>
+              <a:p>
+                <a:r>
+                  <a:rPr lang="en-CA">
+                    <a:noFill/>
+                  </a:rPr>
+                  <a:t> </a:t>
+                </a:r>
+              </a:p>
+            </p:txBody>
+          </p:sp>
+        </mc:Fallback>
+      </mc:AlternateContent>
     </p:spTree>
     <p:extLst>
       <p:ext uri="{BB962C8B-B14F-4D97-AF65-F5344CB8AC3E}">
-        <p14:creationId xmlns:p14="http://schemas.microsoft.com/office/powerpoint/2010/main" val="2350446598"/>
+        <p14:creationId xmlns:p14="http://schemas.microsoft.com/office/powerpoint/2010/main" val="2502465700"/>
       </p:ext>
     </p:extLst>
   </p:cSld>
@@ -9456,20 +10392,16 @@
           <a:lstStyle/>
           <a:p>
             <a:r>
-              <a:rPr lang="en-CA" dirty="0" err="1"/>
+              <a:rPr lang="en-CA" dirty="0" err="1" smtClean="0"/>
               <a:t>Khazaei</a:t>
             </a:r>
             <a:r>
-              <a:rPr lang="en-CA" dirty="0"/>
+              <a:rPr lang="en-CA" dirty="0" smtClean="0"/>
               <a:t> </a:t>
             </a:r>
             <a:r>
               <a:rPr lang="en-US" dirty="0" smtClean="0"/>
-              <a:t>et </a:t>
-            </a:r>
-            <a:r>
-              <a:rPr lang="en-US" dirty="0" smtClean="0"/>
-              <a:t>al. - Discussion</a:t>
+              <a:t>et al. - Methods</a:t>
             </a:r>
             <a:endParaRPr lang="en-CA" dirty="0"/>
           </a:p>
@@ -9485,19 +10417,39 @@
             <p:ph idx="1"/>
           </p:nvPr>
         </p:nvSpPr>
-        <p:spPr/>
+        <p:spPr>
+          <a:xfrm>
+            <a:off x="684212" y="1782617"/>
+            <a:ext cx="8534400" cy="4389583"/>
+          </a:xfrm>
+        </p:spPr>
         <p:txBody>
-          <a:bodyPr/>
+          <a:bodyPr>
+            <a:normAutofit/>
+          </a:bodyPr>
           <a:lstStyle/>
           <a:p>
-            <a:endParaRPr lang="en-US" dirty="0" smtClean="0"/>
+            <a:r>
+              <a:rPr lang="en-CA" dirty="0" smtClean="0"/>
+              <a:t>Used linear discriminant analysis (LDA) and principal component analysis (PCA) to reduce feature vector dimensionality</a:t>
+            </a:r>
+          </a:p>
+          <a:p>
+            <a:r>
+              <a:rPr lang="en-CA" dirty="0" smtClean="0">
+                <a:solidFill>
+                  <a:schemeClr val="tx1"/>
+                </a:solidFill>
+              </a:rPr>
+              <a:t>Divided CVSS score scale into 10 classes</a:t>
+            </a:r>
           </a:p>
         </p:txBody>
       </p:sp>
     </p:spTree>
     <p:extLst>
       <p:ext uri="{BB962C8B-B14F-4D97-AF65-F5344CB8AC3E}">
-        <p14:creationId xmlns:p14="http://schemas.microsoft.com/office/powerpoint/2010/main" val="4164120507"/>
+        <p14:creationId xmlns:p14="http://schemas.microsoft.com/office/powerpoint/2010/main" val="3110016790"/>
       </p:ext>
     </p:extLst>
   </p:cSld>
@@ -9547,8 +10499,576 @@
           <a:lstStyle/>
           <a:p>
             <a:r>
+              <a:rPr lang="en-CA" dirty="0" err="1" smtClean="0"/>
+              <a:t>Khazaei</a:t>
+            </a:r>
+            <a:r>
+              <a:rPr lang="en-CA" dirty="0" smtClean="0"/>
+              <a:t> </a:t>
+            </a:r>
+            <a:r>
               <a:rPr lang="en-US" dirty="0" smtClean="0"/>
-              <a:t>References</a:t>
+              <a:t>et al. - Methods</a:t>
+            </a:r>
+            <a:endParaRPr lang="en-CA" dirty="0"/>
+          </a:p>
+        </p:txBody>
+      </p:sp>
+      <p:sp>
+        <p:nvSpPr>
+          <p:cNvPr id="3" name="Content Placeholder 2"/>
+          <p:cNvSpPr>
+            <a:spLocks noGrp="1"/>
+          </p:cNvSpPr>
+          <p:nvPr>
+            <p:ph idx="1"/>
+          </p:nvPr>
+        </p:nvSpPr>
+        <p:spPr>
+          <a:xfrm>
+            <a:off x="684212" y="1782617"/>
+            <a:ext cx="8534400" cy="4389583"/>
+          </a:xfrm>
+        </p:spPr>
+        <p:txBody>
+          <a:bodyPr>
+            <a:normAutofit/>
+          </a:bodyPr>
+          <a:lstStyle/>
+          <a:p>
+            <a:r>
+              <a:rPr lang="en-US" dirty="0" smtClean="0">
+                <a:solidFill>
+                  <a:schemeClr val="tx1"/>
+                </a:solidFill>
+              </a:rPr>
+              <a:t>Used support vector machine and random forest to classify vulnerability feature vectors</a:t>
+            </a:r>
+          </a:p>
+          <a:p>
+            <a:r>
+              <a:rPr lang="en-US" dirty="0" smtClean="0">
+                <a:solidFill>
+                  <a:schemeClr val="tx1"/>
+                </a:solidFill>
+              </a:rPr>
+              <a:t>Performed on data without dimension reduction, LDA, and LDA + PCA</a:t>
+            </a:r>
+            <a:endParaRPr lang="en-CA" dirty="0" smtClean="0">
+              <a:solidFill>
+                <a:schemeClr val="tx1"/>
+              </a:solidFill>
+            </a:endParaRPr>
+          </a:p>
+        </p:txBody>
+      </p:sp>
+    </p:spTree>
+    <p:extLst>
+      <p:ext uri="{BB962C8B-B14F-4D97-AF65-F5344CB8AC3E}">
+        <p14:creationId xmlns:p14="http://schemas.microsoft.com/office/powerpoint/2010/main" val="997581937"/>
+      </p:ext>
+    </p:extLst>
+  </p:cSld>
+  <p:clrMapOvr>
+    <a:masterClrMapping/>
+  </p:clrMapOvr>
+  <p:timing>
+    <p:tnLst>
+      <p:par>
+        <p:cTn id="1" dur="indefinite" restart="never" nodeType="tmRoot"/>
+      </p:par>
+    </p:tnLst>
+  </p:timing>
+</p:sld>
+</file>
+
+<file path=ppt/slides/slide28.xml><?xml version="1.0" encoding="utf-8"?>
+<p:sld xmlns:a="http://schemas.openxmlformats.org/drawingml/2006/main" xmlns:r="http://schemas.openxmlformats.org/officeDocument/2006/relationships" xmlns:p="http://schemas.openxmlformats.org/presentationml/2006/main">
+  <p:cSld>
+    <p:spTree>
+      <p:nvGrpSpPr>
+        <p:cNvPr id="1" name=""/>
+        <p:cNvGrpSpPr/>
+        <p:nvPr/>
+      </p:nvGrpSpPr>
+      <p:grpSpPr>
+        <a:xfrm>
+          <a:off x="0" y="0"/>
+          <a:ext cx="0" cy="0"/>
+          <a:chOff x="0" y="0"/>
+          <a:chExt cx="0" cy="0"/>
+        </a:xfrm>
+      </p:grpSpPr>
+      <p:sp>
+        <p:nvSpPr>
+          <p:cNvPr id="2" name="Title 1"/>
+          <p:cNvSpPr>
+            <a:spLocks noGrp="1"/>
+          </p:cNvSpPr>
+          <p:nvPr>
+            <p:ph type="title"/>
+          </p:nvPr>
+        </p:nvSpPr>
+        <p:spPr/>
+        <p:txBody>
+          <a:bodyPr/>
+          <a:lstStyle/>
+          <a:p>
+            <a:r>
+              <a:rPr lang="en-CA" dirty="0" err="1" smtClean="0"/>
+              <a:t>Khazaei</a:t>
+            </a:r>
+            <a:r>
+              <a:rPr lang="en-CA" dirty="0" smtClean="0"/>
+              <a:t> </a:t>
+            </a:r>
+            <a:r>
+              <a:rPr lang="en-US" dirty="0" smtClean="0"/>
+              <a:t>et al. - Methods</a:t>
+            </a:r>
+            <a:endParaRPr lang="en-CA" dirty="0"/>
+          </a:p>
+        </p:txBody>
+      </p:sp>
+      <mc:AlternateContent xmlns:mc="http://schemas.openxmlformats.org/markup-compatibility/2006">
+        <mc:Choice xmlns:a14="http://schemas.microsoft.com/office/drawing/2010/main" Requires="a14">
+          <p:sp>
+            <p:nvSpPr>
+              <p:cNvPr id="3" name="Content Placeholder 2"/>
+              <p:cNvSpPr>
+                <a:spLocks noGrp="1"/>
+              </p:cNvSpPr>
+              <p:nvPr>
+                <p:ph idx="1"/>
+              </p:nvPr>
+            </p:nvSpPr>
+            <p:spPr>
+              <a:xfrm>
+                <a:off x="684212" y="1782617"/>
+                <a:ext cx="8534400" cy="4389583"/>
+              </a:xfrm>
+            </p:spPr>
+            <p:txBody>
+              <a:bodyPr>
+                <a:normAutofit/>
+              </a:bodyPr>
+              <a:lstStyle/>
+              <a:p>
+                <a:r>
+                  <a:rPr lang="en-US" dirty="0" smtClean="0">
+                    <a:solidFill>
+                      <a:schemeClr val="tx1"/>
+                    </a:solidFill>
+                  </a:rPr>
+                  <a:t>Trained fuzzy system to output CVSS score</a:t>
+                </a:r>
+              </a:p>
+              <a:p>
+                <a:r>
+                  <a:rPr lang="en-US" dirty="0" smtClean="0"/>
+                  <a:t>Used Gaussian membership function:</a:t>
+                </a:r>
+              </a:p>
+              <a:p>
+                <a:pPr lvl="1"/>
+                <a14:m>
+                  <m:oMath xmlns:m="http://schemas.openxmlformats.org/officeDocument/2006/math">
+                    <m:sSub>
+                      <m:sSubPr>
+                        <m:ctrlPr>
+                          <a:rPr lang="en-US" sz="3200" b="0" i="1" smtClean="0">
+                            <a:solidFill>
+                              <a:schemeClr val="tx1"/>
+                            </a:solidFill>
+                            <a:latin typeface="Cambria Math" panose="02040503050406030204" pitchFamily="18" charset="0"/>
+                          </a:rPr>
+                        </m:ctrlPr>
+                      </m:sSubPr>
+                      <m:e>
+                        <m:r>
+                          <a:rPr lang="en-US" sz="3200" b="0" i="1" smtClean="0">
+                            <a:solidFill>
+                              <a:schemeClr val="tx1"/>
+                            </a:solidFill>
+                            <a:latin typeface="Cambria Math" panose="02040503050406030204" pitchFamily="18" charset="0"/>
+                          </a:rPr>
+                          <m:t>𝜇</m:t>
+                        </m:r>
+                      </m:e>
+                      <m:sub>
+                        <m:r>
+                          <a:rPr lang="en-US" sz="3200" b="0" i="1" smtClean="0">
+                            <a:solidFill>
+                              <a:schemeClr val="tx1"/>
+                            </a:solidFill>
+                            <a:latin typeface="Cambria Math" panose="02040503050406030204" pitchFamily="18" charset="0"/>
+                          </a:rPr>
+                          <m:t>𝑖</m:t>
+                        </m:r>
+                      </m:sub>
+                    </m:sSub>
+                    <m:d>
+                      <m:dPr>
+                        <m:ctrlPr>
+                          <a:rPr lang="en-US" sz="3200" b="0" i="1" smtClean="0">
+                            <a:solidFill>
+                              <a:schemeClr val="tx1"/>
+                            </a:solidFill>
+                            <a:latin typeface="Cambria Math" panose="02040503050406030204" pitchFamily="18" charset="0"/>
+                          </a:rPr>
+                        </m:ctrlPr>
+                      </m:dPr>
+                      <m:e>
+                        <m:r>
+                          <a:rPr lang="en-US" sz="3200" b="0" i="1" smtClean="0">
+                            <a:solidFill>
+                              <a:schemeClr val="tx1"/>
+                            </a:solidFill>
+                            <a:latin typeface="Cambria Math" panose="02040503050406030204" pitchFamily="18" charset="0"/>
+                          </a:rPr>
+                          <m:t>𝑥</m:t>
+                        </m:r>
+                      </m:e>
+                    </m:d>
+                    <m:r>
+                      <a:rPr lang="en-US" sz="3200" b="0" i="1" smtClean="0">
+                        <a:solidFill>
+                          <a:schemeClr val="tx1"/>
+                        </a:solidFill>
+                        <a:latin typeface="Cambria Math" panose="02040503050406030204" pitchFamily="18" charset="0"/>
+                      </a:rPr>
+                      <m:t>=</m:t>
+                    </m:r>
+                    <m:sSup>
+                      <m:sSupPr>
+                        <m:ctrlPr>
+                          <a:rPr lang="en-US" sz="3200" b="0" i="1" smtClean="0">
+                            <a:solidFill>
+                              <a:schemeClr val="tx1"/>
+                            </a:solidFill>
+                            <a:latin typeface="Cambria Math" panose="02040503050406030204" pitchFamily="18" charset="0"/>
+                          </a:rPr>
+                        </m:ctrlPr>
+                      </m:sSupPr>
+                      <m:e>
+                        <m:r>
+                          <a:rPr lang="en-US" sz="3200" b="0" i="1" smtClean="0">
+                            <a:solidFill>
+                              <a:schemeClr val="tx1"/>
+                            </a:solidFill>
+                            <a:latin typeface="Cambria Math" panose="02040503050406030204" pitchFamily="18" charset="0"/>
+                          </a:rPr>
+                          <m:t>𝑒</m:t>
+                        </m:r>
+                      </m:e>
+                      <m:sup>
+                        <m:r>
+                          <a:rPr lang="en-US" sz="3200" b="0" i="1" smtClean="0">
+                            <a:solidFill>
+                              <a:schemeClr val="tx1"/>
+                            </a:solidFill>
+                            <a:latin typeface="Cambria Math" panose="02040503050406030204" pitchFamily="18" charset="0"/>
+                          </a:rPr>
+                          <m:t>−</m:t>
+                        </m:r>
+                        <m:f>
+                          <m:fPr>
+                            <m:ctrlPr>
+                              <a:rPr lang="en-US" sz="3200" b="0" i="1" smtClean="0">
+                                <a:solidFill>
+                                  <a:schemeClr val="tx1"/>
+                                </a:solidFill>
+                                <a:latin typeface="Cambria Math" panose="02040503050406030204" pitchFamily="18" charset="0"/>
+                              </a:rPr>
+                            </m:ctrlPr>
+                          </m:fPr>
+                          <m:num>
+                            <m:r>
+                              <a:rPr lang="en-US" sz="3200" b="0" i="1" smtClean="0">
+                                <a:solidFill>
+                                  <a:schemeClr val="tx1"/>
+                                </a:solidFill>
+                                <a:latin typeface="Cambria Math" panose="02040503050406030204" pitchFamily="18" charset="0"/>
+                              </a:rPr>
+                              <m:t>1</m:t>
+                            </m:r>
+                          </m:num>
+                          <m:den>
+                            <m:r>
+                              <a:rPr lang="en-US" sz="3200" b="0" i="1" smtClean="0">
+                                <a:solidFill>
+                                  <a:schemeClr val="tx1"/>
+                                </a:solidFill>
+                                <a:latin typeface="Cambria Math" panose="02040503050406030204" pitchFamily="18" charset="0"/>
+                              </a:rPr>
+                              <m:t>2</m:t>
+                            </m:r>
+                          </m:den>
+                        </m:f>
+                        <m:sSup>
+                          <m:sSupPr>
+                            <m:ctrlPr>
+                              <a:rPr lang="en-US" sz="3200" b="0" i="1" smtClean="0">
+                                <a:solidFill>
+                                  <a:schemeClr val="tx1"/>
+                                </a:solidFill>
+                                <a:latin typeface="Cambria Math" panose="02040503050406030204" pitchFamily="18" charset="0"/>
+                              </a:rPr>
+                            </m:ctrlPr>
+                          </m:sSupPr>
+                          <m:e>
+                            <m:d>
+                              <m:dPr>
+                                <m:ctrlPr>
+                                  <a:rPr lang="en-US" sz="3200" b="0" i="1" smtClean="0">
+                                    <a:solidFill>
+                                      <a:schemeClr val="tx1"/>
+                                    </a:solidFill>
+                                    <a:latin typeface="Cambria Math" panose="02040503050406030204" pitchFamily="18" charset="0"/>
+                                  </a:rPr>
+                                </m:ctrlPr>
+                              </m:dPr>
+                              <m:e>
+                                <m:f>
+                                  <m:fPr>
+                                    <m:ctrlPr>
+                                      <a:rPr lang="en-US" sz="3200" b="0" i="1" smtClean="0">
+                                        <a:solidFill>
+                                          <a:schemeClr val="tx1"/>
+                                        </a:solidFill>
+                                        <a:latin typeface="Cambria Math" panose="02040503050406030204" pitchFamily="18" charset="0"/>
+                                      </a:rPr>
+                                    </m:ctrlPr>
+                                  </m:fPr>
+                                  <m:num>
+                                    <m:r>
+                                      <a:rPr lang="en-US" sz="3200" b="0" i="1" smtClean="0">
+                                        <a:solidFill>
+                                          <a:schemeClr val="tx1"/>
+                                        </a:solidFill>
+                                        <a:latin typeface="Cambria Math" panose="02040503050406030204" pitchFamily="18" charset="0"/>
+                                      </a:rPr>
+                                      <m:t>𝑥</m:t>
+                                    </m:r>
+                                    <m:r>
+                                      <a:rPr lang="en-US" sz="3200" b="0" i="1" smtClean="0">
+                                        <a:solidFill>
+                                          <a:schemeClr val="tx1"/>
+                                        </a:solidFill>
+                                        <a:latin typeface="Cambria Math" panose="02040503050406030204" pitchFamily="18" charset="0"/>
+                                      </a:rPr>
+                                      <m:t>−</m:t>
+                                    </m:r>
+                                    <m:sSub>
+                                      <m:sSubPr>
+                                        <m:ctrlPr>
+                                          <a:rPr lang="en-US" sz="3200" b="0" i="1" smtClean="0">
+                                            <a:solidFill>
+                                              <a:schemeClr val="tx1"/>
+                                            </a:solidFill>
+                                            <a:latin typeface="Cambria Math" panose="02040503050406030204" pitchFamily="18" charset="0"/>
+                                          </a:rPr>
+                                        </m:ctrlPr>
+                                      </m:sSubPr>
+                                      <m:e>
+                                        <m:r>
+                                          <a:rPr lang="en-US" sz="3200" b="0" i="1" smtClean="0">
+                                            <a:solidFill>
+                                              <a:schemeClr val="tx1"/>
+                                            </a:solidFill>
+                                            <a:latin typeface="Cambria Math" panose="02040503050406030204" pitchFamily="18" charset="0"/>
+                                          </a:rPr>
+                                          <m:t>𝑐</m:t>
+                                        </m:r>
+                                      </m:e>
+                                      <m:sub>
+                                        <m:r>
+                                          <a:rPr lang="en-US" sz="3200" b="0" i="1" smtClean="0">
+                                            <a:solidFill>
+                                              <a:schemeClr val="tx1"/>
+                                            </a:solidFill>
+                                            <a:latin typeface="Cambria Math" panose="02040503050406030204" pitchFamily="18" charset="0"/>
+                                          </a:rPr>
+                                          <m:t>𝑖</m:t>
+                                        </m:r>
+                                      </m:sub>
+                                    </m:sSub>
+                                  </m:num>
+                                  <m:den>
+                                    <m:r>
+                                      <a:rPr lang="en-US" sz="3200" b="0" i="1" smtClean="0">
+                                        <a:solidFill>
+                                          <a:schemeClr val="tx1"/>
+                                        </a:solidFill>
+                                        <a:latin typeface="Cambria Math" panose="02040503050406030204" pitchFamily="18" charset="0"/>
+                                      </a:rPr>
+                                      <m:t>𝜎</m:t>
+                                    </m:r>
+                                  </m:den>
+                                </m:f>
+                              </m:e>
+                            </m:d>
+                          </m:e>
+                          <m:sup>
+                            <m:r>
+                              <a:rPr lang="en-US" sz="3200" b="0" i="1" smtClean="0">
+                                <a:solidFill>
+                                  <a:schemeClr val="tx1"/>
+                                </a:solidFill>
+                                <a:latin typeface="Cambria Math" panose="02040503050406030204" pitchFamily="18" charset="0"/>
+                              </a:rPr>
+                              <m:t>2</m:t>
+                            </m:r>
+                          </m:sup>
+                        </m:sSup>
+                      </m:sup>
+                    </m:sSup>
+                  </m:oMath>
+                </a14:m>
+                <a:endParaRPr lang="en-CA" sz="3200" dirty="0" smtClean="0">
+                  <a:solidFill>
+                    <a:schemeClr val="tx1"/>
+                  </a:solidFill>
+                </a:endParaRPr>
+              </a:p>
+              <a:p>
+                <a:r>
+                  <a:rPr lang="en-US" dirty="0" smtClean="0">
+                    <a:solidFill>
+                      <a:schemeClr val="tx1"/>
+                    </a:solidFill>
+                  </a:rPr>
+                  <a:t>Varied </a:t>
+                </a:r>
+                <a:r>
+                  <a:rPr lang="el-GR" dirty="0" smtClean="0">
+                    <a:solidFill>
+                      <a:schemeClr val="tx1"/>
+                    </a:solidFill>
+                  </a:rPr>
+                  <a:t>σ</a:t>
+                </a:r>
+                <a:endParaRPr lang="en-US" dirty="0" smtClean="0">
+                  <a:solidFill>
+                    <a:schemeClr val="tx1"/>
+                  </a:solidFill>
+                </a:endParaRPr>
+              </a:p>
+              <a:p>
+                <a:r>
+                  <a:rPr lang="en-US" dirty="0" smtClean="0"/>
+                  <a:t>Also trained on simulated time-series</a:t>
+                </a:r>
+                <a:endParaRPr lang="en-CA" dirty="0" smtClean="0">
+                  <a:solidFill>
+                    <a:schemeClr val="tx1"/>
+                  </a:solidFill>
+                </a:endParaRPr>
+              </a:p>
+            </p:txBody>
+          </p:sp>
+        </mc:Choice>
+        <mc:Fallback>
+          <p:sp>
+            <p:nvSpPr>
+              <p:cNvPr id="3" name="Content Placeholder 2"/>
+              <p:cNvSpPr>
+                <a:spLocks noGrp="1" noRot="1" noChangeAspect="1" noMove="1" noResize="1" noEditPoints="1" noAdjustHandles="1" noChangeArrowheads="1" noChangeShapeType="1" noTextEdit="1"/>
+              </p:cNvSpPr>
+              <p:nvPr>
+                <p:ph idx="1"/>
+              </p:nvPr>
+            </p:nvSpPr>
+            <p:spPr>
+              <a:xfrm>
+                <a:off x="684212" y="1782617"/>
+                <a:ext cx="8534400" cy="4389583"/>
+              </a:xfrm>
+              <a:blipFill rotWithShape="0">
+                <a:blip r:embed="rId2"/>
+                <a:stretch>
+                  <a:fillRect l="-1071" t="-1803"/>
+                </a:stretch>
+              </a:blipFill>
+            </p:spPr>
+            <p:txBody>
+              <a:bodyPr/>
+              <a:lstStyle/>
+              <a:p>
+                <a:r>
+                  <a:rPr lang="en-CA">
+                    <a:noFill/>
+                  </a:rPr>
+                  <a:t> </a:t>
+                </a:r>
+              </a:p>
+            </p:txBody>
+          </p:sp>
+        </mc:Fallback>
+      </mc:AlternateContent>
+    </p:spTree>
+    <p:extLst>
+      <p:ext uri="{BB962C8B-B14F-4D97-AF65-F5344CB8AC3E}">
+        <p14:creationId xmlns:p14="http://schemas.microsoft.com/office/powerpoint/2010/main" val="2231081893"/>
+      </p:ext>
+    </p:extLst>
+  </p:cSld>
+  <p:clrMapOvr>
+    <a:masterClrMapping/>
+  </p:clrMapOvr>
+  <p:timing>
+    <p:tnLst>
+      <p:par>
+        <p:cTn id="1" dur="indefinite" restart="never" nodeType="tmRoot"/>
+      </p:par>
+    </p:tnLst>
+  </p:timing>
+</p:sld>
+</file>
+
+<file path=ppt/slides/slide29.xml><?xml version="1.0" encoding="utf-8"?>
+<p:sld xmlns:a="http://schemas.openxmlformats.org/drawingml/2006/main" xmlns:r="http://schemas.openxmlformats.org/officeDocument/2006/relationships" xmlns:p="http://schemas.openxmlformats.org/presentationml/2006/main">
+  <p:cSld>
+    <p:spTree>
+      <p:nvGrpSpPr>
+        <p:cNvPr id="1" name=""/>
+        <p:cNvGrpSpPr/>
+        <p:nvPr/>
+      </p:nvGrpSpPr>
+      <p:grpSpPr>
+        <a:xfrm>
+          <a:off x="0" y="0"/>
+          <a:ext cx="0" cy="0"/>
+          <a:chOff x="0" y="0"/>
+          <a:chExt cx="0" cy="0"/>
+        </a:xfrm>
+      </p:grpSpPr>
+      <p:sp>
+        <p:nvSpPr>
+          <p:cNvPr id="2" name="Title 1"/>
+          <p:cNvSpPr>
+            <a:spLocks noGrp="1"/>
+          </p:cNvSpPr>
+          <p:nvPr>
+            <p:ph type="title"/>
+          </p:nvPr>
+        </p:nvSpPr>
+        <p:spPr/>
+        <p:txBody>
+          <a:bodyPr/>
+          <a:lstStyle/>
+          <a:p>
+            <a:r>
+              <a:rPr lang="en-CA" dirty="0" err="1" smtClean="0"/>
+              <a:t>Khazaei</a:t>
+            </a:r>
+            <a:r>
+              <a:rPr lang="en-CA" dirty="0" smtClean="0"/>
+              <a:t> </a:t>
+            </a:r>
+            <a:r>
+              <a:rPr lang="en-US" dirty="0" smtClean="0"/>
+              <a:t>et al. – Results</a:t>
             </a:r>
             <a:endParaRPr lang="en-CA" dirty="0"/>
           </a:p>
@@ -9569,7 +11089,433 @@
           <a:bodyPr/>
           <a:lstStyle/>
           <a:p>
-            <a:endParaRPr lang="en-CA"/>
+            <a:r>
+              <a:rPr lang="en-US" dirty="0" smtClean="0"/>
+              <a:t>Of SVM and Random-Forest, SVM had best accuracy at 86% for LDA data</a:t>
+            </a:r>
+          </a:p>
+          <a:p>
+            <a:r>
+              <a:rPr lang="en-US" dirty="0" smtClean="0"/>
+              <a:t>Offline fuzzy system had 88%</a:t>
+            </a:r>
+          </a:p>
+          <a:p>
+            <a:r>
+              <a:rPr lang="en-US" dirty="0" smtClean="0"/>
+              <a:t>Online, simulated time-series error converged at ~ 22% cumulative error</a:t>
+            </a:r>
+            <a:endParaRPr lang="en-CA" dirty="0"/>
+          </a:p>
+        </p:txBody>
+      </p:sp>
+    </p:spTree>
+    <p:extLst>
+      <p:ext uri="{BB962C8B-B14F-4D97-AF65-F5344CB8AC3E}">
+        <p14:creationId xmlns:p14="http://schemas.microsoft.com/office/powerpoint/2010/main" val="2996095208"/>
+      </p:ext>
+    </p:extLst>
+  </p:cSld>
+  <p:clrMapOvr>
+    <a:masterClrMapping/>
+  </p:clrMapOvr>
+  <p:timing>
+    <p:tnLst>
+      <p:par>
+        <p:cTn id="1" dur="indefinite" restart="never" nodeType="tmRoot"/>
+      </p:par>
+    </p:tnLst>
+  </p:timing>
+</p:sld>
+</file>
+
+<file path=ppt/slides/slide3.xml><?xml version="1.0" encoding="utf-8"?>
+<p:sld xmlns:a="http://schemas.openxmlformats.org/drawingml/2006/main" xmlns:r="http://schemas.openxmlformats.org/officeDocument/2006/relationships" xmlns:p="http://schemas.openxmlformats.org/presentationml/2006/main">
+  <p:cSld>
+    <p:spTree>
+      <p:nvGrpSpPr>
+        <p:cNvPr id="1" name=""/>
+        <p:cNvGrpSpPr/>
+        <p:nvPr/>
+      </p:nvGrpSpPr>
+      <p:grpSpPr>
+        <a:xfrm>
+          <a:off x="0" y="0"/>
+          <a:ext cx="0" cy="0"/>
+          <a:chOff x="0" y="0"/>
+          <a:chExt cx="0" cy="0"/>
+        </a:xfrm>
+      </p:grpSpPr>
+      <p:sp>
+        <p:nvSpPr>
+          <p:cNvPr id="2" name="Title 1"/>
+          <p:cNvSpPr>
+            <a:spLocks noGrp="1"/>
+          </p:cNvSpPr>
+          <p:nvPr>
+            <p:ph type="title"/>
+          </p:nvPr>
+        </p:nvSpPr>
+        <p:spPr>
+          <a:xfrm>
+            <a:off x="1492313" y="1394234"/>
+            <a:ext cx="9207375" cy="4037845"/>
+          </a:xfrm>
+        </p:spPr>
+        <p:txBody>
+          <a:bodyPr>
+            <a:normAutofit/>
+          </a:bodyPr>
+          <a:lstStyle/>
+          <a:p>
+            <a:pPr algn="ctr"/>
+            <a:r>
+              <a:rPr lang="en-US" dirty="0" smtClean="0"/>
+              <a:t>Background - CVSS</a:t>
+            </a:r>
+            <a:r>
+              <a:rPr lang="en-US" dirty="0" smtClean="0"/>
+              <a:t/>
+            </a:r>
+            <a:br>
+              <a:rPr lang="en-US" dirty="0" smtClean="0"/>
+            </a:br>
+            <a:endParaRPr lang="en-CA" dirty="0"/>
+          </a:p>
+        </p:txBody>
+      </p:sp>
+    </p:spTree>
+    <p:extLst>
+      <p:ext uri="{BB962C8B-B14F-4D97-AF65-F5344CB8AC3E}">
+        <p14:creationId xmlns:p14="http://schemas.microsoft.com/office/powerpoint/2010/main" val="159130381"/>
+      </p:ext>
+    </p:extLst>
+  </p:cSld>
+  <p:clrMapOvr>
+    <a:masterClrMapping/>
+  </p:clrMapOvr>
+  <p:timing>
+    <p:tnLst>
+      <p:par>
+        <p:cTn id="1" dur="indefinite" restart="never" nodeType="tmRoot"/>
+      </p:par>
+    </p:tnLst>
+  </p:timing>
+</p:sld>
+</file>
+
+<file path=ppt/slides/slide30.xml><?xml version="1.0" encoding="utf-8"?>
+<p:sld xmlns:a="http://schemas.openxmlformats.org/drawingml/2006/main" xmlns:r="http://schemas.openxmlformats.org/officeDocument/2006/relationships" xmlns:p="http://schemas.openxmlformats.org/presentationml/2006/main">
+  <p:cSld>
+    <p:spTree>
+      <p:nvGrpSpPr>
+        <p:cNvPr id="1" name=""/>
+        <p:cNvGrpSpPr/>
+        <p:nvPr/>
+      </p:nvGrpSpPr>
+      <p:grpSpPr>
+        <a:xfrm>
+          <a:off x="0" y="0"/>
+          <a:ext cx="0" cy="0"/>
+          <a:chOff x="0" y="0"/>
+          <a:chExt cx="0" cy="0"/>
+        </a:xfrm>
+      </p:grpSpPr>
+      <p:sp>
+        <p:nvSpPr>
+          <p:cNvPr id="2" name="Title 1"/>
+          <p:cNvSpPr>
+            <a:spLocks noGrp="1"/>
+          </p:cNvSpPr>
+          <p:nvPr>
+            <p:ph type="title"/>
+          </p:nvPr>
+        </p:nvSpPr>
+        <p:spPr/>
+        <p:txBody>
+          <a:bodyPr/>
+          <a:lstStyle/>
+          <a:p>
+            <a:r>
+              <a:rPr lang="en-CA" dirty="0" err="1" smtClean="0"/>
+              <a:t>Khazaei</a:t>
+            </a:r>
+            <a:r>
+              <a:rPr lang="en-CA" dirty="0" smtClean="0"/>
+              <a:t> </a:t>
+            </a:r>
+            <a:r>
+              <a:rPr lang="en-US" dirty="0" smtClean="0"/>
+              <a:t>et al. - Discussion</a:t>
+            </a:r>
+            <a:endParaRPr lang="en-CA" dirty="0"/>
+          </a:p>
+        </p:txBody>
+      </p:sp>
+      <p:sp>
+        <p:nvSpPr>
+          <p:cNvPr id="3" name="Content Placeholder 2"/>
+          <p:cNvSpPr>
+            <a:spLocks noGrp="1"/>
+          </p:cNvSpPr>
+          <p:nvPr>
+            <p:ph idx="1"/>
+          </p:nvPr>
+        </p:nvSpPr>
+        <p:spPr/>
+        <p:txBody>
+          <a:bodyPr/>
+          <a:lstStyle/>
+          <a:p>
+            <a:r>
+              <a:rPr lang="en-US" dirty="0" smtClean="0"/>
+              <a:t>Automatic CVSS prediction reduces human errors and improves speed</a:t>
+            </a:r>
+          </a:p>
+          <a:p>
+            <a:r>
+              <a:rPr lang="en-US" dirty="0" smtClean="0"/>
+              <a:t>The fuzzy system, easier and faster, outperformed SVM and Random-Forest</a:t>
+            </a:r>
+          </a:p>
+          <a:p>
+            <a:endParaRPr lang="en-CA" dirty="0"/>
+          </a:p>
+        </p:txBody>
+      </p:sp>
+    </p:spTree>
+    <p:extLst>
+      <p:ext uri="{BB962C8B-B14F-4D97-AF65-F5344CB8AC3E}">
+        <p14:creationId xmlns:p14="http://schemas.microsoft.com/office/powerpoint/2010/main" val="2350446598"/>
+      </p:ext>
+    </p:extLst>
+  </p:cSld>
+  <p:clrMapOvr>
+    <a:masterClrMapping/>
+  </p:clrMapOvr>
+  <p:timing>
+    <p:tnLst>
+      <p:par>
+        <p:cTn id="1" dur="indefinite" restart="never" nodeType="tmRoot"/>
+      </p:par>
+    </p:tnLst>
+  </p:timing>
+</p:sld>
+</file>
+
+<file path=ppt/slides/slide31.xml><?xml version="1.0" encoding="utf-8"?>
+<p:sld xmlns:a="http://schemas.openxmlformats.org/drawingml/2006/main" xmlns:r="http://schemas.openxmlformats.org/officeDocument/2006/relationships" xmlns:p="http://schemas.openxmlformats.org/presentationml/2006/main">
+  <p:cSld>
+    <p:spTree>
+      <p:nvGrpSpPr>
+        <p:cNvPr id="1" name=""/>
+        <p:cNvGrpSpPr/>
+        <p:nvPr/>
+      </p:nvGrpSpPr>
+      <p:grpSpPr>
+        <a:xfrm>
+          <a:off x="0" y="0"/>
+          <a:ext cx="0" cy="0"/>
+          <a:chOff x="0" y="0"/>
+          <a:chExt cx="0" cy="0"/>
+        </a:xfrm>
+      </p:grpSpPr>
+      <p:sp>
+        <p:nvSpPr>
+          <p:cNvPr id="2" name="Title 1"/>
+          <p:cNvSpPr>
+            <a:spLocks noGrp="1"/>
+          </p:cNvSpPr>
+          <p:nvPr>
+            <p:ph type="title"/>
+          </p:nvPr>
+        </p:nvSpPr>
+        <p:spPr/>
+        <p:txBody>
+          <a:bodyPr/>
+          <a:lstStyle/>
+          <a:p>
+            <a:r>
+              <a:rPr lang="en-CA" dirty="0" err="1"/>
+              <a:t>Khazaei</a:t>
+            </a:r>
+            <a:r>
+              <a:rPr lang="en-CA" dirty="0"/>
+              <a:t> </a:t>
+            </a:r>
+            <a:r>
+              <a:rPr lang="en-US" dirty="0" smtClean="0"/>
+              <a:t>et al. - </a:t>
+            </a:r>
+            <a:r>
+              <a:rPr lang="en-US" dirty="0" smtClean="0"/>
+              <a:t>Commentary</a:t>
+            </a:r>
+            <a:endParaRPr lang="en-CA" dirty="0"/>
+          </a:p>
+        </p:txBody>
+      </p:sp>
+      <p:sp>
+        <p:nvSpPr>
+          <p:cNvPr id="3" name="Content Placeholder 2"/>
+          <p:cNvSpPr>
+            <a:spLocks noGrp="1"/>
+          </p:cNvSpPr>
+          <p:nvPr>
+            <p:ph idx="1"/>
+          </p:nvPr>
+        </p:nvSpPr>
+        <p:spPr/>
+        <p:txBody>
+          <a:bodyPr/>
+          <a:lstStyle/>
+          <a:p>
+            <a:r>
+              <a:rPr lang="en-US" dirty="0" smtClean="0"/>
+              <a:t>Doesn’t reduce human error – human scores are ground truth</a:t>
+            </a:r>
+          </a:p>
+          <a:p>
+            <a:r>
+              <a:rPr lang="en-US" dirty="0" smtClean="0"/>
+              <a:t>Refer to popularity of CVSS rather than validation study</a:t>
+            </a:r>
+            <a:endParaRPr lang="en-US" dirty="0" smtClean="0"/>
+          </a:p>
+        </p:txBody>
+      </p:sp>
+    </p:spTree>
+    <p:extLst>
+      <p:ext uri="{BB962C8B-B14F-4D97-AF65-F5344CB8AC3E}">
+        <p14:creationId xmlns:p14="http://schemas.microsoft.com/office/powerpoint/2010/main" val="4164120507"/>
+      </p:ext>
+    </p:extLst>
+  </p:cSld>
+  <p:clrMapOvr>
+    <a:masterClrMapping/>
+  </p:clrMapOvr>
+  <p:timing>
+    <p:tnLst>
+      <p:par>
+        <p:cTn id="1" dur="indefinite" restart="never" nodeType="tmRoot"/>
+      </p:par>
+    </p:tnLst>
+  </p:timing>
+</p:sld>
+</file>
+
+<file path=ppt/slides/slide32.xml><?xml version="1.0" encoding="utf-8"?>
+<p:sld xmlns:a="http://schemas.openxmlformats.org/drawingml/2006/main" xmlns:r="http://schemas.openxmlformats.org/officeDocument/2006/relationships" xmlns:p="http://schemas.openxmlformats.org/presentationml/2006/main">
+  <p:cSld>
+    <p:spTree>
+      <p:nvGrpSpPr>
+        <p:cNvPr id="1" name=""/>
+        <p:cNvGrpSpPr/>
+        <p:nvPr/>
+      </p:nvGrpSpPr>
+      <p:grpSpPr>
+        <a:xfrm>
+          <a:off x="0" y="0"/>
+          <a:ext cx="0" cy="0"/>
+          <a:chOff x="0" y="0"/>
+          <a:chExt cx="0" cy="0"/>
+        </a:xfrm>
+      </p:grpSpPr>
+      <p:sp>
+        <p:nvSpPr>
+          <p:cNvPr id="2" name="Title 1"/>
+          <p:cNvSpPr>
+            <a:spLocks noGrp="1"/>
+          </p:cNvSpPr>
+          <p:nvPr>
+            <p:ph type="title"/>
+          </p:nvPr>
+        </p:nvSpPr>
+        <p:spPr/>
+        <p:txBody>
+          <a:bodyPr/>
+          <a:lstStyle/>
+          <a:p>
+            <a:r>
+              <a:rPr lang="en-US" dirty="0" smtClean="0"/>
+              <a:t>References</a:t>
+            </a:r>
+            <a:endParaRPr lang="en-CA" dirty="0"/>
+          </a:p>
+        </p:txBody>
+      </p:sp>
+      <p:sp>
+        <p:nvSpPr>
+          <p:cNvPr id="3" name="Content Placeholder 2"/>
+          <p:cNvSpPr>
+            <a:spLocks noGrp="1"/>
+          </p:cNvSpPr>
+          <p:nvPr>
+            <p:ph idx="1"/>
+          </p:nvPr>
+        </p:nvSpPr>
+        <p:spPr/>
+        <p:txBody>
+          <a:bodyPr>
+            <a:normAutofit fontScale="92500" lnSpcReduction="20000"/>
+          </a:bodyPr>
+          <a:lstStyle/>
+          <a:p>
+            <a:pPr marL="514350" indent="-514350">
+              <a:buFont typeface="+mj-lt"/>
+              <a:buAutoNum type="arabicPeriod"/>
+            </a:pPr>
+            <a:r>
+              <a:rPr lang="en-US" dirty="0" err="1" smtClean="0"/>
+              <a:t>Younis</a:t>
+            </a:r>
+            <a:r>
+              <a:rPr lang="en-US" dirty="0" smtClean="0"/>
+              <a:t> A., </a:t>
+            </a:r>
+            <a:r>
+              <a:rPr lang="en-US" dirty="0" err="1" smtClean="0"/>
+              <a:t>Malaiya</a:t>
+            </a:r>
+            <a:r>
+              <a:rPr lang="en-US" dirty="0" smtClean="0"/>
+              <a:t> Y. K., and Ray I. “Evaluating CVSS Base Score Using Vulnerability Reward Programs”. International Federation for Information Processing 2016; 471:62-75.</a:t>
+            </a:r>
+          </a:p>
+          <a:p>
+            <a:pPr marL="514350" indent="-514350">
+              <a:buFont typeface="+mj-lt"/>
+              <a:buAutoNum type="arabicPeriod"/>
+            </a:pPr>
+            <a:r>
+              <a:rPr lang="en-US" dirty="0" err="1" smtClean="0"/>
+              <a:t>Khazaei</a:t>
+            </a:r>
+            <a:r>
+              <a:rPr lang="en-US" dirty="0" smtClean="0"/>
+              <a:t> A., </a:t>
+            </a:r>
+            <a:r>
+              <a:rPr lang="en-US" dirty="0" err="1" smtClean="0"/>
+              <a:t>Ghasemzadeh</a:t>
+            </a:r>
+            <a:r>
+              <a:rPr lang="en-US" dirty="0" smtClean="0"/>
+              <a:t> M., and </a:t>
+            </a:r>
+            <a:r>
+              <a:rPr lang="en-US" dirty="0" err="1" smtClean="0"/>
+              <a:t>Derhami</a:t>
+            </a:r>
+            <a:r>
+              <a:rPr lang="en-US" dirty="0" smtClean="0"/>
+              <a:t> V. “An automatic method for CVSS score prediction using vulnerability description”. Journal of Intelligent &amp; </a:t>
+            </a:r>
+            <a:r>
+              <a:rPr lang="en-US" smtClean="0"/>
+              <a:t>Fuzzy Systems 2016; 30:89-96.</a:t>
+            </a:r>
+            <a:endParaRPr lang="en-CA" dirty="0"/>
           </a:p>
         </p:txBody>
       </p:sp>
@@ -9593,7 +11539,7 @@
 </p:sld>
 </file>
 
-<file path=ppt/slides/slide28.xml><?xml version="1.0" encoding="utf-8"?>
+<file path=ppt/slides/slide33.xml><?xml version="1.0" encoding="utf-8"?>
 <p:sld xmlns:a="http://schemas.openxmlformats.org/drawingml/2006/main" xmlns:r="http://schemas.openxmlformats.org/officeDocument/2006/relationships" xmlns:p="http://schemas.openxmlformats.org/presentationml/2006/main">
   <p:cSld>
     <p:spTree>
@@ -9735,7 +11681,7 @@
 </p:sld>
 </file>
 
-<file path=ppt/slides/slide29.xml><?xml version="1.0" encoding="utf-8"?>
+<file path=ppt/slides/slide34.xml><?xml version="1.0" encoding="utf-8"?>
 <p:sld xmlns:a="http://schemas.openxmlformats.org/drawingml/2006/main" xmlns:r="http://schemas.openxmlformats.org/officeDocument/2006/relationships" xmlns:p="http://schemas.openxmlformats.org/presentationml/2006/main">
   <p:cSld>
     <p:spTree>
@@ -10787,7 +12733,7 @@
 </p:sld>
 </file>
 
-<file path=ppt/slides/slide3.xml><?xml version="1.0" encoding="utf-8"?>
+<file path=ppt/slides/slide35.xml><?xml version="1.0" encoding="utf-8"?>
 <p:sld xmlns:a="http://schemas.openxmlformats.org/drawingml/2006/main" xmlns:r="http://schemas.openxmlformats.org/officeDocument/2006/relationships" xmlns:p="http://schemas.openxmlformats.org/presentationml/2006/main">
   <p:cSld>
     <p:spTree>
@@ -10821,111 +12767,6 @@
           <a:p>
             <a:r>
               <a:rPr lang="en-US" dirty="0" smtClean="0"/>
-              <a:t>Background - </a:t>
-            </a:r>
-            <a:r>
-              <a:rPr lang="en-US" dirty="0" err="1" smtClean="0"/>
-              <a:t>cvss</a:t>
-            </a:r>
-            <a:endParaRPr lang="en-CA" dirty="0"/>
-          </a:p>
-        </p:txBody>
-      </p:sp>
-      <p:sp>
-        <p:nvSpPr>
-          <p:cNvPr id="3" name="Content Placeholder 2"/>
-          <p:cNvSpPr>
-            <a:spLocks noGrp="1"/>
-          </p:cNvSpPr>
-          <p:nvPr>
-            <p:ph idx="1"/>
-          </p:nvPr>
-        </p:nvSpPr>
-        <p:spPr/>
-        <p:txBody>
-          <a:bodyPr anchor="t"/>
-          <a:lstStyle/>
-          <a:p>
-            <a:r>
-              <a:rPr lang="en-US" dirty="0" smtClean="0"/>
-              <a:t>Common vulnerability scoring system</a:t>
-            </a:r>
-          </a:p>
-          <a:p>
-            <a:r>
-              <a:rPr lang="en-US" dirty="0" smtClean="0"/>
-              <a:t>Quantitative vulnerability risk score</a:t>
-            </a:r>
-          </a:p>
-          <a:p>
-            <a:r>
-              <a:rPr lang="en-US" dirty="0" smtClean="0"/>
-              <a:t>Metrics mostly qualitative</a:t>
-            </a:r>
-          </a:p>
-          <a:p>
-            <a:r>
-              <a:rPr lang="en-US" dirty="0" smtClean="0"/>
-              <a:t>Can help prioritize vulnerability addressment</a:t>
-            </a:r>
-            <a:endParaRPr lang="en-CA" dirty="0"/>
-          </a:p>
-        </p:txBody>
-      </p:sp>
-    </p:spTree>
-    <p:extLst>
-      <p:ext uri="{BB962C8B-B14F-4D97-AF65-F5344CB8AC3E}">
-        <p14:creationId xmlns:p14="http://schemas.microsoft.com/office/powerpoint/2010/main" val="320445518"/>
-      </p:ext>
-    </p:extLst>
-  </p:cSld>
-  <p:clrMapOvr>
-    <a:masterClrMapping/>
-  </p:clrMapOvr>
-  <p:timing>
-    <p:tnLst>
-      <p:par>
-        <p:cTn id="1" dur="indefinite" restart="never" nodeType="tmRoot"/>
-      </p:par>
-    </p:tnLst>
-  </p:timing>
-</p:sld>
-</file>
-
-<file path=ppt/slides/slide30.xml><?xml version="1.0" encoding="utf-8"?>
-<p:sld xmlns:a="http://schemas.openxmlformats.org/drawingml/2006/main" xmlns:r="http://schemas.openxmlformats.org/officeDocument/2006/relationships" xmlns:p="http://schemas.openxmlformats.org/presentationml/2006/main">
-  <p:cSld>
-    <p:spTree>
-      <p:nvGrpSpPr>
-        <p:cNvPr id="1" name=""/>
-        <p:cNvGrpSpPr/>
-        <p:nvPr/>
-      </p:nvGrpSpPr>
-      <p:grpSpPr>
-        <a:xfrm>
-          <a:off x="0" y="0"/>
-          <a:ext cx="0" cy="0"/>
-          <a:chOff x="0" y="0"/>
-          <a:chExt cx="0" cy="0"/>
-        </a:xfrm>
-      </p:grpSpPr>
-      <p:sp>
-        <p:nvSpPr>
-          <p:cNvPr id="2" name="Title 1"/>
-          <p:cNvSpPr>
-            <a:spLocks noGrp="1"/>
-          </p:cNvSpPr>
-          <p:nvPr>
-            <p:ph type="title"/>
-          </p:nvPr>
-        </p:nvSpPr>
-        <p:spPr/>
-        <p:txBody>
-          <a:bodyPr/>
-          <a:lstStyle/>
-          <a:p>
-            <a:r>
-              <a:rPr lang="en-US" dirty="0" smtClean="0"/>
               <a:t>CVSS Temporal score</a:t>
             </a:r>
             <a:endParaRPr lang="en-CA" dirty="0"/>
@@ -11414,7 +13255,7 @@
 </p:sld>
 </file>
 
-<file path=ppt/slides/slide31.xml><?xml version="1.0" encoding="utf-8"?>
+<file path=ppt/slides/slide36.xml><?xml version="1.0" encoding="utf-8"?>
 <p:sld xmlns:a="http://schemas.openxmlformats.org/drawingml/2006/main" xmlns:r="http://schemas.openxmlformats.org/officeDocument/2006/relationships" xmlns:p="http://schemas.openxmlformats.org/presentationml/2006/main">
   <p:cSld>
     <p:spTree>
@@ -12517,6 +14358,107 @@
 </file>
 
 <file path=ppt/slides/slide4.xml><?xml version="1.0" encoding="utf-8"?>
+<p:sld xmlns:a="http://schemas.openxmlformats.org/drawingml/2006/main" xmlns:r="http://schemas.openxmlformats.org/officeDocument/2006/relationships" xmlns:p="http://schemas.openxmlformats.org/presentationml/2006/main">
+  <p:cSld>
+    <p:spTree>
+      <p:nvGrpSpPr>
+        <p:cNvPr id="1" name=""/>
+        <p:cNvGrpSpPr/>
+        <p:nvPr/>
+      </p:nvGrpSpPr>
+      <p:grpSpPr>
+        <a:xfrm>
+          <a:off x="0" y="0"/>
+          <a:ext cx="0" cy="0"/>
+          <a:chOff x="0" y="0"/>
+          <a:chExt cx="0" cy="0"/>
+        </a:xfrm>
+      </p:grpSpPr>
+      <p:sp>
+        <p:nvSpPr>
+          <p:cNvPr id="2" name="Title 1"/>
+          <p:cNvSpPr>
+            <a:spLocks noGrp="1"/>
+          </p:cNvSpPr>
+          <p:nvPr>
+            <p:ph type="title"/>
+          </p:nvPr>
+        </p:nvSpPr>
+        <p:spPr/>
+        <p:txBody>
+          <a:bodyPr/>
+          <a:lstStyle/>
+          <a:p>
+            <a:r>
+              <a:rPr lang="en-US" dirty="0" smtClean="0"/>
+              <a:t>CVSS - Introduction</a:t>
+            </a:r>
+            <a:endParaRPr lang="en-CA" dirty="0"/>
+          </a:p>
+        </p:txBody>
+      </p:sp>
+      <p:sp>
+        <p:nvSpPr>
+          <p:cNvPr id="3" name="Content Placeholder 2"/>
+          <p:cNvSpPr>
+            <a:spLocks noGrp="1"/>
+          </p:cNvSpPr>
+          <p:nvPr>
+            <p:ph idx="1"/>
+          </p:nvPr>
+        </p:nvSpPr>
+        <p:spPr/>
+        <p:txBody>
+          <a:bodyPr anchor="t"/>
+          <a:lstStyle/>
+          <a:p>
+            <a:r>
+              <a:rPr lang="en-US" dirty="0" smtClean="0"/>
+              <a:t>Common vulnerability scoring system</a:t>
+            </a:r>
+          </a:p>
+          <a:p>
+            <a:r>
+              <a:rPr lang="en-US" dirty="0" smtClean="0"/>
+              <a:t>Quantitative vulnerability risk score</a:t>
+            </a:r>
+          </a:p>
+          <a:p>
+            <a:r>
+              <a:rPr lang="en-US" dirty="0" smtClean="0"/>
+              <a:t>Metrics mostly qualitative</a:t>
+            </a:r>
+          </a:p>
+          <a:p>
+            <a:r>
+              <a:rPr lang="en-US" dirty="0" smtClean="0"/>
+              <a:t>Can help prioritize vulnerability addressment</a:t>
+            </a:r>
+            <a:endParaRPr lang="en-CA" dirty="0"/>
+          </a:p>
+        </p:txBody>
+      </p:sp>
+    </p:spTree>
+    <p:extLst>
+      <p:ext uri="{BB962C8B-B14F-4D97-AF65-F5344CB8AC3E}">
+        <p14:creationId xmlns:p14="http://schemas.microsoft.com/office/powerpoint/2010/main" val="320445518"/>
+      </p:ext>
+    </p:extLst>
+  </p:cSld>
+  <p:clrMapOvr>
+    <a:masterClrMapping/>
+  </p:clrMapOvr>
+  <p:timing>
+    <p:tnLst>
+      <p:par>
+        <p:cTn id="1" dur="indefinite" restart="never" nodeType="tmRoot"/>
+      </p:par>
+    </p:tnLst>
+  </p:timing>
+</p:sld>
+</file>
+
+<file path=ppt/slides/slide5.xml><?xml version="1.0" encoding="utf-8"?>
 <p:sld xmlns:a="http://schemas.openxmlformats.org/drawingml/2006/main" xmlns:r="http://schemas.openxmlformats.org/officeDocument/2006/relationships" xmlns:p="http://schemas.openxmlformats.org/presentationml/2006/main">
   <p:cSld>
     <p:spTree>
@@ -14386,7 +16328,7 @@
 </p:sld>
 </file>
 
-<file path=ppt/slides/slide5.xml><?xml version="1.0" encoding="utf-8"?>
+<file path=ppt/slides/slide6.xml><?xml version="1.0" encoding="utf-8"?>
 <p:sld xmlns:a="http://schemas.openxmlformats.org/drawingml/2006/main" xmlns:r="http://schemas.openxmlformats.org/officeDocument/2006/relationships" xmlns:p="http://schemas.openxmlformats.org/presentationml/2006/main">
   <p:cSld>
     <p:spTree>
@@ -15226,7 +17168,7 @@
 </p:sld>
 </file>
 
-<file path=ppt/slides/slide6.xml><?xml version="1.0" encoding="utf-8"?>
+<file path=ppt/slides/slide7.xml><?xml version="1.0" encoding="utf-8"?>
 <p:sld xmlns:a="http://schemas.openxmlformats.org/drawingml/2006/main" xmlns:r="http://schemas.openxmlformats.org/officeDocument/2006/relationships" xmlns:p="http://schemas.openxmlformats.org/presentationml/2006/main">
   <p:cSld>
     <p:spTree>
@@ -15826,7 +17768,7 @@
 </p:sld>
 </file>
 
-<file path=ppt/slides/slide7.xml><?xml version="1.0" encoding="utf-8"?>
+<file path=ppt/slides/slide8.xml><?xml version="1.0" encoding="utf-8"?>
 <p:sld xmlns:a="http://schemas.openxmlformats.org/drawingml/2006/main" xmlns:r="http://schemas.openxmlformats.org/officeDocument/2006/relationships" xmlns:p="http://schemas.openxmlformats.org/presentationml/2006/main">
   <p:cSld>
     <p:spTree>
@@ -16553,7 +18495,7 @@
 </p:sld>
 </file>
 
-<file path=ppt/slides/slide8.xml><?xml version="1.0" encoding="utf-8"?>
+<file path=ppt/slides/slide9.xml><?xml version="1.0" encoding="utf-8"?>
 <p:sld xmlns:a="http://schemas.openxmlformats.org/drawingml/2006/main" xmlns:r="http://schemas.openxmlformats.org/officeDocument/2006/relationships" xmlns:p="http://schemas.openxmlformats.org/presentationml/2006/main">
   <p:cSld>
     <p:spTree>
@@ -17422,76 +19364,6 @@
 </p:sld>
 </file>
 
-<file path=ppt/slides/slide9.xml><?xml version="1.0" encoding="utf-8"?>
-<p:sld xmlns:a="http://schemas.openxmlformats.org/drawingml/2006/main" xmlns:r="http://schemas.openxmlformats.org/officeDocument/2006/relationships" xmlns:p="http://schemas.openxmlformats.org/presentationml/2006/main">
-  <p:cSld>
-    <p:spTree>
-      <p:nvGrpSpPr>
-        <p:cNvPr id="1" name=""/>
-        <p:cNvGrpSpPr/>
-        <p:nvPr/>
-      </p:nvGrpSpPr>
-      <p:grpSpPr>
-        <a:xfrm>
-          <a:off x="0" y="0"/>
-          <a:ext cx="0" cy="0"/>
-          <a:chOff x="0" y="0"/>
-          <a:chExt cx="0" cy="0"/>
-        </a:xfrm>
-      </p:grpSpPr>
-      <p:sp>
-        <p:nvSpPr>
-          <p:cNvPr id="2" name="Title 1"/>
-          <p:cNvSpPr>
-            <a:spLocks noGrp="1"/>
-          </p:cNvSpPr>
-          <p:nvPr>
-            <p:ph type="title"/>
-          </p:nvPr>
-        </p:nvSpPr>
-        <p:spPr>
-          <a:xfrm>
-            <a:off x="1492313" y="1394234"/>
-            <a:ext cx="9207375" cy="4037845"/>
-          </a:xfrm>
-        </p:spPr>
-        <p:txBody>
-          <a:bodyPr>
-            <a:normAutofit/>
-          </a:bodyPr>
-          <a:lstStyle/>
-          <a:p>
-            <a:r>
-              <a:rPr lang="en-US" dirty="0" smtClean="0"/>
-              <a:t>Evaluating CVSS Base Score Using Vulnerability Rewards Program [Younis2016]</a:t>
-            </a:r>
-            <a:br>
-              <a:rPr lang="en-US" dirty="0" smtClean="0"/>
-            </a:br>
-            <a:endParaRPr lang="en-CA" dirty="0"/>
-          </a:p>
-        </p:txBody>
-      </p:sp>
-    </p:spTree>
-    <p:extLst>
-      <p:ext uri="{BB962C8B-B14F-4D97-AF65-F5344CB8AC3E}">
-        <p14:creationId xmlns:p14="http://schemas.microsoft.com/office/powerpoint/2010/main" val="58341561"/>
-      </p:ext>
-    </p:extLst>
-  </p:cSld>
-  <p:clrMapOvr>
-    <a:masterClrMapping/>
-  </p:clrMapOvr>
-  <p:timing>
-    <p:tnLst>
-      <p:par>
-        <p:cTn id="1" dur="indefinite" restart="never" nodeType="tmRoot"/>
-      </p:par>
-    </p:tnLst>
-  </p:timing>
-</p:sld>
-</file>
-
 <file path=ppt/theme/theme1.xml><?xml version="1.0" encoding="utf-8"?>
 <a:theme xmlns:a="http://schemas.openxmlformats.org/drawingml/2006/main" name="Slice">
   <a:themeElements>

</xml_diff>

<commit_message>
CISC 848 - Background presentation, minor corrections/additions; mainly hand writing script
</commit_message>
<xml_diff>
--- a/CISC848/BackgroundPentation/ChurchCISC848Background.pptx
+++ b/CISC848/BackgroundPentation/ChurchCISC848Background.pptx
@@ -36,11 +36,12 @@
     <p:sldId id="283" r:id="rId30"/>
     <p:sldId id="284" r:id="rId31"/>
     <p:sldId id="289" r:id="rId32"/>
-    <p:sldId id="262" r:id="rId33"/>
-    <p:sldId id="267" r:id="rId34"/>
-    <p:sldId id="268" r:id="rId35"/>
-    <p:sldId id="270" r:id="rId36"/>
-    <p:sldId id="271" r:id="rId37"/>
+    <p:sldId id="296" r:id="rId33"/>
+    <p:sldId id="262" r:id="rId34"/>
+    <p:sldId id="267" r:id="rId35"/>
+    <p:sldId id="268" r:id="rId36"/>
+    <p:sldId id="270" r:id="rId37"/>
+    <p:sldId id="271" r:id="rId38"/>
   </p:sldIdLst>
   <p:sldSz cx="12192000" cy="6858000"/>
   <p:notesSz cx="6858000" cy="9144000"/>
@@ -338,7 +339,7 @@
           <a:p>
             <a:fld id="{E4250886-215E-474B-A4B7-516F0D324D19}" type="datetimeFigureOut">
               <a:rPr lang="en-CA" smtClean="0"/>
-              <a:t>2017-01-22</a:t>
+              <a:t>2017-01-23</a:t>
             </a:fld>
             <a:endParaRPr lang="en-CA"/>
           </a:p>
@@ -774,7 +775,7 @@
           <a:p>
             <a:fld id="{E4250886-215E-474B-A4B7-516F0D324D19}" type="datetimeFigureOut">
               <a:rPr lang="en-CA" smtClean="0"/>
-              <a:t>2017-01-22</a:t>
+              <a:t>2017-01-23</a:t>
             </a:fld>
             <a:endParaRPr lang="en-CA"/>
           </a:p>
@@ -1024,7 +1025,7 @@
           <a:p>
             <a:fld id="{E4250886-215E-474B-A4B7-516F0D324D19}" type="datetimeFigureOut">
               <a:rPr lang="en-CA" smtClean="0"/>
-              <a:t>2017-01-22</a:t>
+              <a:t>2017-01-23</a:t>
             </a:fld>
             <a:endParaRPr lang="en-CA"/>
           </a:p>
@@ -1332,7 +1333,7 @@
           <a:p>
             <a:fld id="{E4250886-215E-474B-A4B7-516F0D324D19}" type="datetimeFigureOut">
               <a:rPr lang="en-CA" smtClean="0"/>
-              <a:t>2017-01-22</a:t>
+              <a:t>2017-01-23</a:t>
             </a:fld>
             <a:endParaRPr lang="en-CA"/>
           </a:p>
@@ -1650,7 +1651,7 @@
           <a:p>
             <a:fld id="{E4250886-215E-474B-A4B7-516F0D324D19}" type="datetimeFigureOut">
               <a:rPr lang="en-CA" smtClean="0"/>
-              <a:t>2017-01-22</a:t>
+              <a:t>2017-01-23</a:t>
             </a:fld>
             <a:endParaRPr lang="en-CA"/>
           </a:p>
@@ -1952,7 +1953,7 @@
           <a:p>
             <a:fld id="{E4250886-215E-474B-A4B7-516F0D324D19}" type="datetimeFigureOut">
               <a:rPr lang="en-CA" smtClean="0"/>
-              <a:t>2017-01-22</a:t>
+              <a:t>2017-01-23</a:t>
             </a:fld>
             <a:endParaRPr lang="en-CA"/>
           </a:p>
@@ -2319,7 +2320,7 @@
           <a:p>
             <a:fld id="{E4250886-215E-474B-A4B7-516F0D324D19}" type="datetimeFigureOut">
               <a:rPr lang="en-CA" smtClean="0"/>
-              <a:t>2017-01-22</a:t>
+              <a:t>2017-01-23</a:t>
             </a:fld>
             <a:endParaRPr lang="en-CA"/>
           </a:p>
@@ -2493,7 +2494,7 @@
           <a:p>
             <a:fld id="{E4250886-215E-474B-A4B7-516F0D324D19}" type="datetimeFigureOut">
               <a:rPr lang="en-CA" smtClean="0"/>
-              <a:t>2017-01-22</a:t>
+              <a:t>2017-01-23</a:t>
             </a:fld>
             <a:endParaRPr lang="en-CA"/>
           </a:p>
@@ -2673,7 +2674,7 @@
           <a:p>
             <a:fld id="{E4250886-215E-474B-A4B7-516F0D324D19}" type="datetimeFigureOut">
               <a:rPr lang="en-CA" smtClean="0"/>
-              <a:t>2017-01-22</a:t>
+              <a:t>2017-01-23</a:t>
             </a:fld>
             <a:endParaRPr lang="en-CA"/>
           </a:p>
@@ -3086,7 +3087,7 @@
           <a:p>
             <a:fld id="{E4250886-215E-474B-A4B7-516F0D324D19}" type="datetimeFigureOut">
               <a:rPr lang="en-CA" smtClean="0"/>
-              <a:t>2017-01-22</a:t>
+              <a:t>2017-01-23</a:t>
             </a:fld>
             <a:endParaRPr lang="en-CA"/>
           </a:p>
@@ -3414,7 +3415,7 @@
           <a:p>
             <a:fld id="{E4250886-215E-474B-A4B7-516F0D324D19}" type="datetimeFigureOut">
               <a:rPr lang="en-CA" smtClean="0"/>
-              <a:t>2017-01-22</a:t>
+              <a:t>2017-01-23</a:t>
             </a:fld>
             <a:endParaRPr lang="en-CA"/>
           </a:p>
@@ -3657,7 +3658,7 @@
           <a:p>
             <a:fld id="{E4250886-215E-474B-A4B7-516F0D324D19}" type="datetimeFigureOut">
               <a:rPr lang="en-CA" smtClean="0"/>
-              <a:t>2017-01-22</a:t>
+              <a:t>2017-01-23</a:t>
             </a:fld>
             <a:endParaRPr lang="en-CA"/>
           </a:p>
@@ -4046,7 +4047,7 @@
           <a:p>
             <a:fld id="{E4250886-215E-474B-A4B7-516F0D324D19}" type="datetimeFigureOut">
               <a:rPr lang="en-CA" smtClean="0"/>
-              <a:t>2017-01-22</a:t>
+              <a:t>2017-01-23</a:t>
             </a:fld>
             <a:endParaRPr lang="en-CA"/>
           </a:p>
@@ -4164,7 +4165,7 @@
           <a:p>
             <a:fld id="{E4250886-215E-474B-A4B7-516F0D324D19}" type="datetimeFigureOut">
               <a:rPr lang="en-CA" smtClean="0"/>
-              <a:t>2017-01-22</a:t>
+              <a:t>2017-01-23</a:t>
             </a:fld>
             <a:endParaRPr lang="en-CA"/>
           </a:p>
@@ -4266,7 +4267,7 @@
           <a:p>
             <a:fld id="{E4250886-215E-474B-A4B7-516F0D324D19}" type="datetimeFigureOut">
               <a:rPr lang="en-CA" smtClean="0"/>
-              <a:t>2017-01-22</a:t>
+              <a:t>2017-01-23</a:t>
             </a:fld>
             <a:endParaRPr lang="en-CA"/>
           </a:p>
@@ -4528,7 +4529,7 @@
           <a:p>
             <a:fld id="{E4250886-215E-474B-A4B7-516F0D324D19}" type="datetimeFigureOut">
               <a:rPr lang="en-CA" smtClean="0"/>
-              <a:t>2017-01-22</a:t>
+              <a:t>2017-01-23</a:t>
             </a:fld>
             <a:endParaRPr lang="en-CA"/>
           </a:p>
@@ -4811,7 +4812,7 @@
           <a:p>
             <a:fld id="{E4250886-215E-474B-A4B7-516F0D324D19}" type="datetimeFigureOut">
               <a:rPr lang="en-CA" smtClean="0"/>
-              <a:t>2017-01-22</a:t>
+              <a:t>2017-01-23</a:t>
             </a:fld>
             <a:endParaRPr lang="en-CA"/>
           </a:p>
@@ -5233,7 +5234,7 @@
           <a:p>
             <a:fld id="{E4250886-215E-474B-A4B7-516F0D324D19}" type="datetimeFigureOut">
               <a:rPr lang="en-CA" smtClean="0"/>
-              <a:t>2017-01-22</a:t>
+              <a:t>2017-01-23</a:t>
             </a:fld>
             <a:endParaRPr lang="en-CA"/>
           </a:p>
@@ -5795,7 +5796,14 @@
           <a:p>
             <a:r>
               <a:rPr lang="en-US" dirty="0" smtClean="0"/>
-              <a:t>CVSS </a:t>
+              <a:t>CVSS Validation </a:t>
+            </a:r>
+            <a:br>
+              <a:rPr lang="en-US" dirty="0" smtClean="0"/>
+            </a:br>
+            <a:r>
+              <a:rPr lang="en-US" dirty="0" smtClean="0"/>
+              <a:t>and Prediction</a:t>
             </a:r>
             <a:endParaRPr lang="en-CA" dirty="0"/>
           </a:p>
@@ -5991,7 +5999,7 @@
           <a:p>
             <a:r>
               <a:rPr lang="en-US" dirty="0" smtClean="0"/>
-              <a:t>CVSS not always correlated with actual exploits and attacks</a:t>
+              <a:t>CVSS not always correlated with actual exploits and attacks [3]</a:t>
             </a:r>
           </a:p>
           <a:p>
@@ -6091,6 +6099,19 @@
               <a:rPr lang="en-US" dirty="0" smtClean="0"/>
               <a:t>Seek to validate CVSS base scores using Vulnerability Reward Program (VRP) scales</a:t>
             </a:r>
+          </a:p>
+          <a:p>
+            <a:r>
+              <a:rPr lang="en-US" dirty="0" smtClean="0"/>
+              <a:t>They hope to explain why high-CVSS vulnerabilities may go unexploited or </a:t>
+            </a:r>
+            <a:br>
+              <a:rPr lang="en-US" dirty="0" smtClean="0"/>
+            </a:br>
+            <a:r>
+              <a:rPr lang="en-US" dirty="0" smtClean="0"/>
+              <a:t>vice-versa</a:t>
+            </a:r>
             <a:endParaRPr lang="en-CA" dirty="0"/>
           </a:p>
         </p:txBody>
@@ -6187,7 +6208,7 @@
           <a:p>
             <a:r>
               <a:rPr lang="en-US" dirty="0" smtClean="0"/>
-              <a:t>Decision to reward (for finding or fixing???)</a:t>
+              <a:t>Decision to reward vulnerability discovery</a:t>
             </a:r>
           </a:p>
           <a:p>
@@ -6300,13 +6321,13 @@
           <p:nvPr>
             <p:extLst>
               <p:ext uri="{D42A27DB-BD31-4B8C-83A1-F6EECF244321}">
-                <p14:modId xmlns:p14="http://schemas.microsoft.com/office/powerpoint/2010/main" val="1040974197"/>
+                <p14:modId xmlns:p14="http://schemas.microsoft.com/office/powerpoint/2010/main" val="2248809329"/>
               </p:ext>
             </p:extLst>
           </p:nvPr>
         </p:nvGraphicFramePr>
         <p:xfrm>
-          <a:off x="2687183" y="3759947"/>
+          <a:off x="2679015" y="3289684"/>
           <a:ext cx="6096000" cy="1483360"/>
         </p:xfrm>
         <a:graphic>
@@ -6316,9 +6337,27 @@
                 <a:tableStyleId>{5C22544A-7EE6-4342-B048-85BDC9FD1C3A}</a:tableStyleId>
               </a:tblPr>
               <a:tblGrid>
-                <a:gridCol w="2032000"/>
-                <a:gridCol w="2032000"/>
-                <a:gridCol w="2032000"/>
+                <a:gridCol w="2032000">
+                  <a:extLst>
+                    <a:ext uri="{9D8B030D-6E8A-4147-A177-3AD203B41FA5}">
+                      <a16:colId xmlns:a16="http://schemas.microsoft.com/office/drawing/2014/main" val="20000"/>
+                    </a:ext>
+                  </a:extLst>
+                </a:gridCol>
+                <a:gridCol w="2032000">
+                  <a:extLst>
+                    <a:ext uri="{9D8B030D-6E8A-4147-A177-3AD203B41FA5}">
+                      <a16:colId xmlns:a16="http://schemas.microsoft.com/office/drawing/2014/main" val="20001"/>
+                    </a:ext>
+                  </a:extLst>
+                </a:gridCol>
+                <a:gridCol w="2032000">
+                  <a:extLst>
+                    <a:ext uri="{9D8B030D-6E8A-4147-A177-3AD203B41FA5}">
+                      <a16:colId xmlns:a16="http://schemas.microsoft.com/office/drawing/2014/main" val="20002"/>
+                    </a:ext>
+                  </a:extLst>
+                </a:gridCol>
               </a:tblGrid>
               <a:tr h="370840">
                 <a:tc>
@@ -6370,6 +6409,11 @@
                   </a:txBody>
                   <a:tcPr/>
                 </a:tc>
+                <a:extLst>
+                  <a:ext uri="{0D108BD9-81ED-4DB2-BD59-A6C34878D82A}">
+                    <a16:rowId xmlns:a16="http://schemas.microsoft.com/office/drawing/2014/main" val="10000"/>
+                  </a:ext>
+                </a:extLst>
               </a:tr>
               <a:tr h="370840">
                 <a:tc>
@@ -6417,6 +6461,11 @@
                   </a:txBody>
                   <a:tcPr/>
                 </a:tc>
+                <a:extLst>
+                  <a:ext uri="{0D108BD9-81ED-4DB2-BD59-A6C34878D82A}">
+                    <a16:rowId xmlns:a16="http://schemas.microsoft.com/office/drawing/2014/main" val="10001"/>
+                  </a:ext>
+                </a:extLst>
               </a:tr>
               <a:tr h="370840">
                 <a:tc>
@@ -6464,6 +6513,11 @@
                   </a:txBody>
                   <a:tcPr/>
                 </a:tc>
+                <a:extLst>
+                  <a:ext uri="{0D108BD9-81ED-4DB2-BD59-A6C34878D82A}">
+                    <a16:rowId xmlns:a16="http://schemas.microsoft.com/office/drawing/2014/main" val="10002"/>
+                  </a:ext>
+                </a:extLst>
               </a:tr>
               <a:tr h="370840">
                 <a:tc>
@@ -6515,6 +6569,11 @@
                   </a:txBody>
                   <a:tcPr/>
                 </a:tc>
+                <a:extLst>
+                  <a:ext uri="{0D108BD9-81ED-4DB2-BD59-A6C34878D82A}">
+                    <a16:rowId xmlns:a16="http://schemas.microsoft.com/office/drawing/2014/main" val="10003"/>
+                  </a:ext>
+                </a:extLst>
               </a:tr>
             </a:tbl>
           </a:graphicData>
@@ -8543,7 +8602,9 @@
         </p:nvSpPr>
         <p:spPr/>
         <p:txBody>
-          <a:bodyPr/>
+          <a:bodyPr>
+            <a:normAutofit/>
+          </a:bodyPr>
           <a:lstStyle/>
           <a:p>
             <a:r>
@@ -8562,31 +8623,15 @@
             </a:r>
           </a:p>
           <a:p>
-            <a:pPr lvl="1"/>
-            <a:r>
-              <a:rPr lang="en-US" dirty="0" smtClean="0">
-                <a:solidFill>
-                  <a:schemeClr val="tx1"/>
-                </a:solidFill>
-              </a:rPr>
-              <a:t>Both decrease after clustering</a:t>
-            </a:r>
-          </a:p>
-          <a:p>
             <a:r>
               <a:rPr lang="en-US" dirty="0" smtClean="0"/>
               <a:t>Modest Spearman correlation</a:t>
             </a:r>
           </a:p>
           <a:p>
-            <a:pPr lvl="1"/>
-            <a:r>
-              <a:rPr lang="en-US" dirty="0" smtClean="0">
-                <a:solidFill>
-                  <a:schemeClr val="tx1"/>
-                </a:solidFill>
-              </a:rPr>
-              <a:t>~ 0.55 (p = 0.0001), Firefox and Chrome, before and after clustering</a:t>
+            <a:r>
+              <a:rPr lang="en-US" dirty="0" smtClean="0"/>
+              <a:t>Repeated experiment with vulnerabilities segmented to make better use of CVSS range</a:t>
             </a:r>
             <a:endParaRPr lang="en-US" dirty="0">
               <a:solidFill>
@@ -8810,38 +8855,17 @@
                   <a:schemeClr val="tx1"/>
                 </a:solidFill>
               </a:rPr>
-              <a:t>Evaluating CVSS Base Score Using Vulnerability Rewards </a:t>
-            </a:r>
+              <a:t>Evaluating CVSS Base Score Using Vulnerability Rewards Program [1]</a:t>
+            </a:r>
+          </a:p>
+          <a:p>
             <a:r>
               <a:rPr lang="en-US" sz="3200" dirty="0" smtClean="0">
                 <a:solidFill>
                   <a:schemeClr val="tx1"/>
                 </a:solidFill>
               </a:rPr>
-              <a:t>Program [1]</a:t>
-            </a:r>
-            <a:endParaRPr lang="en-US" sz="3200" dirty="0" smtClean="0">
-              <a:solidFill>
-                <a:schemeClr val="tx1"/>
-              </a:solidFill>
-            </a:endParaRPr>
-          </a:p>
-          <a:p>
-            <a:r>
-              <a:rPr lang="en-US" sz="3200" dirty="0" smtClean="0">
-                <a:solidFill>
-                  <a:schemeClr val="tx1"/>
-                </a:solidFill>
-              </a:rPr>
-              <a:t>An automatic method for CVSS score prediction using vulnerabilities </a:t>
-            </a:r>
-            <a:r>
-              <a:rPr lang="en-US" sz="3200" dirty="0" smtClean="0">
-                <a:solidFill>
-                  <a:schemeClr val="tx1"/>
-                </a:solidFill>
-              </a:rPr>
-              <a:t>description [2]</a:t>
+              <a:t>An automatic method for CVSS score prediction using vulnerabilities description [2]</a:t>
             </a:r>
             <a:endParaRPr lang="en-CA" sz="3200" dirty="0">
               <a:solidFill>
@@ -8929,6 +8953,12 @@
         <p:txBody>
           <a:bodyPr/>
           <a:lstStyle/>
+          <a:p>
+            <a:r>
+              <a:rPr lang="en-US" dirty="0" smtClean="0"/>
+              <a:t>Reluctant to discuss CVSS validity</a:t>
+            </a:r>
+          </a:p>
           <a:p>
             <a:r>
               <a:rPr lang="en-US" dirty="0" smtClean="0"/>
@@ -9683,7 +9713,13 @@
           <a:p>
             <a:r>
               <a:rPr lang="en-CA" dirty="0" smtClean="0"/>
-              <a:t>A method for predicting CVSS base scores using the natural language in vulnerability descriptions</a:t>
+              <a:t>Demonstrate several methods for predicting CVSS base scores using the natural language in vulnerability descriptions</a:t>
+            </a:r>
+          </a:p>
+          <a:p>
+            <a:r>
+              <a:rPr lang="en-CA" dirty="0" smtClean="0"/>
+              <a:t>Used support vector machine (SVM), random-forest, and (offline and online) fuzzy system</a:t>
             </a:r>
             <a:endParaRPr lang="en-CA" dirty="0"/>
           </a:p>
@@ -9785,7 +9821,7 @@
           <a:p>
             <a:r>
               <a:rPr lang="en-US" dirty="0" smtClean="0"/>
-              <a:t>Corresponding CVSS scores from OBVDB (Open Source Vulnerability Database)</a:t>
+              <a:t>Corresponding CVSS scores from OSVDB (Open Source Vulnerability Database)</a:t>
             </a:r>
             <a:endParaRPr lang="en-CA" dirty="0"/>
           </a:p>
@@ -10552,7 +10588,23 @@
                   <a:schemeClr val="tx1"/>
                 </a:solidFill>
               </a:rPr>
-              <a:t>Performed on data without dimension reduction, LDA, and LDA + PCA</a:t>
+              <a:t>Performed </a:t>
+            </a:r>
+            <a:r>
+              <a:rPr lang="en-US" dirty="0" smtClean="0">
+                <a:solidFill>
+                  <a:schemeClr val="tx1"/>
+                </a:solidFill>
+              </a:rPr>
+              <a:t>on vectors </a:t>
+            </a:r>
+            <a:r>
+              <a:rPr lang="en-US" dirty="0" smtClean="0">
+                <a:solidFill>
+                  <a:schemeClr val="tx1"/>
+                </a:solidFill>
+              </a:rPr>
+              <a:t>without dimension reduction, LDA, and LDA + PCA</a:t>
             </a:r>
             <a:endParaRPr lang="en-CA" dirty="0" smtClean="0">
               <a:solidFill>
@@ -10630,8 +10682,8 @@
           </a:p>
         </p:txBody>
       </p:sp>
-      <mc:AlternateContent xmlns:mc="http://schemas.openxmlformats.org/markup-compatibility/2006">
-        <mc:Choice xmlns:a14="http://schemas.microsoft.com/office/drawing/2010/main" Requires="a14">
+      <mc:AlternateContent xmlns:mc="http://schemas.openxmlformats.org/markup-compatibility/2006" xmlns:a14="http://schemas.microsoft.com/office/drawing/2010/main">
+        <mc:Choice Requires="a14">
           <p:sp>
             <p:nvSpPr>
               <p:cNvPr id="3" name="Content Placeholder 2"/>
@@ -10968,7 +11020,7 @@
             </p:txBody>
           </p:sp>
         </mc:Choice>
-        <mc:Fallback>
+        <mc:Fallback xmlns="">
           <p:sp>
             <p:nvSpPr>
               <p:cNvPr id="3" name="Content Placeholder 2"/>
@@ -11173,10 +11225,6 @@
               <a:rPr lang="en-US" dirty="0" smtClean="0"/>
               <a:t>Background - CVSS</a:t>
             </a:r>
-            <a:r>
-              <a:rPr lang="en-US" dirty="0" smtClean="0"/>
-              <a:t/>
-            </a:r>
             <a:br>
               <a:rPr lang="en-US" dirty="0" smtClean="0"/>
             </a:br>
@@ -11345,11 +11393,7 @@
             </a:r>
             <a:r>
               <a:rPr lang="en-US" dirty="0" smtClean="0"/>
-              <a:t>et al. - </a:t>
-            </a:r>
-            <a:r>
-              <a:rPr lang="en-US" dirty="0" smtClean="0"/>
-              <a:t>Commentary</a:t>
+              <a:t>et al. - Commentary</a:t>
             </a:r>
             <a:endParaRPr lang="en-CA" dirty="0"/>
           </a:p>
@@ -11380,7 +11424,6 @@
               <a:rPr lang="en-US" dirty="0" smtClean="0"/>
               <a:t>Refer to popularity of CVSS rather than validation study</a:t>
             </a:r>
-            <a:endParaRPr lang="en-US" dirty="0" smtClean="0"/>
           </a:p>
         </p:txBody>
       </p:sp>
@@ -11438,6 +11481,90 @@
           <a:p>
             <a:r>
               <a:rPr lang="en-US" dirty="0" smtClean="0"/>
+              <a:t>Conclusions	</a:t>
+            </a:r>
+            <a:endParaRPr lang="en-US" dirty="0"/>
+          </a:p>
+        </p:txBody>
+      </p:sp>
+      <p:sp>
+        <p:nvSpPr>
+          <p:cNvPr id="3" name="Content Placeholder 2"/>
+          <p:cNvSpPr>
+            <a:spLocks noGrp="1"/>
+          </p:cNvSpPr>
+          <p:nvPr>
+            <p:ph idx="1"/>
+          </p:nvPr>
+        </p:nvSpPr>
+        <p:spPr/>
+        <p:txBody>
+          <a:bodyPr/>
+          <a:lstStyle/>
+          <a:p>
+            <a:r>
+              <a:rPr lang="en-US" dirty="0" smtClean="0"/>
+              <a:t>CVSS base score over-sensitive, better correspondence for higher VRP scores</a:t>
+            </a:r>
+          </a:p>
+          <a:p>
+            <a:r>
+              <a:rPr lang="en-US" dirty="0" smtClean="0"/>
+              <a:t>Useful (insofar as CVSS is useful) information can be computed from vulnerability descriptions</a:t>
+            </a:r>
+          </a:p>
+          <a:p>
+            <a:endParaRPr lang="en-US" dirty="0"/>
+          </a:p>
+        </p:txBody>
+      </p:sp>
+    </p:spTree>
+    <p:extLst>
+      <p:ext uri="{BB962C8B-B14F-4D97-AF65-F5344CB8AC3E}">
+        <p14:creationId xmlns:p14="http://schemas.microsoft.com/office/powerpoint/2010/main" val="2463089659"/>
+      </p:ext>
+    </p:extLst>
+  </p:cSld>
+  <p:clrMapOvr>
+    <a:masterClrMapping/>
+  </p:clrMapOvr>
+</p:sld>
+</file>
+
+<file path=ppt/slides/slide33.xml><?xml version="1.0" encoding="utf-8"?>
+<p:sld xmlns:a="http://schemas.openxmlformats.org/drawingml/2006/main" xmlns:r="http://schemas.openxmlformats.org/officeDocument/2006/relationships" xmlns:p="http://schemas.openxmlformats.org/presentationml/2006/main">
+  <p:cSld>
+    <p:spTree>
+      <p:nvGrpSpPr>
+        <p:cNvPr id="1" name=""/>
+        <p:cNvGrpSpPr/>
+        <p:nvPr/>
+      </p:nvGrpSpPr>
+      <p:grpSpPr>
+        <a:xfrm>
+          <a:off x="0" y="0"/>
+          <a:ext cx="0" cy="0"/>
+          <a:chOff x="0" y="0"/>
+          <a:chExt cx="0" cy="0"/>
+        </a:xfrm>
+      </p:grpSpPr>
+      <p:sp>
+        <p:nvSpPr>
+          <p:cNvPr id="2" name="Title 1"/>
+          <p:cNvSpPr>
+            <a:spLocks noGrp="1"/>
+          </p:cNvSpPr>
+          <p:nvPr>
+            <p:ph type="title"/>
+          </p:nvPr>
+        </p:nvSpPr>
+        <p:spPr/>
+        <p:txBody>
+          <a:bodyPr/>
+          <a:lstStyle/>
+          <a:p>
+            <a:r>
+              <a:rPr lang="en-US" dirty="0" smtClean="0"/>
               <a:t>References</a:t>
             </a:r>
             <a:endParaRPr lang="en-CA" dirty="0"/>
@@ -11457,7 +11584,7 @@
         <p:spPr/>
         <p:txBody>
           <a:bodyPr>
-            <a:normAutofit fontScale="92500" lnSpcReduction="20000"/>
+            <a:normAutofit fontScale="62500" lnSpcReduction="20000"/>
           </a:bodyPr>
           <a:lstStyle/>
           <a:p>
@@ -11509,11 +11636,75 @@
             </a:r>
             <a:r>
               <a:rPr lang="en-US" dirty="0" smtClean="0"/>
-              <a:t> V. “An automatic method for CVSS score prediction using vulnerability description”. Journal of Intelligent &amp; </a:t>
-            </a:r>
-            <a:r>
-              <a:rPr lang="en-US" smtClean="0"/>
-              <a:t>Fuzzy Systems 2016; 30:89-96.</a:t>
+              <a:t> V. “An automatic method for CVSS score prediction using vulnerability description”. Journal of Intelligent &amp; Fuzzy Systems 2016; 30:89-96.</a:t>
+            </a:r>
+          </a:p>
+          <a:p>
+            <a:pPr marL="514350" indent="-514350">
+              <a:buFont typeface="+mj-lt"/>
+              <a:buAutoNum type="arabicPeriod"/>
+            </a:pPr>
+            <a:r>
+              <a:rPr lang="en-US" dirty="0" err="1" smtClean="0"/>
+              <a:t>Allodi</a:t>
+            </a:r>
+            <a:r>
+              <a:rPr lang="en-US" dirty="0" smtClean="0"/>
+              <a:t> L., and </a:t>
+            </a:r>
+            <a:r>
+              <a:rPr lang="en-US" dirty="0" err="1" smtClean="0"/>
+              <a:t>Massacci</a:t>
+            </a:r>
+            <a:r>
+              <a:rPr lang="en-US" dirty="0"/>
+              <a:t> </a:t>
+            </a:r>
+            <a:r>
+              <a:rPr lang="en-US" dirty="0" smtClean="0"/>
+              <a:t>F. “Comparing Vulnerability Severity and Exploits Using Case-Control Studies”. ACM Transactions on Information and Systems Security 2014; 17(1):Art. 1</a:t>
+            </a:r>
+            <a:r>
+              <a:rPr lang="en-US" dirty="0" smtClean="0"/>
+              <a:t>.</a:t>
+            </a:r>
+          </a:p>
+          <a:p>
+            <a:pPr marL="514350" indent="-514350">
+              <a:buFont typeface="+mj-lt"/>
+              <a:buAutoNum type="arabicPeriod"/>
+            </a:pPr>
+            <a:r>
+              <a:rPr lang="en-US" dirty="0" smtClean="0"/>
+              <a:t>Mell P., </a:t>
+            </a:r>
+            <a:r>
+              <a:rPr lang="en-US" dirty="0" err="1" smtClean="0"/>
+              <a:t>Scarfone</a:t>
+            </a:r>
+            <a:r>
+              <a:rPr lang="en-US" dirty="0"/>
+              <a:t> </a:t>
+            </a:r>
+            <a:r>
+              <a:rPr lang="en-US" dirty="0" smtClean="0"/>
+              <a:t>K., and </a:t>
+            </a:r>
+            <a:r>
+              <a:rPr lang="en-US" dirty="0" err="1" smtClean="0"/>
+              <a:t>Romanosky</a:t>
+            </a:r>
+            <a:r>
+              <a:rPr lang="en-US" dirty="0" smtClean="0"/>
+              <a:t> S. “A Complete Guide to the Common </a:t>
+            </a:r>
+            <a:r>
+              <a:rPr lang="en-US" dirty="0"/>
+              <a:t>Vulnerability Scoring System Version 2.0”. From: https://</a:t>
+            </a:r>
+            <a:r>
+              <a:rPr lang="en-US" dirty="0" smtClean="0"/>
+              <a:t>www.first.org/cvss/cvss-v2-guide.pdf (Published 2009).</a:t>
             </a:r>
             <a:endParaRPr lang="en-CA" dirty="0"/>
           </a:p>
@@ -11539,7 +11730,7 @@
 </p:sld>
 </file>
 
-<file path=ppt/slides/slide33.xml><?xml version="1.0" encoding="utf-8"?>
+<file path=ppt/slides/slide34.xml><?xml version="1.0" encoding="utf-8"?>
 <p:sld xmlns:a="http://schemas.openxmlformats.org/drawingml/2006/main" xmlns:r="http://schemas.openxmlformats.org/officeDocument/2006/relationships" xmlns:p="http://schemas.openxmlformats.org/presentationml/2006/main">
   <p:cSld>
     <p:spTree>
@@ -11655,7 +11846,11 @@
             <a:pPr algn="ctr"/>
             <a:r>
               <a:rPr lang="en-US" sz="4400" dirty="0" smtClean="0"/>
-              <a:t>APPENDIX I – CVSS Score Formulae [ref]</a:t>
+              <a:t>APPENDIX I – CVSS Score Formulae </a:t>
+            </a:r>
+            <a:r>
+              <a:rPr lang="en-US" sz="4400" dirty="0" smtClean="0"/>
+              <a:t>[4]</a:t>
             </a:r>
             <a:endParaRPr lang="en-CA" sz="4400" dirty="0"/>
           </a:p>
@@ -11681,7 +11876,7 @@
 </p:sld>
 </file>
 
-<file path=ppt/slides/slide34.xml><?xml version="1.0" encoding="utf-8"?>
+<file path=ppt/slides/slide35.xml><?xml version="1.0" encoding="utf-8"?>
 <p:sld xmlns:a="http://schemas.openxmlformats.org/drawingml/2006/main" xmlns:r="http://schemas.openxmlformats.org/officeDocument/2006/relationships" xmlns:p="http://schemas.openxmlformats.org/presentationml/2006/main">
   <p:cSld>
     <p:spTree>
@@ -12733,528 +12928,6 @@
 </p:sld>
 </file>
 
-<file path=ppt/slides/slide35.xml><?xml version="1.0" encoding="utf-8"?>
-<p:sld xmlns:a="http://schemas.openxmlformats.org/drawingml/2006/main" xmlns:r="http://schemas.openxmlformats.org/officeDocument/2006/relationships" xmlns:p="http://schemas.openxmlformats.org/presentationml/2006/main">
-  <p:cSld>
-    <p:spTree>
-      <p:nvGrpSpPr>
-        <p:cNvPr id="1" name=""/>
-        <p:cNvGrpSpPr/>
-        <p:nvPr/>
-      </p:nvGrpSpPr>
-      <p:grpSpPr>
-        <a:xfrm>
-          <a:off x="0" y="0"/>
-          <a:ext cx="0" cy="0"/>
-          <a:chOff x="0" y="0"/>
-          <a:chExt cx="0" cy="0"/>
-        </a:xfrm>
-      </p:grpSpPr>
-      <p:sp>
-        <p:nvSpPr>
-          <p:cNvPr id="2" name="Title 1"/>
-          <p:cNvSpPr>
-            <a:spLocks noGrp="1"/>
-          </p:cNvSpPr>
-          <p:nvPr>
-            <p:ph type="title"/>
-          </p:nvPr>
-        </p:nvSpPr>
-        <p:spPr/>
-        <p:txBody>
-          <a:bodyPr/>
-          <a:lstStyle/>
-          <a:p>
-            <a:r>
-              <a:rPr lang="en-US" dirty="0" smtClean="0"/>
-              <a:t>CVSS Temporal score</a:t>
-            </a:r>
-            <a:endParaRPr lang="en-CA" dirty="0"/>
-          </a:p>
-        </p:txBody>
-      </p:sp>
-      <p:sp>
-        <p:nvSpPr>
-          <p:cNvPr id="3" name="Content Placeholder 2"/>
-          <p:cNvSpPr>
-            <a:spLocks noGrp="1"/>
-          </p:cNvSpPr>
-          <p:nvPr>
-            <p:ph idx="1"/>
-          </p:nvPr>
-        </p:nvSpPr>
-        <p:spPr>
-          <a:xfrm>
-            <a:off x="684211" y="1782617"/>
-            <a:ext cx="7726457" cy="4116341"/>
-          </a:xfrm>
-        </p:spPr>
-        <p:txBody>
-          <a:bodyPr>
-            <a:normAutofit fontScale="25000" lnSpcReduction="20000"/>
-          </a:bodyPr>
-          <a:lstStyle/>
-          <a:p>
-            <a:pPr marL="0" indent="0">
-              <a:lnSpc>
-                <a:spcPct val="120000"/>
-              </a:lnSpc>
-              <a:spcBef>
-                <a:spcPts val="0"/>
-              </a:spcBef>
-              <a:spcAft>
-                <a:spcPts val="0"/>
-              </a:spcAft>
-              <a:buNone/>
-            </a:pPr>
-            <a:r>
-              <a:rPr lang="en-CA" sz="5200" dirty="0" err="1"/>
-              <a:t>TemporalScore</a:t>
-            </a:r>
-            <a:r>
-              <a:rPr lang="en-CA" sz="5200" dirty="0"/>
-              <a:t> = round_to_1_decimal(</a:t>
-            </a:r>
-            <a:r>
-              <a:rPr lang="en-CA" sz="5200" dirty="0" err="1"/>
-              <a:t>BaseScore</a:t>
-            </a:r>
-            <a:r>
-              <a:rPr lang="en-CA" sz="5200" dirty="0"/>
-              <a:t>*Exploitability</a:t>
-            </a:r>
-          </a:p>
-          <a:p>
-            <a:pPr marL="0" indent="0">
-              <a:lnSpc>
-                <a:spcPct val="120000"/>
-              </a:lnSpc>
-              <a:spcBef>
-                <a:spcPts val="0"/>
-              </a:spcBef>
-              <a:spcAft>
-                <a:spcPts val="0"/>
-              </a:spcAft>
-              <a:buNone/>
-            </a:pPr>
-            <a:r>
-              <a:rPr lang="en-CA" sz="5200" dirty="0"/>
-              <a:t>                *</a:t>
-            </a:r>
-            <a:r>
-              <a:rPr lang="en-CA" sz="5200" dirty="0" err="1"/>
-              <a:t>RemediationLevel</a:t>
-            </a:r>
-            <a:r>
-              <a:rPr lang="en-CA" sz="5200" dirty="0"/>
-              <a:t>*</a:t>
-            </a:r>
-            <a:r>
-              <a:rPr lang="en-CA" sz="5200" dirty="0" err="1"/>
-              <a:t>ReportConfidence</a:t>
-            </a:r>
-            <a:r>
-              <a:rPr lang="en-CA" sz="5200" dirty="0"/>
-              <a:t>)</a:t>
-            </a:r>
-          </a:p>
-          <a:p>
-            <a:pPr marL="0" indent="0">
-              <a:lnSpc>
-                <a:spcPct val="120000"/>
-              </a:lnSpc>
-              <a:spcBef>
-                <a:spcPts val="0"/>
-              </a:spcBef>
-              <a:spcAft>
-                <a:spcPts val="0"/>
-              </a:spcAft>
-              <a:buNone/>
-            </a:pPr>
-            <a:endParaRPr lang="en-CA" sz="5200" dirty="0"/>
-          </a:p>
-          <a:p>
-            <a:pPr marL="0" indent="0">
-              <a:lnSpc>
-                <a:spcPct val="120000"/>
-              </a:lnSpc>
-              <a:spcBef>
-                <a:spcPts val="0"/>
-              </a:spcBef>
-              <a:spcAft>
-                <a:spcPts val="0"/>
-              </a:spcAft>
-              <a:buNone/>
-            </a:pPr>
-            <a:r>
-              <a:rPr lang="en-CA" sz="5200" dirty="0"/>
-              <a:t>Exploitability   = case Exploitability of</a:t>
-            </a:r>
-          </a:p>
-          <a:p>
-            <a:pPr marL="0" indent="0">
-              <a:lnSpc>
-                <a:spcPct val="120000"/>
-              </a:lnSpc>
-              <a:spcBef>
-                <a:spcPts val="0"/>
-              </a:spcBef>
-              <a:spcAft>
-                <a:spcPts val="0"/>
-              </a:spcAft>
-              <a:buNone/>
-            </a:pPr>
-            <a:r>
-              <a:rPr lang="en-CA" sz="5200" dirty="0"/>
-              <a:t>                        unproven:             0.85</a:t>
-            </a:r>
-          </a:p>
-          <a:p>
-            <a:pPr marL="0" indent="0">
-              <a:lnSpc>
-                <a:spcPct val="120000"/>
-              </a:lnSpc>
-              <a:spcBef>
-                <a:spcPts val="0"/>
-              </a:spcBef>
-              <a:spcAft>
-                <a:spcPts val="0"/>
-              </a:spcAft>
-              <a:buNone/>
-            </a:pPr>
-            <a:r>
-              <a:rPr lang="en-CA" sz="5200" dirty="0"/>
-              <a:t>                        proof-of-concept:     0.9</a:t>
-            </a:r>
-          </a:p>
-          <a:p>
-            <a:pPr marL="0" indent="0">
-              <a:lnSpc>
-                <a:spcPct val="120000"/>
-              </a:lnSpc>
-              <a:spcBef>
-                <a:spcPts val="0"/>
-              </a:spcBef>
-              <a:spcAft>
-                <a:spcPts val="0"/>
-              </a:spcAft>
-              <a:buNone/>
-            </a:pPr>
-            <a:r>
-              <a:rPr lang="en-CA" sz="5200" dirty="0"/>
-              <a:t>                        functional:           0.95</a:t>
-            </a:r>
-          </a:p>
-          <a:p>
-            <a:pPr marL="0" indent="0">
-              <a:lnSpc>
-                <a:spcPct val="120000"/>
-              </a:lnSpc>
-              <a:spcBef>
-                <a:spcPts val="0"/>
-              </a:spcBef>
-              <a:spcAft>
-                <a:spcPts val="0"/>
-              </a:spcAft>
-              <a:buNone/>
-            </a:pPr>
-            <a:r>
-              <a:rPr lang="en-CA" sz="5200" dirty="0"/>
-              <a:t>                        high:                 1.00</a:t>
-            </a:r>
-          </a:p>
-          <a:p>
-            <a:pPr marL="0" indent="0">
-              <a:lnSpc>
-                <a:spcPct val="120000"/>
-              </a:lnSpc>
-              <a:spcBef>
-                <a:spcPts val="0"/>
-              </a:spcBef>
-              <a:spcAft>
-                <a:spcPts val="0"/>
-              </a:spcAft>
-              <a:buNone/>
-            </a:pPr>
-            <a:r>
-              <a:rPr lang="en-CA" sz="5200" dirty="0"/>
-              <a:t>			not defined:          1.00</a:t>
-            </a:r>
-          </a:p>
-          <a:p>
-            <a:pPr marL="0" indent="0">
-              <a:lnSpc>
-                <a:spcPct val="120000"/>
-              </a:lnSpc>
-              <a:spcBef>
-                <a:spcPts val="0"/>
-              </a:spcBef>
-              <a:spcAft>
-                <a:spcPts val="0"/>
-              </a:spcAft>
-              <a:buNone/>
-            </a:pPr>
-            <a:endParaRPr lang="en-CA" sz="5200" dirty="0"/>
-          </a:p>
-          <a:p>
-            <a:pPr marL="0" indent="0">
-              <a:lnSpc>
-                <a:spcPct val="120000"/>
-              </a:lnSpc>
-              <a:spcBef>
-                <a:spcPts val="0"/>
-              </a:spcBef>
-              <a:spcAft>
-                <a:spcPts val="0"/>
-              </a:spcAft>
-              <a:buNone/>
-            </a:pPr>
-            <a:r>
-              <a:rPr lang="en-CA" sz="5200" dirty="0" err="1"/>
-              <a:t>RemediationLevel</a:t>
-            </a:r>
-            <a:r>
-              <a:rPr lang="en-CA" sz="5200" dirty="0"/>
-              <a:t> = case </a:t>
-            </a:r>
-            <a:r>
-              <a:rPr lang="en-CA" sz="5200" dirty="0" err="1"/>
-              <a:t>RemediationLevel</a:t>
-            </a:r>
-            <a:r>
-              <a:rPr lang="en-CA" sz="5200" dirty="0"/>
-              <a:t> of</a:t>
-            </a:r>
-          </a:p>
-          <a:p>
-            <a:pPr marL="0" indent="0">
-              <a:lnSpc>
-                <a:spcPct val="120000"/>
-              </a:lnSpc>
-              <a:spcBef>
-                <a:spcPts val="0"/>
-              </a:spcBef>
-              <a:spcAft>
-                <a:spcPts val="0"/>
-              </a:spcAft>
-              <a:buNone/>
-            </a:pPr>
-            <a:r>
-              <a:rPr lang="en-CA" sz="5200" dirty="0"/>
-              <a:t>                        official-fix:         0.87</a:t>
-            </a:r>
-          </a:p>
-          <a:p>
-            <a:pPr marL="0" indent="0">
-              <a:lnSpc>
-                <a:spcPct val="120000"/>
-              </a:lnSpc>
-              <a:spcBef>
-                <a:spcPts val="0"/>
-              </a:spcBef>
-              <a:spcAft>
-                <a:spcPts val="0"/>
-              </a:spcAft>
-              <a:buNone/>
-            </a:pPr>
-            <a:r>
-              <a:rPr lang="en-CA" sz="5200" dirty="0"/>
-              <a:t>                        temporary-fix:        0.90</a:t>
-            </a:r>
-          </a:p>
-          <a:p>
-            <a:pPr marL="0" indent="0">
-              <a:lnSpc>
-                <a:spcPct val="120000"/>
-              </a:lnSpc>
-              <a:spcBef>
-                <a:spcPts val="0"/>
-              </a:spcBef>
-              <a:spcAft>
-                <a:spcPts val="0"/>
-              </a:spcAft>
-              <a:buNone/>
-            </a:pPr>
-            <a:r>
-              <a:rPr lang="en-CA" sz="5200" dirty="0"/>
-              <a:t>                        workaround:           0.95</a:t>
-            </a:r>
-          </a:p>
-          <a:p>
-            <a:pPr marL="0" indent="0">
-              <a:lnSpc>
-                <a:spcPct val="120000"/>
-              </a:lnSpc>
-              <a:spcBef>
-                <a:spcPts val="0"/>
-              </a:spcBef>
-              <a:spcAft>
-                <a:spcPts val="0"/>
-              </a:spcAft>
-              <a:buNone/>
-            </a:pPr>
-            <a:r>
-              <a:rPr lang="en-CA" sz="5200" dirty="0"/>
-              <a:t>                        unavailable:          1.00</a:t>
-            </a:r>
-          </a:p>
-          <a:p>
-            <a:pPr marL="0" indent="0">
-              <a:lnSpc>
-                <a:spcPct val="120000"/>
-              </a:lnSpc>
-              <a:spcBef>
-                <a:spcPts val="0"/>
-              </a:spcBef>
-              <a:spcAft>
-                <a:spcPts val="0"/>
-              </a:spcAft>
-              <a:buNone/>
-            </a:pPr>
-            <a:r>
-              <a:rPr lang="en-CA" sz="5200" dirty="0"/>
-              <a:t>                        not defined:          1.00</a:t>
-            </a:r>
-          </a:p>
-          <a:p>
-            <a:pPr marL="0" indent="0">
-              <a:lnSpc>
-                <a:spcPct val="120000"/>
-              </a:lnSpc>
-              <a:spcBef>
-                <a:spcPts val="0"/>
-              </a:spcBef>
-              <a:spcAft>
-                <a:spcPts val="0"/>
-              </a:spcAft>
-              <a:buNone/>
-            </a:pPr>
-            <a:endParaRPr lang="en-CA" sz="5200" dirty="0"/>
-          </a:p>
-          <a:p>
-            <a:pPr marL="0" indent="0">
-              <a:lnSpc>
-                <a:spcPct val="120000"/>
-              </a:lnSpc>
-              <a:spcBef>
-                <a:spcPts val="0"/>
-              </a:spcBef>
-              <a:spcAft>
-                <a:spcPts val="0"/>
-              </a:spcAft>
-              <a:buNone/>
-            </a:pPr>
-            <a:r>
-              <a:rPr lang="en-CA" sz="5200" dirty="0" err="1"/>
-              <a:t>ReportConfidence</a:t>
-            </a:r>
-            <a:r>
-              <a:rPr lang="en-CA" sz="5200" dirty="0"/>
-              <a:t> = case </a:t>
-            </a:r>
-            <a:r>
-              <a:rPr lang="en-CA" sz="5200" dirty="0" err="1"/>
-              <a:t>ReportConfidence</a:t>
-            </a:r>
-            <a:r>
-              <a:rPr lang="en-CA" sz="5200" dirty="0"/>
-              <a:t> of</a:t>
-            </a:r>
-          </a:p>
-          <a:p>
-            <a:pPr marL="0" indent="0">
-              <a:lnSpc>
-                <a:spcPct val="120000"/>
-              </a:lnSpc>
-              <a:spcBef>
-                <a:spcPts val="0"/>
-              </a:spcBef>
-              <a:spcAft>
-                <a:spcPts val="0"/>
-              </a:spcAft>
-              <a:buNone/>
-            </a:pPr>
-            <a:r>
-              <a:rPr lang="en-CA" sz="5200" dirty="0"/>
-              <a:t>                        unconfirmed:          0.90</a:t>
-            </a:r>
-          </a:p>
-          <a:p>
-            <a:pPr marL="0" indent="0">
-              <a:lnSpc>
-                <a:spcPct val="120000"/>
-              </a:lnSpc>
-              <a:spcBef>
-                <a:spcPts val="0"/>
-              </a:spcBef>
-              <a:spcAft>
-                <a:spcPts val="0"/>
-              </a:spcAft>
-              <a:buNone/>
-            </a:pPr>
-            <a:r>
-              <a:rPr lang="en-CA" sz="5200" dirty="0"/>
-              <a:t>                        uncorroborated:       0.95</a:t>
-            </a:r>
-          </a:p>
-          <a:p>
-            <a:pPr marL="0" indent="0">
-              <a:lnSpc>
-                <a:spcPct val="120000"/>
-              </a:lnSpc>
-              <a:spcBef>
-                <a:spcPts val="0"/>
-              </a:spcBef>
-              <a:spcAft>
-                <a:spcPts val="0"/>
-              </a:spcAft>
-              <a:buNone/>
-            </a:pPr>
-            <a:r>
-              <a:rPr lang="en-CA" sz="5200" dirty="0"/>
-              <a:t>                        confirmed:            1.00</a:t>
-            </a:r>
-          </a:p>
-          <a:p>
-            <a:pPr marL="0" indent="0">
-              <a:lnSpc>
-                <a:spcPct val="120000"/>
-              </a:lnSpc>
-              <a:spcBef>
-                <a:spcPts val="0"/>
-              </a:spcBef>
-              <a:spcAft>
-                <a:spcPts val="0"/>
-              </a:spcAft>
-              <a:buNone/>
-            </a:pPr>
-            <a:r>
-              <a:rPr lang="en-CA" sz="5200" dirty="0"/>
-              <a:t>                        not defined:          1.00</a:t>
-            </a:r>
-          </a:p>
-        </p:txBody>
-      </p:sp>
-    </p:spTree>
-    <p:extLst>
-      <p:ext uri="{BB962C8B-B14F-4D97-AF65-F5344CB8AC3E}">
-        <p14:creationId xmlns:p14="http://schemas.microsoft.com/office/powerpoint/2010/main" val="1863858615"/>
-      </p:ext>
-    </p:extLst>
-  </p:cSld>
-  <p:clrMapOvr>
-    <a:masterClrMapping/>
-  </p:clrMapOvr>
-  <p:timing>
-    <p:tnLst>
-      <p:par>
-        <p:cTn id="1" dur="indefinite" restart="never" nodeType="tmRoot"/>
-      </p:par>
-    </p:tnLst>
-  </p:timing>
-</p:sld>
-</file>
-
 <file path=ppt/slides/slide36.xml><?xml version="1.0" encoding="utf-8"?>
 <p:sld xmlns:a="http://schemas.openxmlformats.org/drawingml/2006/main" xmlns:r="http://schemas.openxmlformats.org/officeDocument/2006/relationships" xmlns:p="http://schemas.openxmlformats.org/presentationml/2006/main">
   <p:cSld>
@@ -13289,6 +12962,528 @@
           <a:p>
             <a:r>
               <a:rPr lang="en-US" dirty="0" smtClean="0"/>
+              <a:t>CVSS Temporal score</a:t>
+            </a:r>
+            <a:endParaRPr lang="en-CA" dirty="0"/>
+          </a:p>
+        </p:txBody>
+      </p:sp>
+      <p:sp>
+        <p:nvSpPr>
+          <p:cNvPr id="3" name="Content Placeholder 2"/>
+          <p:cNvSpPr>
+            <a:spLocks noGrp="1"/>
+          </p:cNvSpPr>
+          <p:nvPr>
+            <p:ph idx="1"/>
+          </p:nvPr>
+        </p:nvSpPr>
+        <p:spPr>
+          <a:xfrm>
+            <a:off x="684211" y="1782617"/>
+            <a:ext cx="7726457" cy="4116341"/>
+          </a:xfrm>
+        </p:spPr>
+        <p:txBody>
+          <a:bodyPr>
+            <a:normAutofit fontScale="25000" lnSpcReduction="20000"/>
+          </a:bodyPr>
+          <a:lstStyle/>
+          <a:p>
+            <a:pPr marL="0" indent="0">
+              <a:lnSpc>
+                <a:spcPct val="120000"/>
+              </a:lnSpc>
+              <a:spcBef>
+                <a:spcPts val="0"/>
+              </a:spcBef>
+              <a:spcAft>
+                <a:spcPts val="0"/>
+              </a:spcAft>
+              <a:buNone/>
+            </a:pPr>
+            <a:r>
+              <a:rPr lang="en-CA" sz="5200" dirty="0" err="1"/>
+              <a:t>TemporalScore</a:t>
+            </a:r>
+            <a:r>
+              <a:rPr lang="en-CA" sz="5200" dirty="0"/>
+              <a:t> = round_to_1_decimal(</a:t>
+            </a:r>
+            <a:r>
+              <a:rPr lang="en-CA" sz="5200" dirty="0" err="1"/>
+              <a:t>BaseScore</a:t>
+            </a:r>
+            <a:r>
+              <a:rPr lang="en-CA" sz="5200" dirty="0"/>
+              <a:t>*Exploitability</a:t>
+            </a:r>
+          </a:p>
+          <a:p>
+            <a:pPr marL="0" indent="0">
+              <a:lnSpc>
+                <a:spcPct val="120000"/>
+              </a:lnSpc>
+              <a:spcBef>
+                <a:spcPts val="0"/>
+              </a:spcBef>
+              <a:spcAft>
+                <a:spcPts val="0"/>
+              </a:spcAft>
+              <a:buNone/>
+            </a:pPr>
+            <a:r>
+              <a:rPr lang="en-CA" sz="5200" dirty="0"/>
+              <a:t>                *</a:t>
+            </a:r>
+            <a:r>
+              <a:rPr lang="en-CA" sz="5200" dirty="0" err="1"/>
+              <a:t>RemediationLevel</a:t>
+            </a:r>
+            <a:r>
+              <a:rPr lang="en-CA" sz="5200" dirty="0"/>
+              <a:t>*</a:t>
+            </a:r>
+            <a:r>
+              <a:rPr lang="en-CA" sz="5200" dirty="0" err="1"/>
+              <a:t>ReportConfidence</a:t>
+            </a:r>
+            <a:r>
+              <a:rPr lang="en-CA" sz="5200" dirty="0"/>
+              <a:t>)</a:t>
+            </a:r>
+          </a:p>
+          <a:p>
+            <a:pPr marL="0" indent="0">
+              <a:lnSpc>
+                <a:spcPct val="120000"/>
+              </a:lnSpc>
+              <a:spcBef>
+                <a:spcPts val="0"/>
+              </a:spcBef>
+              <a:spcAft>
+                <a:spcPts val="0"/>
+              </a:spcAft>
+              <a:buNone/>
+            </a:pPr>
+            <a:endParaRPr lang="en-CA" sz="5200" dirty="0"/>
+          </a:p>
+          <a:p>
+            <a:pPr marL="0" indent="0">
+              <a:lnSpc>
+                <a:spcPct val="120000"/>
+              </a:lnSpc>
+              <a:spcBef>
+                <a:spcPts val="0"/>
+              </a:spcBef>
+              <a:spcAft>
+                <a:spcPts val="0"/>
+              </a:spcAft>
+              <a:buNone/>
+            </a:pPr>
+            <a:r>
+              <a:rPr lang="en-CA" sz="5200" dirty="0"/>
+              <a:t>Exploitability   = case Exploitability of</a:t>
+            </a:r>
+          </a:p>
+          <a:p>
+            <a:pPr marL="0" indent="0">
+              <a:lnSpc>
+                <a:spcPct val="120000"/>
+              </a:lnSpc>
+              <a:spcBef>
+                <a:spcPts val="0"/>
+              </a:spcBef>
+              <a:spcAft>
+                <a:spcPts val="0"/>
+              </a:spcAft>
+              <a:buNone/>
+            </a:pPr>
+            <a:r>
+              <a:rPr lang="en-CA" sz="5200" dirty="0"/>
+              <a:t>                        unproven:             0.85</a:t>
+            </a:r>
+          </a:p>
+          <a:p>
+            <a:pPr marL="0" indent="0">
+              <a:lnSpc>
+                <a:spcPct val="120000"/>
+              </a:lnSpc>
+              <a:spcBef>
+                <a:spcPts val="0"/>
+              </a:spcBef>
+              <a:spcAft>
+                <a:spcPts val="0"/>
+              </a:spcAft>
+              <a:buNone/>
+            </a:pPr>
+            <a:r>
+              <a:rPr lang="en-CA" sz="5200" dirty="0"/>
+              <a:t>                        proof-of-concept:     0.9</a:t>
+            </a:r>
+          </a:p>
+          <a:p>
+            <a:pPr marL="0" indent="0">
+              <a:lnSpc>
+                <a:spcPct val="120000"/>
+              </a:lnSpc>
+              <a:spcBef>
+                <a:spcPts val="0"/>
+              </a:spcBef>
+              <a:spcAft>
+                <a:spcPts val="0"/>
+              </a:spcAft>
+              <a:buNone/>
+            </a:pPr>
+            <a:r>
+              <a:rPr lang="en-CA" sz="5200" dirty="0"/>
+              <a:t>                        functional:           0.95</a:t>
+            </a:r>
+          </a:p>
+          <a:p>
+            <a:pPr marL="0" indent="0">
+              <a:lnSpc>
+                <a:spcPct val="120000"/>
+              </a:lnSpc>
+              <a:spcBef>
+                <a:spcPts val="0"/>
+              </a:spcBef>
+              <a:spcAft>
+                <a:spcPts val="0"/>
+              </a:spcAft>
+              <a:buNone/>
+            </a:pPr>
+            <a:r>
+              <a:rPr lang="en-CA" sz="5200" dirty="0"/>
+              <a:t>                        high:                 1.00</a:t>
+            </a:r>
+          </a:p>
+          <a:p>
+            <a:pPr marL="0" indent="0">
+              <a:lnSpc>
+                <a:spcPct val="120000"/>
+              </a:lnSpc>
+              <a:spcBef>
+                <a:spcPts val="0"/>
+              </a:spcBef>
+              <a:spcAft>
+                <a:spcPts val="0"/>
+              </a:spcAft>
+              <a:buNone/>
+            </a:pPr>
+            <a:r>
+              <a:rPr lang="en-CA" sz="5200" dirty="0"/>
+              <a:t>			not defined:          1.00</a:t>
+            </a:r>
+          </a:p>
+          <a:p>
+            <a:pPr marL="0" indent="0">
+              <a:lnSpc>
+                <a:spcPct val="120000"/>
+              </a:lnSpc>
+              <a:spcBef>
+                <a:spcPts val="0"/>
+              </a:spcBef>
+              <a:spcAft>
+                <a:spcPts val="0"/>
+              </a:spcAft>
+              <a:buNone/>
+            </a:pPr>
+            <a:endParaRPr lang="en-CA" sz="5200" dirty="0"/>
+          </a:p>
+          <a:p>
+            <a:pPr marL="0" indent="0">
+              <a:lnSpc>
+                <a:spcPct val="120000"/>
+              </a:lnSpc>
+              <a:spcBef>
+                <a:spcPts val="0"/>
+              </a:spcBef>
+              <a:spcAft>
+                <a:spcPts val="0"/>
+              </a:spcAft>
+              <a:buNone/>
+            </a:pPr>
+            <a:r>
+              <a:rPr lang="en-CA" sz="5200" dirty="0" err="1"/>
+              <a:t>RemediationLevel</a:t>
+            </a:r>
+            <a:r>
+              <a:rPr lang="en-CA" sz="5200" dirty="0"/>
+              <a:t> = case </a:t>
+            </a:r>
+            <a:r>
+              <a:rPr lang="en-CA" sz="5200" dirty="0" err="1"/>
+              <a:t>RemediationLevel</a:t>
+            </a:r>
+            <a:r>
+              <a:rPr lang="en-CA" sz="5200" dirty="0"/>
+              <a:t> of</a:t>
+            </a:r>
+          </a:p>
+          <a:p>
+            <a:pPr marL="0" indent="0">
+              <a:lnSpc>
+                <a:spcPct val="120000"/>
+              </a:lnSpc>
+              <a:spcBef>
+                <a:spcPts val="0"/>
+              </a:spcBef>
+              <a:spcAft>
+                <a:spcPts val="0"/>
+              </a:spcAft>
+              <a:buNone/>
+            </a:pPr>
+            <a:r>
+              <a:rPr lang="en-CA" sz="5200" dirty="0"/>
+              <a:t>                        official-fix:         0.87</a:t>
+            </a:r>
+          </a:p>
+          <a:p>
+            <a:pPr marL="0" indent="0">
+              <a:lnSpc>
+                <a:spcPct val="120000"/>
+              </a:lnSpc>
+              <a:spcBef>
+                <a:spcPts val="0"/>
+              </a:spcBef>
+              <a:spcAft>
+                <a:spcPts val="0"/>
+              </a:spcAft>
+              <a:buNone/>
+            </a:pPr>
+            <a:r>
+              <a:rPr lang="en-CA" sz="5200" dirty="0"/>
+              <a:t>                        temporary-fix:        0.90</a:t>
+            </a:r>
+          </a:p>
+          <a:p>
+            <a:pPr marL="0" indent="0">
+              <a:lnSpc>
+                <a:spcPct val="120000"/>
+              </a:lnSpc>
+              <a:spcBef>
+                <a:spcPts val="0"/>
+              </a:spcBef>
+              <a:spcAft>
+                <a:spcPts val="0"/>
+              </a:spcAft>
+              <a:buNone/>
+            </a:pPr>
+            <a:r>
+              <a:rPr lang="en-CA" sz="5200" dirty="0"/>
+              <a:t>                        workaround:           0.95</a:t>
+            </a:r>
+          </a:p>
+          <a:p>
+            <a:pPr marL="0" indent="0">
+              <a:lnSpc>
+                <a:spcPct val="120000"/>
+              </a:lnSpc>
+              <a:spcBef>
+                <a:spcPts val="0"/>
+              </a:spcBef>
+              <a:spcAft>
+                <a:spcPts val="0"/>
+              </a:spcAft>
+              <a:buNone/>
+            </a:pPr>
+            <a:r>
+              <a:rPr lang="en-CA" sz="5200" dirty="0"/>
+              <a:t>                        unavailable:          1.00</a:t>
+            </a:r>
+          </a:p>
+          <a:p>
+            <a:pPr marL="0" indent="0">
+              <a:lnSpc>
+                <a:spcPct val="120000"/>
+              </a:lnSpc>
+              <a:spcBef>
+                <a:spcPts val="0"/>
+              </a:spcBef>
+              <a:spcAft>
+                <a:spcPts val="0"/>
+              </a:spcAft>
+              <a:buNone/>
+            </a:pPr>
+            <a:r>
+              <a:rPr lang="en-CA" sz="5200" dirty="0"/>
+              <a:t>                        not defined:          1.00</a:t>
+            </a:r>
+          </a:p>
+          <a:p>
+            <a:pPr marL="0" indent="0">
+              <a:lnSpc>
+                <a:spcPct val="120000"/>
+              </a:lnSpc>
+              <a:spcBef>
+                <a:spcPts val="0"/>
+              </a:spcBef>
+              <a:spcAft>
+                <a:spcPts val="0"/>
+              </a:spcAft>
+              <a:buNone/>
+            </a:pPr>
+            <a:endParaRPr lang="en-CA" sz="5200" dirty="0"/>
+          </a:p>
+          <a:p>
+            <a:pPr marL="0" indent="0">
+              <a:lnSpc>
+                <a:spcPct val="120000"/>
+              </a:lnSpc>
+              <a:spcBef>
+                <a:spcPts val="0"/>
+              </a:spcBef>
+              <a:spcAft>
+                <a:spcPts val="0"/>
+              </a:spcAft>
+              <a:buNone/>
+            </a:pPr>
+            <a:r>
+              <a:rPr lang="en-CA" sz="5200" dirty="0" err="1"/>
+              <a:t>ReportConfidence</a:t>
+            </a:r>
+            <a:r>
+              <a:rPr lang="en-CA" sz="5200" dirty="0"/>
+              <a:t> = case </a:t>
+            </a:r>
+            <a:r>
+              <a:rPr lang="en-CA" sz="5200" dirty="0" err="1"/>
+              <a:t>ReportConfidence</a:t>
+            </a:r>
+            <a:r>
+              <a:rPr lang="en-CA" sz="5200" dirty="0"/>
+              <a:t> of</a:t>
+            </a:r>
+          </a:p>
+          <a:p>
+            <a:pPr marL="0" indent="0">
+              <a:lnSpc>
+                <a:spcPct val="120000"/>
+              </a:lnSpc>
+              <a:spcBef>
+                <a:spcPts val="0"/>
+              </a:spcBef>
+              <a:spcAft>
+                <a:spcPts val="0"/>
+              </a:spcAft>
+              <a:buNone/>
+            </a:pPr>
+            <a:r>
+              <a:rPr lang="en-CA" sz="5200" dirty="0"/>
+              <a:t>                        unconfirmed:          0.90</a:t>
+            </a:r>
+          </a:p>
+          <a:p>
+            <a:pPr marL="0" indent="0">
+              <a:lnSpc>
+                <a:spcPct val="120000"/>
+              </a:lnSpc>
+              <a:spcBef>
+                <a:spcPts val="0"/>
+              </a:spcBef>
+              <a:spcAft>
+                <a:spcPts val="0"/>
+              </a:spcAft>
+              <a:buNone/>
+            </a:pPr>
+            <a:r>
+              <a:rPr lang="en-CA" sz="5200" dirty="0"/>
+              <a:t>                        uncorroborated:       0.95</a:t>
+            </a:r>
+          </a:p>
+          <a:p>
+            <a:pPr marL="0" indent="0">
+              <a:lnSpc>
+                <a:spcPct val="120000"/>
+              </a:lnSpc>
+              <a:spcBef>
+                <a:spcPts val="0"/>
+              </a:spcBef>
+              <a:spcAft>
+                <a:spcPts val="0"/>
+              </a:spcAft>
+              <a:buNone/>
+            </a:pPr>
+            <a:r>
+              <a:rPr lang="en-CA" sz="5200" dirty="0"/>
+              <a:t>                        confirmed:            1.00</a:t>
+            </a:r>
+          </a:p>
+          <a:p>
+            <a:pPr marL="0" indent="0">
+              <a:lnSpc>
+                <a:spcPct val="120000"/>
+              </a:lnSpc>
+              <a:spcBef>
+                <a:spcPts val="0"/>
+              </a:spcBef>
+              <a:spcAft>
+                <a:spcPts val="0"/>
+              </a:spcAft>
+              <a:buNone/>
+            </a:pPr>
+            <a:r>
+              <a:rPr lang="en-CA" sz="5200" dirty="0"/>
+              <a:t>                        not defined:          1.00</a:t>
+            </a:r>
+          </a:p>
+        </p:txBody>
+      </p:sp>
+    </p:spTree>
+    <p:extLst>
+      <p:ext uri="{BB962C8B-B14F-4D97-AF65-F5344CB8AC3E}">
+        <p14:creationId xmlns:p14="http://schemas.microsoft.com/office/powerpoint/2010/main" val="1863858615"/>
+      </p:ext>
+    </p:extLst>
+  </p:cSld>
+  <p:clrMapOvr>
+    <a:masterClrMapping/>
+  </p:clrMapOvr>
+  <p:timing>
+    <p:tnLst>
+      <p:par>
+        <p:cTn id="1" dur="indefinite" restart="never" nodeType="tmRoot"/>
+      </p:par>
+    </p:tnLst>
+  </p:timing>
+</p:sld>
+</file>
+
+<file path=ppt/slides/slide37.xml><?xml version="1.0" encoding="utf-8"?>
+<p:sld xmlns:a="http://schemas.openxmlformats.org/drawingml/2006/main" xmlns:r="http://schemas.openxmlformats.org/officeDocument/2006/relationships" xmlns:p="http://schemas.openxmlformats.org/presentationml/2006/main">
+  <p:cSld>
+    <p:spTree>
+      <p:nvGrpSpPr>
+        <p:cNvPr id="1" name=""/>
+        <p:cNvGrpSpPr/>
+        <p:nvPr/>
+      </p:nvGrpSpPr>
+      <p:grpSpPr>
+        <a:xfrm>
+          <a:off x="0" y="0"/>
+          <a:ext cx="0" cy="0"/>
+          <a:chOff x="0" y="0"/>
+          <a:chExt cx="0" cy="0"/>
+        </a:xfrm>
+      </p:grpSpPr>
+      <p:sp>
+        <p:nvSpPr>
+          <p:cNvPr id="2" name="Title 1"/>
+          <p:cNvSpPr>
+            <a:spLocks noGrp="1"/>
+          </p:cNvSpPr>
+          <p:nvPr>
+            <p:ph type="title"/>
+          </p:nvPr>
+        </p:nvSpPr>
+        <p:spPr/>
+        <p:txBody>
+          <a:bodyPr/>
+          <a:lstStyle/>
+          <a:p>
+            <a:r>
+              <a:rPr lang="en-US" dirty="0" smtClean="0"/>
               <a:t>CVSS Environmental score</a:t>
             </a:r>
             <a:endParaRPr lang="en-CA" dirty="0"/>
@@ -13308,7 +13503,7 @@
         <p:spPr>
           <a:xfrm>
             <a:off x="684212" y="1782617"/>
-            <a:ext cx="5010418" cy="4116341"/>
+            <a:ext cx="5866056" cy="4116341"/>
           </a:xfrm>
         </p:spPr>
         <p:txBody>
@@ -13700,8 +13895,8 @@
         </p:nvSpPr>
         <p:spPr>
           <a:xfrm>
-            <a:off x="5966234" y="1782617"/>
-            <a:ext cx="5423025" cy="4116341"/>
+            <a:off x="6550268" y="1782617"/>
+            <a:ext cx="5152293" cy="4116341"/>
           </a:xfrm>
           <a:prstGeom prst="rect">
             <a:avLst/>
@@ -14407,7 +14602,12 @@
             <p:ph idx="1"/>
           </p:nvPr>
         </p:nvSpPr>
-        <p:spPr/>
+        <p:spPr>
+          <a:xfrm>
+            <a:off x="684212" y="1782617"/>
+            <a:ext cx="9303850" cy="4116341"/>
+          </a:xfrm>
+        </p:spPr>
         <p:txBody>
           <a:bodyPr anchor="t"/>
           <a:lstStyle/>
@@ -14425,16 +14625,19 @@
           </a:p>
           <a:p>
             <a:r>
+              <a:rPr lang="en-US" dirty="0"/>
+              <a:t>Can help prioritize vulnerability </a:t>
+            </a:r>
+            <a:r>
               <a:rPr lang="en-US" dirty="0" smtClean="0"/>
-              <a:t>Metrics mostly qualitative</a:t>
+              <a:t>addressment</a:t>
             </a:r>
           </a:p>
           <a:p>
             <a:r>
               <a:rPr lang="en-US" dirty="0" smtClean="0"/>
-              <a:t>Can help prioritize vulnerability addressment</a:t>
-            </a:r>
-            <a:endParaRPr lang="en-CA" dirty="0"/>
+              <a:t>Metrics mostly objective, quantitative </a:t>
+            </a:r>
           </a:p>
         </p:txBody>
       </p:sp>
@@ -16391,6 +16594,24 @@
           <a:lstStyle/>
           <a:p>
             <a:r>
+              <a:rPr lang="en-US" dirty="0" smtClean="0"/>
+              <a:t>Intrinsic vulnerability characteristics</a:t>
+            </a:r>
+          </a:p>
+          <a:p>
+            <a:r>
+              <a:rPr lang="en-US" dirty="0" smtClean="0"/>
+              <a:t>Time and context invariable</a:t>
+            </a:r>
+          </a:p>
+          <a:p>
+            <a:r>
+              <a:rPr lang="en-US" dirty="0" smtClean="0"/>
+              <a:t>Incorporates likelihood and impact of an attack</a:t>
+            </a:r>
+          </a:p>
+          <a:p>
+            <a:r>
               <a:rPr lang="en-US" dirty="0"/>
               <a:t>Most popular CVSS </a:t>
             </a:r>
@@ -16398,24 +16619,7 @@
               <a:rPr lang="en-US" dirty="0" smtClean="0"/>
               <a:t>score</a:t>
             </a:r>
-          </a:p>
-          <a:p>
-            <a:r>
-              <a:rPr lang="en-US" dirty="0" smtClean="0"/>
-              <a:t>Intrinsic vulnerability characteristics</a:t>
-            </a:r>
-          </a:p>
-          <a:p>
-            <a:r>
-              <a:rPr lang="en-US" dirty="0" smtClean="0"/>
-              <a:t>Time and context invariable</a:t>
-            </a:r>
-          </a:p>
-          <a:p>
-            <a:r>
-              <a:rPr lang="en-US" dirty="0" smtClean="0"/>
-              <a:t>Incorporates likelihood and impact of an attack</a:t>
-            </a:r>
+            <a:endParaRPr lang="en-US" dirty="0"/>
           </a:p>
         </p:txBody>
       </p:sp>
@@ -17223,7 +17427,7 @@
             <p:spPr>
               <a:xfrm>
                 <a:off x="684212" y="1782617"/>
-                <a:ext cx="5454038" cy="4074975"/>
+                <a:ext cx="6566988" cy="4074975"/>
               </a:xfrm>
             </p:spPr>
             <p:txBody>
@@ -17301,12 +17505,12 @@
             <p:spPr>
               <a:xfrm>
                 <a:off x="684212" y="1782617"/>
-                <a:ext cx="5454038" cy="4074975"/>
+                <a:ext cx="6566988" cy="4074975"/>
               </a:xfrm>
-              <a:blipFill rotWithShape="0">
+              <a:blipFill>
                 <a:blip r:embed="rId2"/>
                 <a:stretch>
-                  <a:fillRect l="-1676" t="-1943"/>
+                  <a:fillRect l="-1391" t="-1943" r="-1299"/>
                 </a:stretch>
               </a:blipFill>
             </p:spPr>
@@ -17315,7 +17519,7 @@
               <a:lstStyle/>
               <a:p>
                 <a:r>
-                  <a:rPr lang="en-CA">
+                  <a:rPr lang="en-US">
                     <a:noFill/>
                   </a:rPr>
                   <a:t> </a:t>
@@ -17821,7 +18025,7 @@
         <p:spPr>
           <a:xfrm>
             <a:off x="684212" y="1782617"/>
-            <a:ext cx="5454038" cy="4116341"/>
+            <a:ext cx="5435234" cy="4116341"/>
           </a:xfrm>
         </p:spPr>
         <p:txBody>
@@ -17830,7 +18034,7 @@
           <a:p>
             <a:r>
               <a:rPr lang="en-US" dirty="0" smtClean="0"/>
-              <a:t>Deployment dependent</a:t>
+              <a:t>Application dependent</a:t>
             </a:r>
           </a:p>
           <a:p>

</xml_diff>

<commit_message>
CISC 848 - Python txt to csv parser working, synch before full run
</commit_message>
<xml_diff>
--- a/CISC848/BackgroundPentation/ChurchCISC848Background.pptx
+++ b/CISC848/BackgroundPentation/ChurchCISC848Background.pptx
@@ -339,7 +339,7 @@
           <a:p>
             <a:fld id="{E4250886-215E-474B-A4B7-516F0D324D19}" type="datetimeFigureOut">
               <a:rPr lang="en-CA" smtClean="0"/>
-              <a:t>2017-01-23</a:t>
+              <a:t>2017-01-24</a:t>
             </a:fld>
             <a:endParaRPr lang="en-CA"/>
           </a:p>
@@ -775,7 +775,7 @@
           <a:p>
             <a:fld id="{E4250886-215E-474B-A4B7-516F0D324D19}" type="datetimeFigureOut">
               <a:rPr lang="en-CA" smtClean="0"/>
-              <a:t>2017-01-23</a:t>
+              <a:t>2017-01-24</a:t>
             </a:fld>
             <a:endParaRPr lang="en-CA"/>
           </a:p>
@@ -1025,7 +1025,7 @@
           <a:p>
             <a:fld id="{E4250886-215E-474B-A4B7-516F0D324D19}" type="datetimeFigureOut">
               <a:rPr lang="en-CA" smtClean="0"/>
-              <a:t>2017-01-23</a:t>
+              <a:t>2017-01-24</a:t>
             </a:fld>
             <a:endParaRPr lang="en-CA"/>
           </a:p>
@@ -1333,7 +1333,7 @@
           <a:p>
             <a:fld id="{E4250886-215E-474B-A4B7-516F0D324D19}" type="datetimeFigureOut">
               <a:rPr lang="en-CA" smtClean="0"/>
-              <a:t>2017-01-23</a:t>
+              <a:t>2017-01-24</a:t>
             </a:fld>
             <a:endParaRPr lang="en-CA"/>
           </a:p>
@@ -1651,7 +1651,7 @@
           <a:p>
             <a:fld id="{E4250886-215E-474B-A4B7-516F0D324D19}" type="datetimeFigureOut">
               <a:rPr lang="en-CA" smtClean="0"/>
-              <a:t>2017-01-23</a:t>
+              <a:t>2017-01-24</a:t>
             </a:fld>
             <a:endParaRPr lang="en-CA"/>
           </a:p>
@@ -1953,7 +1953,7 @@
           <a:p>
             <a:fld id="{E4250886-215E-474B-A4B7-516F0D324D19}" type="datetimeFigureOut">
               <a:rPr lang="en-CA" smtClean="0"/>
-              <a:t>2017-01-23</a:t>
+              <a:t>2017-01-24</a:t>
             </a:fld>
             <a:endParaRPr lang="en-CA"/>
           </a:p>
@@ -2320,7 +2320,7 @@
           <a:p>
             <a:fld id="{E4250886-215E-474B-A4B7-516F0D324D19}" type="datetimeFigureOut">
               <a:rPr lang="en-CA" smtClean="0"/>
-              <a:t>2017-01-23</a:t>
+              <a:t>2017-01-24</a:t>
             </a:fld>
             <a:endParaRPr lang="en-CA"/>
           </a:p>
@@ -2494,7 +2494,7 @@
           <a:p>
             <a:fld id="{E4250886-215E-474B-A4B7-516F0D324D19}" type="datetimeFigureOut">
               <a:rPr lang="en-CA" smtClean="0"/>
-              <a:t>2017-01-23</a:t>
+              <a:t>2017-01-24</a:t>
             </a:fld>
             <a:endParaRPr lang="en-CA"/>
           </a:p>
@@ -2674,7 +2674,7 @@
           <a:p>
             <a:fld id="{E4250886-215E-474B-A4B7-516F0D324D19}" type="datetimeFigureOut">
               <a:rPr lang="en-CA" smtClean="0"/>
-              <a:t>2017-01-23</a:t>
+              <a:t>2017-01-24</a:t>
             </a:fld>
             <a:endParaRPr lang="en-CA"/>
           </a:p>
@@ -3087,7 +3087,7 @@
           <a:p>
             <a:fld id="{E4250886-215E-474B-A4B7-516F0D324D19}" type="datetimeFigureOut">
               <a:rPr lang="en-CA" smtClean="0"/>
-              <a:t>2017-01-23</a:t>
+              <a:t>2017-01-24</a:t>
             </a:fld>
             <a:endParaRPr lang="en-CA"/>
           </a:p>
@@ -3415,7 +3415,7 @@
           <a:p>
             <a:fld id="{E4250886-215E-474B-A4B7-516F0D324D19}" type="datetimeFigureOut">
               <a:rPr lang="en-CA" smtClean="0"/>
-              <a:t>2017-01-23</a:t>
+              <a:t>2017-01-24</a:t>
             </a:fld>
             <a:endParaRPr lang="en-CA"/>
           </a:p>
@@ -3658,7 +3658,7 @@
           <a:p>
             <a:fld id="{E4250886-215E-474B-A4B7-516F0D324D19}" type="datetimeFigureOut">
               <a:rPr lang="en-CA" smtClean="0"/>
-              <a:t>2017-01-23</a:t>
+              <a:t>2017-01-24</a:t>
             </a:fld>
             <a:endParaRPr lang="en-CA"/>
           </a:p>
@@ -4047,7 +4047,7 @@
           <a:p>
             <a:fld id="{E4250886-215E-474B-A4B7-516F0D324D19}" type="datetimeFigureOut">
               <a:rPr lang="en-CA" smtClean="0"/>
-              <a:t>2017-01-23</a:t>
+              <a:t>2017-01-24</a:t>
             </a:fld>
             <a:endParaRPr lang="en-CA"/>
           </a:p>
@@ -4165,7 +4165,7 @@
           <a:p>
             <a:fld id="{E4250886-215E-474B-A4B7-516F0D324D19}" type="datetimeFigureOut">
               <a:rPr lang="en-CA" smtClean="0"/>
-              <a:t>2017-01-23</a:t>
+              <a:t>2017-01-24</a:t>
             </a:fld>
             <a:endParaRPr lang="en-CA"/>
           </a:p>
@@ -4267,7 +4267,7 @@
           <a:p>
             <a:fld id="{E4250886-215E-474B-A4B7-516F0D324D19}" type="datetimeFigureOut">
               <a:rPr lang="en-CA" smtClean="0"/>
-              <a:t>2017-01-23</a:t>
+              <a:t>2017-01-24</a:t>
             </a:fld>
             <a:endParaRPr lang="en-CA"/>
           </a:p>
@@ -4529,7 +4529,7 @@
           <a:p>
             <a:fld id="{E4250886-215E-474B-A4B7-516F0D324D19}" type="datetimeFigureOut">
               <a:rPr lang="en-CA" smtClean="0"/>
-              <a:t>2017-01-23</a:t>
+              <a:t>2017-01-24</a:t>
             </a:fld>
             <a:endParaRPr lang="en-CA"/>
           </a:p>
@@ -4812,7 +4812,7 @@
           <a:p>
             <a:fld id="{E4250886-215E-474B-A4B7-516F0D324D19}" type="datetimeFigureOut">
               <a:rPr lang="en-CA" smtClean="0"/>
-              <a:t>2017-01-23</a:t>
+              <a:t>2017-01-24</a:t>
             </a:fld>
             <a:endParaRPr lang="en-CA"/>
           </a:p>
@@ -5234,7 +5234,7 @@
           <a:p>
             <a:fld id="{E4250886-215E-474B-A4B7-516F0D324D19}" type="datetimeFigureOut">
               <a:rPr lang="en-CA" smtClean="0"/>
-              <a:t>2017-01-23</a:t>
+              <a:t>2017-01-24</a:t>
             </a:fld>
             <a:endParaRPr lang="en-CA"/>
           </a:p>
@@ -6340,21 +6340,21 @@
                 <a:gridCol w="2032000">
                   <a:extLst>
                     <a:ext uri="{9D8B030D-6E8A-4147-A177-3AD203B41FA5}">
-                      <a16:colId xmlns:a16="http://schemas.microsoft.com/office/drawing/2014/main" val="20000"/>
+                      <a16:colId xmlns:a16="http://schemas.microsoft.com/office/drawing/2014/main" xmlns="" val="20000"/>
                     </a:ext>
                   </a:extLst>
                 </a:gridCol>
                 <a:gridCol w="2032000">
                   <a:extLst>
                     <a:ext uri="{9D8B030D-6E8A-4147-A177-3AD203B41FA5}">
-                      <a16:colId xmlns:a16="http://schemas.microsoft.com/office/drawing/2014/main" val="20001"/>
+                      <a16:colId xmlns:a16="http://schemas.microsoft.com/office/drawing/2014/main" xmlns="" val="20001"/>
                     </a:ext>
                   </a:extLst>
                 </a:gridCol>
                 <a:gridCol w="2032000">
                   <a:extLst>
                     <a:ext uri="{9D8B030D-6E8A-4147-A177-3AD203B41FA5}">
-                      <a16:colId xmlns:a16="http://schemas.microsoft.com/office/drawing/2014/main" val="20002"/>
+                      <a16:colId xmlns:a16="http://schemas.microsoft.com/office/drawing/2014/main" xmlns="" val="20002"/>
                     </a:ext>
                   </a:extLst>
                 </a:gridCol>
@@ -6411,7 +6411,7 @@
                 </a:tc>
                 <a:extLst>
                   <a:ext uri="{0D108BD9-81ED-4DB2-BD59-A6C34878D82A}">
-                    <a16:rowId xmlns:a16="http://schemas.microsoft.com/office/drawing/2014/main" val="10000"/>
+                    <a16:rowId xmlns:a16="http://schemas.microsoft.com/office/drawing/2014/main" xmlns="" val="10000"/>
                   </a:ext>
                 </a:extLst>
               </a:tr>
@@ -6463,7 +6463,7 @@
                 </a:tc>
                 <a:extLst>
                   <a:ext uri="{0D108BD9-81ED-4DB2-BD59-A6C34878D82A}">
-                    <a16:rowId xmlns:a16="http://schemas.microsoft.com/office/drawing/2014/main" val="10001"/>
+                    <a16:rowId xmlns:a16="http://schemas.microsoft.com/office/drawing/2014/main" xmlns="" val="10001"/>
                   </a:ext>
                 </a:extLst>
               </a:tr>
@@ -6515,7 +6515,7 @@
                 </a:tc>
                 <a:extLst>
                   <a:ext uri="{0D108BD9-81ED-4DB2-BD59-A6C34878D82A}">
-                    <a16:rowId xmlns:a16="http://schemas.microsoft.com/office/drawing/2014/main" val="10002"/>
+                    <a16:rowId xmlns:a16="http://schemas.microsoft.com/office/drawing/2014/main" xmlns="" val="10002"/>
                   </a:ext>
                 </a:extLst>
               </a:tr>
@@ -6571,7 +6571,7 @@
                 </a:tc>
                 <a:extLst>
                   <a:ext uri="{0D108BD9-81ED-4DB2-BD59-A6C34878D82A}">
-                    <a16:rowId xmlns:a16="http://schemas.microsoft.com/office/drawing/2014/main" val="10003"/>
+                    <a16:rowId xmlns:a16="http://schemas.microsoft.com/office/drawing/2014/main" xmlns="" val="10003"/>
                   </a:ext>
                 </a:extLst>
               </a:tr>
@@ -6674,8 +6674,8 @@
           </a:p>
         </p:txBody>
       </p:sp>
-      <mc:AlternateContent xmlns:mc="http://schemas.openxmlformats.org/markup-compatibility/2006" xmlns:a14="http://schemas.microsoft.com/office/drawing/2010/main">
-        <mc:Choice Requires="a14">
+      <mc:AlternateContent xmlns:mc="http://schemas.openxmlformats.org/markup-compatibility/2006">
+        <mc:Choice xmlns:a14="http://schemas.microsoft.com/office/drawing/2010/main" Requires="a14">
           <p:sp>
             <p:nvSpPr>
               <p:cNvPr id="4" name="Content Placeholder 2"/>
@@ -7102,7 +7102,7 @@
                         </a:solidFill>
                         <a:latin typeface="Cambria Math" panose="02040503050406030204" pitchFamily="18" charset="0"/>
                       </a:rPr>
-                      <m:t>𝐶𝑉𝑆𝑆𝑆</m:t>
+                      <m:t>𝐶𝑉𝑆𝑆</m:t>
                     </m:r>
                     <m:r>
                       <a:rPr lang="en-US" sz="2400" b="0" i="1" smtClean="0">
@@ -7686,7 +7686,7 @@
             </p:txBody>
           </p:sp>
         </mc:Choice>
-        <mc:Fallback xmlns="">
+        <mc:Fallback>
           <p:sp>
             <p:nvSpPr>
               <p:cNvPr id="4" name="Content Placeholder 2"/>
@@ -7735,6 +7735,13 @@
   <p:clrMapOvr>
     <a:masterClrMapping/>
   </p:clrMapOvr>
+  <p:timing>
+    <p:tnLst>
+      <p:par>
+        <p:cTn id="1" dur="indefinite" restart="never" nodeType="tmRoot"/>
+      </p:par>
+    </p:tnLst>
+  </p:timing>
 </p:sld>
 </file>
 
@@ -8179,6 +8186,13 @@
   <p:clrMapOvr>
     <a:masterClrMapping/>
   </p:clrMapOvr>
+  <p:timing>
+    <p:tnLst>
+      <p:par>
+        <p:cTn id="1" dur="indefinite" restart="never" nodeType="tmRoot"/>
+      </p:par>
+    </p:tnLst>
+  </p:timing>
 </p:sld>
 </file>
 
@@ -8543,6 +8557,13 @@
   <p:clrMapOvr>
     <a:masterClrMapping/>
   </p:clrMapOvr>
+  <p:timing>
+    <p:tnLst>
+      <p:par>
+        <p:cTn id="1" dur="indefinite" restart="never" nodeType="tmRoot"/>
+      </p:par>
+    </p:tnLst>
+  </p:timing>
 </p:sld>
 </file>
 
@@ -10588,23 +10609,7 @@
                   <a:schemeClr val="tx1"/>
                 </a:solidFill>
               </a:rPr>
-              <a:t>Performed </a:t>
-            </a:r>
-            <a:r>
-              <a:rPr lang="en-US" dirty="0" smtClean="0">
-                <a:solidFill>
-                  <a:schemeClr val="tx1"/>
-                </a:solidFill>
-              </a:rPr>
-              <a:t>on vectors </a:t>
-            </a:r>
-            <a:r>
-              <a:rPr lang="en-US" dirty="0" smtClean="0">
-                <a:solidFill>
-                  <a:schemeClr val="tx1"/>
-                </a:solidFill>
-              </a:rPr>
-              <a:t>without dimension reduction, LDA, and LDA + PCA</a:t>
+              <a:t>Performed on vectors without dimension reduction, LDA, and LDA + PCA</a:t>
             </a:r>
             <a:endParaRPr lang="en-CA" dirty="0" smtClean="0">
               <a:solidFill>
@@ -11415,8 +11420,12 @@
           <a:lstStyle/>
           <a:p>
             <a:r>
+              <a:rPr lang="en-US" smtClean="0"/>
+              <a:t>Does not </a:t>
+            </a:r>
+            <a:r>
               <a:rPr lang="en-US" dirty="0" smtClean="0"/>
-              <a:t>Doesn’t reduce human error – human scores are ground truth</a:t>
+              <a:t>reduce human error – human scores are ground truth</a:t>
             </a:r>
           </a:p>
           <a:p>
@@ -11528,6 +11537,13 @@
   <p:clrMapOvr>
     <a:masterClrMapping/>
   </p:clrMapOvr>
+  <p:timing>
+    <p:tnLst>
+      <p:par>
+        <p:cTn id="1" dur="indefinite" restart="never" nodeType="tmRoot"/>
+      </p:par>
+    </p:tnLst>
+  </p:timing>
 </p:sld>
 </file>
 
@@ -11662,11 +11678,7 @@
             </a:r>
             <a:r>
               <a:rPr lang="en-US" dirty="0" smtClean="0"/>
-              <a:t>F. “Comparing Vulnerability Severity and Exploits Using Case-Control Studies”. ACM Transactions on Information and Systems Security 2014; 17(1):Art. 1</a:t>
-            </a:r>
-            <a:r>
-              <a:rPr lang="en-US" dirty="0" smtClean="0"/>
-              <a:t>.</a:t>
+              <a:t>F. “Comparing Vulnerability Severity and Exploits Using Case-Control Studies”. ACM Transactions on Information and Systems Security 2014; 17(1):Art. 1.</a:t>
             </a:r>
           </a:p>
           <a:p>
@@ -11846,11 +11858,7 @@
             <a:pPr algn="ctr"/>
             <a:r>
               <a:rPr lang="en-US" sz="4400" dirty="0" smtClean="0"/>
-              <a:t>APPENDIX I – CVSS Score Formulae </a:t>
-            </a:r>
-            <a:r>
-              <a:rPr lang="en-US" sz="4400" dirty="0" smtClean="0"/>
-              <a:t>[4]</a:t>
+              <a:t>APPENDIX I – CVSS Score Formulae [4]</a:t>
             </a:r>
             <a:endParaRPr lang="en-CA" sz="4400" dirty="0"/>
           </a:p>

</xml_diff>

<commit_message>
Synch before going to campus
</commit_message>
<xml_diff>
--- a/CISC848/BackgroundPentation/ChurchCISC848Background.pptx
+++ b/CISC848/BackgroundPentation/ChurchCISC848Background.pptx
@@ -37,11 +37,12 @@
     <p:sldId id="284" r:id="rId31"/>
     <p:sldId id="289" r:id="rId32"/>
     <p:sldId id="296" r:id="rId33"/>
-    <p:sldId id="262" r:id="rId34"/>
-    <p:sldId id="267" r:id="rId35"/>
-    <p:sldId id="268" r:id="rId36"/>
-    <p:sldId id="270" r:id="rId37"/>
-    <p:sldId id="271" r:id="rId38"/>
+    <p:sldId id="297" r:id="rId34"/>
+    <p:sldId id="262" r:id="rId35"/>
+    <p:sldId id="267" r:id="rId36"/>
+    <p:sldId id="268" r:id="rId37"/>
+    <p:sldId id="270" r:id="rId38"/>
+    <p:sldId id="271" r:id="rId39"/>
   </p:sldIdLst>
   <p:sldSz cx="12192000" cy="6858000"/>
   <p:notesSz cx="6858000" cy="9144000"/>
@@ -339,7 +340,7 @@
           <a:p>
             <a:fld id="{E4250886-215E-474B-A4B7-516F0D324D19}" type="datetimeFigureOut">
               <a:rPr lang="en-CA" smtClean="0"/>
-              <a:t>2017-01-24</a:t>
+              <a:t>2017-01-26</a:t>
             </a:fld>
             <a:endParaRPr lang="en-CA"/>
           </a:p>
@@ -775,7 +776,7 @@
           <a:p>
             <a:fld id="{E4250886-215E-474B-A4B7-516F0D324D19}" type="datetimeFigureOut">
               <a:rPr lang="en-CA" smtClean="0"/>
-              <a:t>2017-01-24</a:t>
+              <a:t>2017-01-26</a:t>
             </a:fld>
             <a:endParaRPr lang="en-CA"/>
           </a:p>
@@ -1025,7 +1026,7 @@
           <a:p>
             <a:fld id="{E4250886-215E-474B-A4B7-516F0D324D19}" type="datetimeFigureOut">
               <a:rPr lang="en-CA" smtClean="0"/>
-              <a:t>2017-01-24</a:t>
+              <a:t>2017-01-26</a:t>
             </a:fld>
             <a:endParaRPr lang="en-CA"/>
           </a:p>
@@ -1333,7 +1334,7 @@
           <a:p>
             <a:fld id="{E4250886-215E-474B-A4B7-516F0D324D19}" type="datetimeFigureOut">
               <a:rPr lang="en-CA" smtClean="0"/>
-              <a:t>2017-01-24</a:t>
+              <a:t>2017-01-26</a:t>
             </a:fld>
             <a:endParaRPr lang="en-CA"/>
           </a:p>
@@ -1651,7 +1652,7 @@
           <a:p>
             <a:fld id="{E4250886-215E-474B-A4B7-516F0D324D19}" type="datetimeFigureOut">
               <a:rPr lang="en-CA" smtClean="0"/>
-              <a:t>2017-01-24</a:t>
+              <a:t>2017-01-26</a:t>
             </a:fld>
             <a:endParaRPr lang="en-CA"/>
           </a:p>
@@ -1953,7 +1954,7 @@
           <a:p>
             <a:fld id="{E4250886-215E-474B-A4B7-516F0D324D19}" type="datetimeFigureOut">
               <a:rPr lang="en-CA" smtClean="0"/>
-              <a:t>2017-01-24</a:t>
+              <a:t>2017-01-26</a:t>
             </a:fld>
             <a:endParaRPr lang="en-CA"/>
           </a:p>
@@ -2320,7 +2321,7 @@
           <a:p>
             <a:fld id="{E4250886-215E-474B-A4B7-516F0D324D19}" type="datetimeFigureOut">
               <a:rPr lang="en-CA" smtClean="0"/>
-              <a:t>2017-01-24</a:t>
+              <a:t>2017-01-26</a:t>
             </a:fld>
             <a:endParaRPr lang="en-CA"/>
           </a:p>
@@ -2494,7 +2495,7 @@
           <a:p>
             <a:fld id="{E4250886-215E-474B-A4B7-516F0D324D19}" type="datetimeFigureOut">
               <a:rPr lang="en-CA" smtClean="0"/>
-              <a:t>2017-01-24</a:t>
+              <a:t>2017-01-26</a:t>
             </a:fld>
             <a:endParaRPr lang="en-CA"/>
           </a:p>
@@ -2674,7 +2675,7 @@
           <a:p>
             <a:fld id="{E4250886-215E-474B-A4B7-516F0D324D19}" type="datetimeFigureOut">
               <a:rPr lang="en-CA" smtClean="0"/>
-              <a:t>2017-01-24</a:t>
+              <a:t>2017-01-26</a:t>
             </a:fld>
             <a:endParaRPr lang="en-CA"/>
           </a:p>
@@ -3087,7 +3088,7 @@
           <a:p>
             <a:fld id="{E4250886-215E-474B-A4B7-516F0D324D19}" type="datetimeFigureOut">
               <a:rPr lang="en-CA" smtClean="0"/>
-              <a:t>2017-01-24</a:t>
+              <a:t>2017-01-26</a:t>
             </a:fld>
             <a:endParaRPr lang="en-CA"/>
           </a:p>
@@ -3415,7 +3416,7 @@
           <a:p>
             <a:fld id="{E4250886-215E-474B-A4B7-516F0D324D19}" type="datetimeFigureOut">
               <a:rPr lang="en-CA" smtClean="0"/>
-              <a:t>2017-01-24</a:t>
+              <a:t>2017-01-26</a:t>
             </a:fld>
             <a:endParaRPr lang="en-CA"/>
           </a:p>
@@ -3658,7 +3659,7 @@
           <a:p>
             <a:fld id="{E4250886-215E-474B-A4B7-516F0D324D19}" type="datetimeFigureOut">
               <a:rPr lang="en-CA" smtClean="0"/>
-              <a:t>2017-01-24</a:t>
+              <a:t>2017-01-26</a:t>
             </a:fld>
             <a:endParaRPr lang="en-CA"/>
           </a:p>
@@ -4047,7 +4048,7 @@
           <a:p>
             <a:fld id="{E4250886-215E-474B-A4B7-516F0D324D19}" type="datetimeFigureOut">
               <a:rPr lang="en-CA" smtClean="0"/>
-              <a:t>2017-01-24</a:t>
+              <a:t>2017-01-26</a:t>
             </a:fld>
             <a:endParaRPr lang="en-CA"/>
           </a:p>
@@ -4165,7 +4166,7 @@
           <a:p>
             <a:fld id="{E4250886-215E-474B-A4B7-516F0D324D19}" type="datetimeFigureOut">
               <a:rPr lang="en-CA" smtClean="0"/>
-              <a:t>2017-01-24</a:t>
+              <a:t>2017-01-26</a:t>
             </a:fld>
             <a:endParaRPr lang="en-CA"/>
           </a:p>
@@ -4267,7 +4268,7 @@
           <a:p>
             <a:fld id="{E4250886-215E-474B-A4B7-516F0D324D19}" type="datetimeFigureOut">
               <a:rPr lang="en-CA" smtClean="0"/>
-              <a:t>2017-01-24</a:t>
+              <a:t>2017-01-26</a:t>
             </a:fld>
             <a:endParaRPr lang="en-CA"/>
           </a:p>
@@ -4529,7 +4530,7 @@
           <a:p>
             <a:fld id="{E4250886-215E-474B-A4B7-516F0D324D19}" type="datetimeFigureOut">
               <a:rPr lang="en-CA" smtClean="0"/>
-              <a:t>2017-01-24</a:t>
+              <a:t>2017-01-26</a:t>
             </a:fld>
             <a:endParaRPr lang="en-CA"/>
           </a:p>
@@ -4812,7 +4813,7 @@
           <a:p>
             <a:fld id="{E4250886-215E-474B-A4B7-516F0D324D19}" type="datetimeFigureOut">
               <a:rPr lang="en-CA" smtClean="0"/>
-              <a:t>2017-01-24</a:t>
+              <a:t>2017-01-26</a:t>
             </a:fld>
             <a:endParaRPr lang="en-CA"/>
           </a:p>
@@ -5234,7 +5235,7 @@
           <a:p>
             <a:fld id="{E4250886-215E-474B-A4B7-516F0D324D19}" type="datetimeFigureOut">
               <a:rPr lang="en-CA" smtClean="0"/>
-              <a:t>2017-01-24</a:t>
+              <a:t>2017-01-26</a:t>
             </a:fld>
             <a:endParaRPr lang="en-CA"/>
           </a:p>
@@ -6340,21 +6341,21 @@
                 <a:gridCol w="2032000">
                   <a:extLst>
                     <a:ext uri="{9D8B030D-6E8A-4147-A177-3AD203B41FA5}">
-                      <a16:colId xmlns:a16="http://schemas.microsoft.com/office/drawing/2014/main" xmlns="" val="20000"/>
+                      <a16:colId xmlns="" xmlns:a16="http://schemas.microsoft.com/office/drawing/2014/main" val="20000"/>
                     </a:ext>
                   </a:extLst>
                 </a:gridCol>
                 <a:gridCol w="2032000">
                   <a:extLst>
                     <a:ext uri="{9D8B030D-6E8A-4147-A177-3AD203B41FA5}">
-                      <a16:colId xmlns:a16="http://schemas.microsoft.com/office/drawing/2014/main" xmlns="" val="20001"/>
+                      <a16:colId xmlns="" xmlns:a16="http://schemas.microsoft.com/office/drawing/2014/main" val="20001"/>
                     </a:ext>
                   </a:extLst>
                 </a:gridCol>
                 <a:gridCol w="2032000">
                   <a:extLst>
                     <a:ext uri="{9D8B030D-6E8A-4147-A177-3AD203B41FA5}">
-                      <a16:colId xmlns:a16="http://schemas.microsoft.com/office/drawing/2014/main" xmlns="" val="20002"/>
+                      <a16:colId xmlns="" xmlns:a16="http://schemas.microsoft.com/office/drawing/2014/main" val="20002"/>
                     </a:ext>
                   </a:extLst>
                 </a:gridCol>
@@ -6411,7 +6412,7 @@
                 </a:tc>
                 <a:extLst>
                   <a:ext uri="{0D108BD9-81ED-4DB2-BD59-A6C34878D82A}">
-                    <a16:rowId xmlns:a16="http://schemas.microsoft.com/office/drawing/2014/main" xmlns="" val="10000"/>
+                    <a16:rowId xmlns="" xmlns:a16="http://schemas.microsoft.com/office/drawing/2014/main" val="10000"/>
                   </a:ext>
                 </a:extLst>
               </a:tr>
@@ -6463,7 +6464,7 @@
                 </a:tc>
                 <a:extLst>
                   <a:ext uri="{0D108BD9-81ED-4DB2-BD59-A6C34878D82A}">
-                    <a16:rowId xmlns:a16="http://schemas.microsoft.com/office/drawing/2014/main" xmlns="" val="10001"/>
+                    <a16:rowId xmlns="" xmlns:a16="http://schemas.microsoft.com/office/drawing/2014/main" val="10001"/>
                   </a:ext>
                 </a:extLst>
               </a:tr>
@@ -6515,7 +6516,7 @@
                 </a:tc>
                 <a:extLst>
                   <a:ext uri="{0D108BD9-81ED-4DB2-BD59-A6C34878D82A}">
-                    <a16:rowId xmlns:a16="http://schemas.microsoft.com/office/drawing/2014/main" xmlns="" val="10002"/>
+                    <a16:rowId xmlns="" xmlns:a16="http://schemas.microsoft.com/office/drawing/2014/main" val="10002"/>
                   </a:ext>
                 </a:extLst>
               </a:tr>
@@ -6571,7 +6572,7 @@
                 </a:tc>
                 <a:extLst>
                   <a:ext uri="{0D108BD9-81ED-4DB2-BD59-A6C34878D82A}">
-                    <a16:rowId xmlns:a16="http://schemas.microsoft.com/office/drawing/2014/main" xmlns="" val="10003"/>
+                    <a16:rowId xmlns="" xmlns:a16="http://schemas.microsoft.com/office/drawing/2014/main" val="10003"/>
                   </a:ext>
                 </a:extLst>
               </a:tr>
@@ -6674,8 +6675,8 @@
           </a:p>
         </p:txBody>
       </p:sp>
-      <mc:AlternateContent xmlns:mc="http://schemas.openxmlformats.org/markup-compatibility/2006">
-        <mc:Choice xmlns:a14="http://schemas.microsoft.com/office/drawing/2010/main" Requires="a14">
+      <mc:AlternateContent xmlns:mc="http://schemas.openxmlformats.org/markup-compatibility/2006" xmlns:a14="http://schemas.microsoft.com/office/drawing/2010/main">
+        <mc:Choice Requires="a14">
           <p:sp>
             <p:nvSpPr>
               <p:cNvPr id="4" name="Content Placeholder 2"/>
@@ -7686,7 +7687,7 @@
             </p:txBody>
           </p:sp>
         </mc:Choice>
-        <mc:Fallback>
+        <mc:Fallback xmlns="">
           <p:sp>
             <p:nvSpPr>
               <p:cNvPr id="4" name="Content Placeholder 2"/>
@@ -11574,6 +11575,74 @@
             <p:ph type="title"/>
           </p:nvPr>
         </p:nvSpPr>
+        <p:spPr>
+          <a:xfrm>
+            <a:off x="1492313" y="1964602"/>
+            <a:ext cx="9207375" cy="2987644"/>
+          </a:xfrm>
+        </p:spPr>
+        <p:txBody>
+          <a:bodyPr>
+            <a:normAutofit/>
+          </a:bodyPr>
+          <a:lstStyle/>
+          <a:p>
+            <a:pPr algn="ctr"/>
+            <a:r>
+              <a:rPr lang="en-US" sz="5400" dirty="0" smtClean="0"/>
+              <a:t>Thank you!</a:t>
+            </a:r>
+            <a:br>
+              <a:rPr lang="en-US" sz="5400" dirty="0" smtClean="0"/>
+            </a:br>
+            <a:r>
+              <a:rPr lang="en-US" sz="5400" dirty="0" smtClean="0"/>
+              <a:t>Questions?</a:t>
+            </a:r>
+            <a:endParaRPr lang="en-CA" sz="5400" dirty="0"/>
+          </a:p>
+        </p:txBody>
+      </p:sp>
+    </p:spTree>
+    <p:extLst>
+      <p:ext uri="{BB962C8B-B14F-4D97-AF65-F5344CB8AC3E}">
+        <p14:creationId xmlns:p14="http://schemas.microsoft.com/office/powerpoint/2010/main" val="3635730334"/>
+      </p:ext>
+    </p:extLst>
+  </p:cSld>
+  <p:clrMapOvr>
+    <a:masterClrMapping/>
+  </p:clrMapOvr>
+</p:sld>
+</file>
+
+<file path=ppt/slides/slide34.xml><?xml version="1.0" encoding="utf-8"?>
+<p:sld xmlns:a="http://schemas.openxmlformats.org/drawingml/2006/main" xmlns:r="http://schemas.openxmlformats.org/officeDocument/2006/relationships" xmlns:p="http://schemas.openxmlformats.org/presentationml/2006/main">
+  <p:cSld>
+    <p:spTree>
+      <p:nvGrpSpPr>
+        <p:cNvPr id="1" name=""/>
+        <p:cNvGrpSpPr/>
+        <p:nvPr/>
+      </p:nvGrpSpPr>
+      <p:grpSpPr>
+        <a:xfrm>
+          <a:off x="0" y="0"/>
+          <a:ext cx="0" cy="0"/>
+          <a:chOff x="0" y="0"/>
+          <a:chExt cx="0" cy="0"/>
+        </a:xfrm>
+      </p:grpSpPr>
+      <p:sp>
+        <p:nvSpPr>
+          <p:cNvPr id="2" name="Title 1"/>
+          <p:cNvSpPr>
+            <a:spLocks noGrp="1"/>
+          </p:cNvSpPr>
+          <p:nvPr>
+            <p:ph type="title"/>
+          </p:nvPr>
+        </p:nvSpPr>
         <p:spPr/>
         <p:txBody>
           <a:bodyPr/>
@@ -11742,7 +11811,7 @@
 </p:sld>
 </file>
 
-<file path=ppt/slides/slide34.xml><?xml version="1.0" encoding="utf-8"?>
+<file path=ppt/slides/slide35.xml><?xml version="1.0" encoding="utf-8"?>
 <p:sld xmlns:a="http://schemas.openxmlformats.org/drawingml/2006/main" xmlns:r="http://schemas.openxmlformats.org/officeDocument/2006/relationships" xmlns:p="http://schemas.openxmlformats.org/presentationml/2006/main">
   <p:cSld>
     <p:spTree>
@@ -11884,7 +11953,7 @@
 </p:sld>
 </file>
 
-<file path=ppt/slides/slide35.xml><?xml version="1.0" encoding="utf-8"?>
+<file path=ppt/slides/slide36.xml><?xml version="1.0" encoding="utf-8"?>
 <p:sld xmlns:a="http://schemas.openxmlformats.org/drawingml/2006/main" xmlns:r="http://schemas.openxmlformats.org/officeDocument/2006/relationships" xmlns:p="http://schemas.openxmlformats.org/presentationml/2006/main">
   <p:cSld>
     <p:spTree>
@@ -12936,7 +13005,7 @@
 </p:sld>
 </file>
 
-<file path=ppt/slides/slide36.xml><?xml version="1.0" encoding="utf-8"?>
+<file path=ppt/slides/slide37.xml><?xml version="1.0" encoding="utf-8"?>
 <p:sld xmlns:a="http://schemas.openxmlformats.org/drawingml/2006/main" xmlns:r="http://schemas.openxmlformats.org/officeDocument/2006/relationships" xmlns:p="http://schemas.openxmlformats.org/presentationml/2006/main">
   <p:cSld>
     <p:spTree>
@@ -13458,7 +13527,7 @@
 </p:sld>
 </file>
 
-<file path=ppt/slides/slide37.xml><?xml version="1.0" encoding="utf-8"?>
+<file path=ppt/slides/slide38.xml><?xml version="1.0" encoding="utf-8"?>
 <p:sld xmlns:a="http://schemas.openxmlformats.org/drawingml/2006/main" xmlns:r="http://schemas.openxmlformats.org/officeDocument/2006/relationships" xmlns:p="http://schemas.openxmlformats.org/presentationml/2006/main">
   <p:cSld>
     <p:spTree>

</xml_diff>